<commit_message>
Update the speaker list, Olga presentation
</commit_message>
<xml_diff>
--- a/IS Team Updates - November 22.pptx
+++ b/IS Team Updates - November 22.pptx
@@ -5,13 +5,14 @@
     <p:sldMasterId id="2147483648" r:id="rId1"/>
   </p:sldMasterIdLst>
   <p:notesMasterIdLst>
-    <p:notesMasterId r:id="rId6"/>
+    <p:notesMasterId r:id="rId7"/>
   </p:notesMasterIdLst>
   <p:sldIdLst>
     <p:sldId id="257" r:id="rId2"/>
     <p:sldId id="259" r:id="rId3"/>
     <p:sldId id="258" r:id="rId4"/>
-    <p:sldId id="260" r:id="rId5"/>
+    <p:sldId id="256" r:id="rId5"/>
+    <p:sldId id="260" r:id="rId6"/>
   </p:sldIdLst>
   <p:sldSz cx="12192000" cy="6858000"/>
   <p:notesSz cx="6858000" cy="9144000"/>
@@ -785,7 +786,7 @@
           <a:p>
             <a:fld id="{856DE13A-4A03-4D65-A1E3-92498798F1FA}" type="slidenum">
               <a:rPr lang="en-CA" smtClean="0"/>
-              <a:t>4</a:t>
+              <a:t>5</a:t>
             </a:fld>
             <a:endParaRPr lang="en-CA"/>
           </a:p>
@@ -4718,10 +4719,10 @@
       </p:sp>
       <p:graphicFrame>
         <p:nvGraphicFramePr>
-          <p:cNvPr id="2" name="Table 1">
-            <a:extLst>
-              <a:ext uri="{FF2B5EF4-FFF2-40B4-BE49-F238E27FC236}">
-                <a16:creationId xmlns:a16="http://schemas.microsoft.com/office/drawing/2014/main" id="{62FA0A9C-3068-4074-BCA4-D23BA57D74A7}"/>
+          <p:cNvPr id="6" name="Table 5">
+            <a:extLst>
+              <a:ext uri="{FF2B5EF4-FFF2-40B4-BE49-F238E27FC236}">
+                <a16:creationId xmlns:a16="http://schemas.microsoft.com/office/drawing/2014/main" id="{74F7F999-8032-451D-B49E-1E7E897B8DD9}"/>
               </a:ext>
             </a:extLst>
           </p:cNvPr>
@@ -4731,14 +4732,14 @@
           <p:nvPr>
             <p:extLst>
               <p:ext uri="{D42A27DB-BD31-4B8C-83A1-F6EECF244321}">
-                <p14:modId xmlns:p14="http://schemas.microsoft.com/office/powerpoint/2010/main" val="27779732"/>
+                <p14:modId xmlns:p14="http://schemas.microsoft.com/office/powerpoint/2010/main" val="2300858658"/>
               </p:ext>
             </p:extLst>
           </p:nvPr>
         </p:nvGraphicFramePr>
         <p:xfrm>
-          <a:off x="945397" y="1962671"/>
-          <a:ext cx="10740325" cy="1525218"/>
+          <a:off x="867905" y="1779977"/>
+          <a:ext cx="10848814" cy="4682814"/>
         </p:xfrm>
         <a:graphic>
           <a:graphicData uri="http://schemas.openxmlformats.org/drawingml/2006/table">
@@ -4747,29 +4748,29 @@
                 <a:tableStyleId>{5C22544A-7EE6-4342-B048-85BDC9FD1C3A}</a:tableStyleId>
               </a:tblPr>
               <a:tblGrid>
-                <a:gridCol w="4671443">
+                <a:gridCol w="2526508">
                   <a:extLst>
                     <a:ext uri="{9D8B030D-6E8A-4147-A177-3AD203B41FA5}">
-                      <a16:colId xmlns:a16="http://schemas.microsoft.com/office/drawing/2014/main" val="385426453"/>
+                      <a16:colId xmlns:a16="http://schemas.microsoft.com/office/drawing/2014/main" val="1687189315"/>
                     </a:ext>
                   </a:extLst>
                 </a:gridCol>
-                <a:gridCol w="4152393">
+                <a:gridCol w="6431860">
                   <a:extLst>
                     <a:ext uri="{9D8B030D-6E8A-4147-A177-3AD203B41FA5}">
-                      <a16:colId xmlns:a16="http://schemas.microsoft.com/office/drawing/2014/main" val="1821499403"/>
+                      <a16:colId xmlns:a16="http://schemas.microsoft.com/office/drawing/2014/main" val="678130918"/>
                     </a:ext>
                   </a:extLst>
                 </a:gridCol>
-                <a:gridCol w="1916489">
+                <a:gridCol w="1890446">
                   <a:extLst>
                     <a:ext uri="{9D8B030D-6E8A-4147-A177-3AD203B41FA5}">
-                      <a16:colId xmlns:a16="http://schemas.microsoft.com/office/drawing/2014/main" val="208893591"/>
+                      <a16:colId xmlns:a16="http://schemas.microsoft.com/office/drawing/2014/main" val="1537527621"/>
                     </a:ext>
                   </a:extLst>
                 </a:gridCol>
               </a:tblGrid>
-              <a:tr h="781210">
+              <a:tr h="486827">
                 <a:tc>
                   <a:txBody>
                     <a:bodyPr/>
@@ -4777,12 +4778,12 @@
                     <a:p>
                       <a:pPr algn="l" fontAlgn="b"/>
                       <a:r>
-                        <a:rPr lang="en-CA" sz="3200" b="1" u="none" strike="noStrike" dirty="0">
+                        <a:rPr lang="en-CA" sz="2800" b="1" u="none" strike="noStrike" dirty="0">
                           <a:effectLst/>
                         </a:rPr>
                         <a:t>Speaker</a:t>
                       </a:r>
-                      <a:endParaRPr lang="en-CA" sz="3200" b="1" i="0" u="none" strike="noStrike" dirty="0">
+                      <a:endParaRPr lang="en-CA" sz="2800" b="1" i="0" u="none" strike="noStrike" dirty="0">
                         <a:solidFill>
                           <a:srgbClr val="000000"/>
                         </a:solidFill>
@@ -4800,12 +4801,12 @@
                     <a:p>
                       <a:pPr algn="l" fontAlgn="b"/>
                       <a:r>
-                        <a:rPr lang="en-CA" sz="3200" b="1" u="none" strike="noStrike" dirty="0">
+                        <a:rPr lang="en-CA" sz="2800" b="1" u="none" strike="noStrike">
                           <a:effectLst/>
                         </a:rPr>
                         <a:t>Subject</a:t>
                       </a:r>
-                      <a:endParaRPr lang="en-CA" sz="3200" b="1" i="0" u="none" strike="noStrike" dirty="0">
+                      <a:endParaRPr lang="en-CA" sz="2800" b="1" i="0" u="none" strike="noStrike">
                         <a:solidFill>
                           <a:srgbClr val="000000"/>
                         </a:solidFill>
@@ -4823,12 +4824,12 @@
                     <a:p>
                       <a:pPr algn="l" fontAlgn="b"/>
                       <a:r>
-                        <a:rPr lang="en-CA" sz="3200" b="1" u="none" strike="noStrike" dirty="0">
+                        <a:rPr lang="en-CA" sz="2800" b="1" u="none" strike="noStrike" dirty="0">
                           <a:effectLst/>
                         </a:rPr>
                         <a:t>Time</a:t>
                       </a:r>
-                      <a:endParaRPr lang="en-CA" sz="3200" b="1" i="0" u="none" strike="noStrike" dirty="0">
+                      <a:endParaRPr lang="en-CA" sz="2800" b="1" i="0" u="none" strike="noStrike" dirty="0">
                         <a:solidFill>
                           <a:srgbClr val="000000"/>
                         </a:solidFill>
@@ -4841,11 +4842,11 @@
                 </a:tc>
                 <a:extLst>
                   <a:ext uri="{0D108BD9-81ED-4DB2-BD59-A6C34878D82A}">
-                    <a16:rowId xmlns:a16="http://schemas.microsoft.com/office/drawing/2014/main" val="4164443243"/>
+                    <a16:rowId xmlns:a16="http://schemas.microsoft.com/office/drawing/2014/main" val="2760559848"/>
                   </a:ext>
                 </a:extLst>
               </a:tr>
-              <a:tr h="744008">
+              <a:tr h="463645">
                 <a:tc>
                   <a:txBody>
                     <a:bodyPr/>
@@ -4853,12 +4854,12 @@
                     <a:p>
                       <a:pPr algn="l" fontAlgn="b"/>
                       <a:r>
-                        <a:rPr lang="en-CA" sz="2800" u="none" strike="noStrike" dirty="0">
+                        <a:rPr lang="en-CA" sz="2400" u="none" strike="noStrike" dirty="0">
                           <a:effectLst/>
                         </a:rPr>
-                        <a:t>Anita Wong</a:t>
+                        <a:t>Java member</a:t>
                       </a:r>
-                      <a:endParaRPr lang="en-CA" sz="2800" b="0" i="0" u="none" strike="noStrike" dirty="0">
+                      <a:endParaRPr lang="en-CA" sz="2400" b="0" i="0" u="none" strike="noStrike" dirty="0">
                         <a:solidFill>
                           <a:srgbClr val="000000"/>
                         </a:solidFill>
@@ -4876,12 +4877,12 @@
                     <a:p>
                       <a:pPr algn="l" fontAlgn="b"/>
                       <a:r>
-                        <a:rPr lang="en-CA" sz="2800" u="none" strike="noStrike">
+                        <a:rPr lang="en-CA" sz="2400" u="none" strike="noStrike">
                           <a:effectLst/>
                         </a:rPr>
-                        <a:t>FMS Upgrade Update</a:t>
+                        <a:t>Welcome</a:t>
                       </a:r>
-                      <a:endParaRPr lang="en-CA" sz="2800" b="0" i="0" u="none" strike="noStrike">
+                      <a:endParaRPr lang="en-CA" sz="2400" b="0" i="0" u="none" strike="noStrike">
                         <a:solidFill>
                           <a:srgbClr val="000000"/>
                         </a:solidFill>
@@ -4899,12 +4900,12 @@
                     <a:p>
                       <a:pPr algn="l" fontAlgn="b"/>
                       <a:r>
-                        <a:rPr lang="en-CA" sz="2800" u="none" strike="noStrike" dirty="0">
+                        <a:rPr lang="en-CA" sz="2400" u="none" strike="noStrike">
                           <a:effectLst/>
                         </a:rPr>
                         <a:t>5 minutes</a:t>
                       </a:r>
-                      <a:endParaRPr lang="en-CA" sz="2800" b="0" i="0" u="none" strike="noStrike" dirty="0">
+                      <a:endParaRPr lang="en-CA" sz="2400" b="0" i="0" u="none" strike="noStrike">
                         <a:solidFill>
                           <a:srgbClr val="000000"/>
                         </a:solidFill>
@@ -4917,7 +4918,615 @@
                 </a:tc>
                 <a:extLst>
                   <a:ext uri="{0D108BD9-81ED-4DB2-BD59-A6C34878D82A}">
-                    <a16:rowId xmlns:a16="http://schemas.microsoft.com/office/drawing/2014/main" val="2907010386"/>
+                    <a16:rowId xmlns:a16="http://schemas.microsoft.com/office/drawing/2014/main" val="2756989235"/>
+                  </a:ext>
+                </a:extLst>
+              </a:tr>
+              <a:tr h="463645">
+                <a:tc>
+                  <a:txBody>
+                    <a:bodyPr/>
+                    <a:lstStyle/>
+                    <a:p>
+                      <a:pPr algn="l" fontAlgn="b"/>
+                      <a:r>
+                        <a:rPr lang="en-CA" sz="2400" u="none" strike="noStrike" dirty="0">
+                          <a:effectLst/>
+                        </a:rPr>
+                        <a:t>John Hynes</a:t>
+                      </a:r>
+                      <a:endParaRPr lang="en-CA" sz="2400" b="0" i="0" u="none" strike="noStrike" dirty="0">
+                        <a:solidFill>
+                          <a:srgbClr val="000000"/>
+                        </a:solidFill>
+                        <a:effectLst/>
+                        <a:latin typeface="Calibri" panose="020F0502020204030204" pitchFamily="34" charset="0"/>
+                      </a:endParaRPr>
+                    </a:p>
+                  </a:txBody>
+                  <a:tcPr marL="9525" marR="9525" marT="9525" marB="0" anchor="b"/>
+                </a:tc>
+                <a:tc>
+                  <a:txBody>
+                    <a:bodyPr/>
+                    <a:lstStyle/>
+                    <a:p>
+                      <a:pPr algn="l" fontAlgn="b"/>
+                      <a:r>
+                        <a:rPr lang="en-CA" sz="2400" u="none" strike="noStrike">
+                          <a:effectLst/>
+                        </a:rPr>
+                        <a:t>Welcome, team</a:t>
+                      </a:r>
+                      <a:endParaRPr lang="en-CA" sz="2400" b="0" i="0" u="none" strike="noStrike">
+                        <a:solidFill>
+                          <a:srgbClr val="000000"/>
+                        </a:solidFill>
+                        <a:effectLst/>
+                        <a:latin typeface="Calibri" panose="020F0502020204030204" pitchFamily="34" charset="0"/>
+                      </a:endParaRPr>
+                    </a:p>
+                  </a:txBody>
+                  <a:tcPr marL="9525" marR="9525" marT="9525" marB="0" anchor="b"/>
+                </a:tc>
+                <a:tc>
+                  <a:txBody>
+                    <a:bodyPr/>
+                    <a:lstStyle/>
+                    <a:p>
+                      <a:pPr algn="l" fontAlgn="b"/>
+                      <a:r>
+                        <a:rPr lang="en-CA" sz="2400" u="none" strike="noStrike">
+                          <a:effectLst/>
+                        </a:rPr>
+                        <a:t>5 minutes</a:t>
+                      </a:r>
+                      <a:endParaRPr lang="en-CA" sz="2400" b="0" i="0" u="none" strike="noStrike">
+                        <a:solidFill>
+                          <a:srgbClr val="000000"/>
+                        </a:solidFill>
+                        <a:effectLst/>
+                        <a:latin typeface="Calibri" panose="020F0502020204030204" pitchFamily="34" charset="0"/>
+                      </a:endParaRPr>
+                    </a:p>
+                  </a:txBody>
+                  <a:tcPr marL="9525" marR="9525" marT="9525" marB="0" anchor="b"/>
+                </a:tc>
+                <a:extLst>
+                  <a:ext uri="{0D108BD9-81ED-4DB2-BD59-A6C34878D82A}">
+                    <a16:rowId xmlns:a16="http://schemas.microsoft.com/office/drawing/2014/main" val="2061227054"/>
+                  </a:ext>
+                </a:extLst>
+              </a:tr>
+              <a:tr h="463645">
+                <a:tc>
+                  <a:txBody>
+                    <a:bodyPr/>
+                    <a:lstStyle/>
+                    <a:p>
+                      <a:pPr algn="l" fontAlgn="b"/>
+                      <a:r>
+                        <a:rPr lang="en-CA" sz="2400" u="none" strike="noStrike" dirty="0">
+                          <a:effectLst/>
+                        </a:rPr>
+                        <a:t>Alan Hummel</a:t>
+                      </a:r>
+                      <a:endParaRPr lang="en-CA" sz="2400" b="0" i="0" u="none" strike="noStrike" dirty="0">
+                        <a:solidFill>
+                          <a:srgbClr val="000000"/>
+                        </a:solidFill>
+                        <a:effectLst/>
+                        <a:latin typeface="Calibri" panose="020F0502020204030204" pitchFamily="34" charset="0"/>
+                      </a:endParaRPr>
+                    </a:p>
+                  </a:txBody>
+                  <a:tcPr marL="9525" marR="9525" marT="9525" marB="0" anchor="b"/>
+                </a:tc>
+                <a:tc>
+                  <a:txBody>
+                    <a:bodyPr/>
+                    <a:lstStyle/>
+                    <a:p>
+                      <a:pPr algn="l" fontAlgn="b"/>
+                      <a:r>
+                        <a:rPr lang="en-CA" sz="2400" u="none" strike="noStrike">
+                          <a:effectLst/>
+                        </a:rPr>
+                        <a:t>Using Git</a:t>
+                      </a:r>
+                      <a:endParaRPr lang="en-CA" sz="2400" b="0" i="0" u="none" strike="noStrike">
+                        <a:solidFill>
+                          <a:srgbClr val="000000"/>
+                        </a:solidFill>
+                        <a:effectLst/>
+                        <a:latin typeface="Calibri" panose="020F0502020204030204" pitchFamily="34" charset="0"/>
+                      </a:endParaRPr>
+                    </a:p>
+                  </a:txBody>
+                  <a:tcPr marL="9525" marR="9525" marT="9525" marB="0" anchor="b"/>
+                </a:tc>
+                <a:tc>
+                  <a:txBody>
+                    <a:bodyPr/>
+                    <a:lstStyle/>
+                    <a:p>
+                      <a:pPr algn="l" fontAlgn="b"/>
+                      <a:r>
+                        <a:rPr lang="en-CA" sz="2400" u="none" strike="noStrike">
+                          <a:effectLst/>
+                        </a:rPr>
+                        <a:t>10 minutes</a:t>
+                      </a:r>
+                      <a:endParaRPr lang="en-CA" sz="2400" b="0" i="0" u="none" strike="noStrike">
+                        <a:solidFill>
+                          <a:srgbClr val="000000"/>
+                        </a:solidFill>
+                        <a:effectLst/>
+                        <a:latin typeface="Calibri" panose="020F0502020204030204" pitchFamily="34" charset="0"/>
+                      </a:endParaRPr>
+                    </a:p>
+                  </a:txBody>
+                  <a:tcPr marL="9525" marR="9525" marT="9525" marB="0" anchor="b"/>
+                </a:tc>
+                <a:extLst>
+                  <a:ext uri="{0D108BD9-81ED-4DB2-BD59-A6C34878D82A}">
+                    <a16:rowId xmlns:a16="http://schemas.microsoft.com/office/drawing/2014/main" val="1455610762"/>
+                  </a:ext>
+                </a:extLst>
+              </a:tr>
+              <a:tr h="463645">
+                <a:tc>
+                  <a:txBody>
+                    <a:bodyPr/>
+                    <a:lstStyle/>
+                    <a:p>
+                      <a:pPr algn="l" fontAlgn="b"/>
+                      <a:r>
+                        <a:rPr lang="en-CA" sz="2400" u="none" strike="noStrike" dirty="0">
+                          <a:effectLst/>
+                        </a:rPr>
+                        <a:t>Olga Agady</a:t>
+                      </a:r>
+                      <a:endParaRPr lang="en-CA" sz="2400" b="0" i="0" u="none" strike="noStrike" dirty="0">
+                        <a:solidFill>
+                          <a:srgbClr val="000000"/>
+                        </a:solidFill>
+                        <a:effectLst/>
+                        <a:latin typeface="Calibri" panose="020F0502020204030204" pitchFamily="34" charset="0"/>
+                      </a:endParaRPr>
+                    </a:p>
+                  </a:txBody>
+                  <a:tcPr marL="9525" marR="9525" marT="9525" marB="0" anchor="b"/>
+                </a:tc>
+                <a:tc>
+                  <a:txBody>
+                    <a:bodyPr/>
+                    <a:lstStyle/>
+                    <a:p>
+                      <a:pPr algn="l" fontAlgn="b"/>
+                      <a:r>
+                        <a:rPr lang="en-CA" sz="2400" u="none" strike="noStrike" dirty="0">
+                          <a:effectLst/>
+                        </a:rPr>
+                        <a:t>Integration with Box.com</a:t>
+                      </a:r>
+                      <a:endParaRPr lang="en-CA" sz="2400" b="0" i="0" u="none" strike="noStrike" dirty="0">
+                        <a:solidFill>
+                          <a:srgbClr val="000000"/>
+                        </a:solidFill>
+                        <a:effectLst/>
+                        <a:latin typeface="Calibri" panose="020F0502020204030204" pitchFamily="34" charset="0"/>
+                      </a:endParaRPr>
+                    </a:p>
+                  </a:txBody>
+                  <a:tcPr marL="9525" marR="9525" marT="9525" marB="0" anchor="b"/>
+                </a:tc>
+                <a:tc>
+                  <a:txBody>
+                    <a:bodyPr/>
+                    <a:lstStyle/>
+                    <a:p>
+                      <a:pPr algn="l" fontAlgn="b"/>
+                      <a:r>
+                        <a:rPr lang="en-CA" sz="2400" u="none" strike="noStrike">
+                          <a:effectLst/>
+                        </a:rPr>
+                        <a:t>5 minutes</a:t>
+                      </a:r>
+                      <a:endParaRPr lang="en-CA" sz="2400" b="0" i="0" u="none" strike="noStrike">
+                        <a:solidFill>
+                          <a:srgbClr val="000000"/>
+                        </a:solidFill>
+                        <a:effectLst/>
+                        <a:latin typeface="Calibri" panose="020F0502020204030204" pitchFamily="34" charset="0"/>
+                      </a:endParaRPr>
+                    </a:p>
+                  </a:txBody>
+                  <a:tcPr marL="9525" marR="9525" marT="9525" marB="0" anchor="b"/>
+                </a:tc>
+                <a:extLst>
+                  <a:ext uri="{0D108BD9-81ED-4DB2-BD59-A6C34878D82A}">
+                    <a16:rowId xmlns:a16="http://schemas.microsoft.com/office/drawing/2014/main" val="4252439213"/>
+                  </a:ext>
+                </a:extLst>
+              </a:tr>
+              <a:tr h="463645">
+                <a:tc>
+                  <a:txBody>
+                    <a:bodyPr/>
+                    <a:lstStyle/>
+                    <a:p>
+                      <a:pPr algn="l" fontAlgn="b"/>
+                      <a:r>
+                        <a:rPr lang="en-CA" sz="2400" u="none" strike="noStrike">
+                          <a:effectLst/>
+                        </a:rPr>
+                        <a:t>Anita Wong</a:t>
+                      </a:r>
+                      <a:endParaRPr lang="en-CA" sz="2400" b="0" i="0" u="none" strike="noStrike">
+                        <a:solidFill>
+                          <a:srgbClr val="000000"/>
+                        </a:solidFill>
+                        <a:effectLst/>
+                        <a:latin typeface="Calibri" panose="020F0502020204030204" pitchFamily="34" charset="0"/>
+                      </a:endParaRPr>
+                    </a:p>
+                  </a:txBody>
+                  <a:tcPr marL="9525" marR="9525" marT="9525" marB="0" anchor="b"/>
+                </a:tc>
+                <a:tc>
+                  <a:txBody>
+                    <a:bodyPr/>
+                    <a:lstStyle/>
+                    <a:p>
+                      <a:pPr algn="l" fontAlgn="b"/>
+                      <a:r>
+                        <a:rPr lang="en-CA" sz="2400" u="none" strike="noStrike" dirty="0">
+                          <a:effectLst/>
+                        </a:rPr>
+                        <a:t>FMS Upgrade Update</a:t>
+                      </a:r>
+                      <a:endParaRPr lang="en-CA" sz="2400" b="0" i="0" u="none" strike="noStrike" dirty="0">
+                        <a:solidFill>
+                          <a:srgbClr val="000000"/>
+                        </a:solidFill>
+                        <a:effectLst/>
+                        <a:latin typeface="Calibri" panose="020F0502020204030204" pitchFamily="34" charset="0"/>
+                      </a:endParaRPr>
+                    </a:p>
+                  </a:txBody>
+                  <a:tcPr marL="9525" marR="9525" marT="9525" marB="0" anchor="b"/>
+                </a:tc>
+                <a:tc>
+                  <a:txBody>
+                    <a:bodyPr/>
+                    <a:lstStyle/>
+                    <a:p>
+                      <a:pPr algn="l" fontAlgn="b"/>
+                      <a:r>
+                        <a:rPr lang="en-CA" sz="2400" u="none" strike="noStrike">
+                          <a:effectLst/>
+                        </a:rPr>
+                        <a:t>5 minutes</a:t>
+                      </a:r>
+                      <a:endParaRPr lang="en-CA" sz="2400" b="0" i="0" u="none" strike="noStrike">
+                        <a:solidFill>
+                          <a:srgbClr val="000000"/>
+                        </a:solidFill>
+                        <a:effectLst/>
+                        <a:latin typeface="Calibri" panose="020F0502020204030204" pitchFamily="34" charset="0"/>
+                      </a:endParaRPr>
+                    </a:p>
+                  </a:txBody>
+                  <a:tcPr marL="9525" marR="9525" marT="9525" marB="0" anchor="b"/>
+                </a:tc>
+                <a:extLst>
+                  <a:ext uri="{0D108BD9-81ED-4DB2-BD59-A6C34878D82A}">
+                    <a16:rowId xmlns:a16="http://schemas.microsoft.com/office/drawing/2014/main" val="2455710005"/>
+                  </a:ext>
+                </a:extLst>
+              </a:tr>
+              <a:tr h="463645">
+                <a:tc>
+                  <a:txBody>
+                    <a:bodyPr/>
+                    <a:lstStyle/>
+                    <a:p>
+                      <a:pPr algn="l" fontAlgn="b"/>
+                      <a:r>
+                        <a:rPr lang="en-CA" sz="2400" u="none" strike="noStrike">
+                          <a:effectLst/>
+                        </a:rPr>
+                        <a:t>Senthil/Melissa</a:t>
+                      </a:r>
+                      <a:endParaRPr lang="en-CA" sz="2400" b="0" i="0" u="none" strike="noStrike">
+                        <a:solidFill>
+                          <a:srgbClr val="000000"/>
+                        </a:solidFill>
+                        <a:effectLst/>
+                        <a:latin typeface="Calibri" panose="020F0502020204030204" pitchFamily="34" charset="0"/>
+                      </a:endParaRPr>
+                    </a:p>
+                  </a:txBody>
+                  <a:tcPr marL="9525" marR="9525" marT="9525" marB="0" anchor="b"/>
+                </a:tc>
+                <a:tc>
+                  <a:txBody>
+                    <a:bodyPr/>
+                    <a:lstStyle/>
+                    <a:p>
+                      <a:pPr algn="l" fontAlgn="b"/>
+                      <a:r>
+                        <a:rPr lang="en-CA" sz="2400" u="none" strike="noStrike" dirty="0">
+                          <a:effectLst/>
+                        </a:rPr>
+                        <a:t>Digitalization Team Update</a:t>
+                      </a:r>
+                      <a:endParaRPr lang="en-CA" sz="2400" b="0" i="0" u="none" strike="noStrike" dirty="0">
+                        <a:solidFill>
+                          <a:srgbClr val="000000"/>
+                        </a:solidFill>
+                        <a:effectLst/>
+                        <a:latin typeface="Calibri" panose="020F0502020204030204" pitchFamily="34" charset="0"/>
+                      </a:endParaRPr>
+                    </a:p>
+                  </a:txBody>
+                  <a:tcPr marL="9525" marR="9525" marT="9525" marB="0" anchor="b"/>
+                </a:tc>
+                <a:tc>
+                  <a:txBody>
+                    <a:bodyPr/>
+                    <a:lstStyle/>
+                    <a:p>
+                      <a:pPr algn="l" fontAlgn="b"/>
+                      <a:r>
+                        <a:rPr lang="en-CA" sz="2400" u="none" strike="noStrike">
+                          <a:effectLst/>
+                        </a:rPr>
+                        <a:t>10 minutes</a:t>
+                      </a:r>
+                      <a:endParaRPr lang="en-CA" sz="2400" b="0" i="0" u="none" strike="noStrike">
+                        <a:solidFill>
+                          <a:srgbClr val="000000"/>
+                        </a:solidFill>
+                        <a:effectLst/>
+                        <a:latin typeface="Calibri" panose="020F0502020204030204" pitchFamily="34" charset="0"/>
+                      </a:endParaRPr>
+                    </a:p>
+                  </a:txBody>
+                  <a:tcPr marL="9525" marR="9525" marT="9525" marB="0" anchor="b"/>
+                </a:tc>
+                <a:extLst>
+                  <a:ext uri="{0D108BD9-81ED-4DB2-BD59-A6C34878D82A}">
+                    <a16:rowId xmlns:a16="http://schemas.microsoft.com/office/drawing/2014/main" val="4216602696"/>
+                  </a:ext>
+                </a:extLst>
+              </a:tr>
+              <a:tr h="463645">
+                <a:tc>
+                  <a:txBody>
+                    <a:bodyPr/>
+                    <a:lstStyle/>
+                    <a:p>
+                      <a:pPr algn="l" fontAlgn="b"/>
+                      <a:r>
+                        <a:rPr lang="en-CA" sz="2400" u="none" strike="noStrike">
+                          <a:effectLst/>
+                        </a:rPr>
+                        <a:t>Andrew</a:t>
+                      </a:r>
+                      <a:endParaRPr lang="en-CA" sz="2400" b="0" i="0" u="none" strike="noStrike">
+                        <a:solidFill>
+                          <a:srgbClr val="000000"/>
+                        </a:solidFill>
+                        <a:effectLst/>
+                        <a:latin typeface="Calibri" panose="020F0502020204030204" pitchFamily="34" charset="0"/>
+                      </a:endParaRPr>
+                    </a:p>
+                  </a:txBody>
+                  <a:tcPr marL="9525" marR="9525" marT="9525" marB="0" anchor="b"/>
+                </a:tc>
+                <a:tc>
+                  <a:txBody>
+                    <a:bodyPr/>
+                    <a:lstStyle/>
+                    <a:p>
+                      <a:pPr algn="l" fontAlgn="b"/>
+                      <a:r>
+                        <a:rPr lang="en-CA" sz="2400" u="none" strike="noStrike" dirty="0">
+                          <a:effectLst/>
+                        </a:rPr>
+                        <a:t>RA</a:t>
+                      </a:r>
+                      <a:endParaRPr lang="en-CA" sz="2400" b="0" i="0" u="none" strike="noStrike" dirty="0">
+                        <a:solidFill>
+                          <a:srgbClr val="000000"/>
+                        </a:solidFill>
+                        <a:effectLst/>
+                        <a:latin typeface="Calibri" panose="020F0502020204030204" pitchFamily="34" charset="0"/>
+                      </a:endParaRPr>
+                    </a:p>
+                  </a:txBody>
+                  <a:tcPr marL="9525" marR="9525" marT="9525" marB="0" anchor="b"/>
+                </a:tc>
+                <a:tc>
+                  <a:txBody>
+                    <a:bodyPr/>
+                    <a:lstStyle/>
+                    <a:p>
+                      <a:pPr algn="l" fontAlgn="b"/>
+                      <a:r>
+                        <a:rPr lang="en-CA" sz="2400" u="none" strike="noStrike">
+                          <a:effectLst/>
+                        </a:rPr>
+                        <a:t>5 minutes</a:t>
+                      </a:r>
+                      <a:endParaRPr lang="en-CA" sz="2400" b="0" i="0" u="none" strike="noStrike">
+                        <a:solidFill>
+                          <a:srgbClr val="000000"/>
+                        </a:solidFill>
+                        <a:effectLst/>
+                        <a:latin typeface="Calibri" panose="020F0502020204030204" pitchFamily="34" charset="0"/>
+                      </a:endParaRPr>
+                    </a:p>
+                  </a:txBody>
+                  <a:tcPr marL="9525" marR="9525" marT="9525" marB="0" anchor="b"/>
+                </a:tc>
+                <a:extLst>
+                  <a:ext uri="{0D108BD9-81ED-4DB2-BD59-A6C34878D82A}">
+                    <a16:rowId xmlns:a16="http://schemas.microsoft.com/office/drawing/2014/main" val="1968877804"/>
+                  </a:ext>
+                </a:extLst>
+              </a:tr>
+              <a:tr h="463645">
+                <a:tc>
+                  <a:txBody>
+                    <a:bodyPr/>
+                    <a:lstStyle/>
+                    <a:p>
+                      <a:pPr algn="l" fontAlgn="b"/>
+                      <a:r>
+                        <a:rPr lang="en-CA" sz="2400" u="none" strike="noStrike">
+                          <a:effectLst/>
+                        </a:rPr>
+                        <a:t>Laura</a:t>
+                      </a:r>
+                      <a:endParaRPr lang="en-CA" sz="2400" b="0" i="0" u="none" strike="noStrike">
+                        <a:solidFill>
+                          <a:srgbClr val="000000"/>
+                        </a:solidFill>
+                        <a:effectLst/>
+                        <a:latin typeface="Calibri" panose="020F0502020204030204" pitchFamily="34" charset="0"/>
+                      </a:endParaRPr>
+                    </a:p>
+                  </a:txBody>
+                  <a:tcPr marL="9525" marR="9525" marT="9525" marB="0" anchor="b"/>
+                </a:tc>
+                <a:tc>
+                  <a:txBody>
+                    <a:bodyPr/>
+                    <a:lstStyle/>
+                    <a:p>
+                      <a:pPr algn="l" fontAlgn="b"/>
+                      <a:r>
+                        <a:rPr lang="en-CA" sz="2400" u="none" strike="noStrike" dirty="0">
+                          <a:effectLst/>
+                        </a:rPr>
+                        <a:t>VBS</a:t>
+                      </a:r>
+                      <a:endParaRPr lang="en-CA" sz="2400" b="0" i="0" u="none" strike="noStrike" dirty="0">
+                        <a:solidFill>
+                          <a:srgbClr val="000000"/>
+                        </a:solidFill>
+                        <a:effectLst/>
+                        <a:latin typeface="Calibri" panose="020F0502020204030204" pitchFamily="34" charset="0"/>
+                      </a:endParaRPr>
+                    </a:p>
+                  </a:txBody>
+                  <a:tcPr marL="9525" marR="9525" marT="9525" marB="0" anchor="b"/>
+                </a:tc>
+                <a:tc>
+                  <a:txBody>
+                    <a:bodyPr/>
+                    <a:lstStyle/>
+                    <a:p>
+                      <a:pPr algn="l" fontAlgn="b"/>
+                      <a:r>
+                        <a:rPr lang="en-CA" sz="2400" u="none" strike="noStrike" dirty="0">
+                          <a:effectLst/>
+                        </a:rPr>
+                        <a:t>5 minutes</a:t>
+                      </a:r>
+                      <a:endParaRPr lang="en-CA" sz="2400" b="0" i="0" u="none" strike="noStrike" dirty="0">
+                        <a:solidFill>
+                          <a:srgbClr val="000000"/>
+                        </a:solidFill>
+                        <a:effectLst/>
+                        <a:latin typeface="Calibri" panose="020F0502020204030204" pitchFamily="34" charset="0"/>
+                      </a:endParaRPr>
+                    </a:p>
+                  </a:txBody>
+                  <a:tcPr marL="9525" marR="9525" marT="9525" marB="0" anchor="b"/>
+                </a:tc>
+                <a:extLst>
+                  <a:ext uri="{0D108BD9-81ED-4DB2-BD59-A6C34878D82A}">
+                    <a16:rowId xmlns:a16="http://schemas.microsoft.com/office/drawing/2014/main" val="238770617"/>
+                  </a:ext>
+                </a:extLst>
+              </a:tr>
+              <a:tr h="486827">
+                <a:tc>
+                  <a:txBody>
+                    <a:bodyPr/>
+                    <a:lstStyle/>
+                    <a:p>
+                      <a:pPr algn="l" fontAlgn="b"/>
+                      <a:r>
+                        <a:rPr lang="en-CA" sz="2400" u="none" strike="noStrike">
+                          <a:effectLst/>
+                        </a:rPr>
+                        <a:t>Shazi</a:t>
+                      </a:r>
+                      <a:endParaRPr lang="en-CA" sz="2400" b="0" i="0" u="none" strike="noStrike">
+                        <a:solidFill>
+                          <a:srgbClr val="000000"/>
+                        </a:solidFill>
+                        <a:effectLst/>
+                        <a:latin typeface="Calibri" panose="020F0502020204030204" pitchFamily="34" charset="0"/>
+                      </a:endParaRPr>
+                    </a:p>
+                  </a:txBody>
+                  <a:tcPr marL="9525" marR="9525" marT="9525" marB="0" anchor="b"/>
+                </a:tc>
+                <a:tc>
+                  <a:txBody>
+                    <a:bodyPr/>
+                    <a:lstStyle/>
+                    <a:p>
+                      <a:pPr algn="l" fontAlgn="b"/>
+                      <a:r>
+                        <a:rPr lang="en-CA" sz="2400" u="none" strike="noStrike">
+                          <a:effectLst/>
+                        </a:rPr>
+                        <a:t>UCS Migration Tech Team</a:t>
+                      </a:r>
+                      <a:endParaRPr lang="en-CA" sz="2400" b="0" i="0" u="none" strike="noStrike">
+                        <a:solidFill>
+                          <a:srgbClr val="000000"/>
+                        </a:solidFill>
+                        <a:effectLst/>
+                        <a:latin typeface="Calibri" panose="020F0502020204030204" pitchFamily="34" charset="0"/>
+                      </a:endParaRPr>
+                    </a:p>
+                  </a:txBody>
+                  <a:tcPr marL="9525" marR="9525" marT="9525" marB="0" anchor="b"/>
+                </a:tc>
+                <a:tc>
+                  <a:txBody>
+                    <a:bodyPr/>
+                    <a:lstStyle/>
+                    <a:p>
+                      <a:pPr algn="l" fontAlgn="b"/>
+                      <a:r>
+                        <a:rPr lang="en-CA" sz="2400" u="none" strike="noStrike" dirty="0">
+                          <a:effectLst/>
+                        </a:rPr>
+                        <a:t>5 minutes</a:t>
+                      </a:r>
+                      <a:endParaRPr lang="en-CA" sz="2400" b="0" i="0" u="none" strike="noStrike" dirty="0">
+                        <a:solidFill>
+                          <a:srgbClr val="000000"/>
+                        </a:solidFill>
+                        <a:effectLst/>
+                        <a:latin typeface="Calibri" panose="020F0502020204030204" pitchFamily="34" charset="0"/>
+                      </a:endParaRPr>
+                    </a:p>
+                  </a:txBody>
+                  <a:tcPr marL="9525" marR="9525" marT="9525" marB="0" anchor="b"/>
+                </a:tc>
+                <a:extLst>
+                  <a:ext uri="{0D108BD9-81ED-4DB2-BD59-A6C34878D82A}">
+                    <a16:rowId xmlns:a16="http://schemas.microsoft.com/office/drawing/2014/main" val="3100988991"/>
                   </a:ext>
                 </a:extLst>
               </a:tr>
@@ -4939,6 +5548,1115 @@
 </file>
 
 <file path=ppt/slides/slide4.xml><?xml version="1.0" encoding="utf-8"?>
+<p:sld xmlns:a="http://schemas.openxmlformats.org/drawingml/2006/main" xmlns:r="http://schemas.openxmlformats.org/officeDocument/2006/relationships" xmlns:p="http://schemas.openxmlformats.org/presentationml/2006/main">
+  <p:cSld>
+    <p:spTree>
+      <p:nvGrpSpPr>
+        <p:cNvPr id="1" name=""/>
+        <p:cNvGrpSpPr/>
+        <p:nvPr/>
+      </p:nvGrpSpPr>
+      <p:grpSpPr>
+        <a:xfrm>
+          <a:off x="0" y="0"/>
+          <a:ext cx="0" cy="0"/>
+          <a:chOff x="0" y="0"/>
+          <a:chExt cx="0" cy="0"/>
+        </a:xfrm>
+      </p:grpSpPr>
+      <p:pic>
+        <p:nvPicPr>
+          <p:cNvPr id="5" name="Graphic 4" descr="Man">
+            <a:extLst>
+              <a:ext uri="{FF2B5EF4-FFF2-40B4-BE49-F238E27FC236}">
+                <a16:creationId xmlns:a16="http://schemas.microsoft.com/office/drawing/2014/main" id="{E60CE0D6-1D8D-4DF7-A191-2E2C2A41081C}"/>
+              </a:ext>
+            </a:extLst>
+          </p:cNvPr>
+          <p:cNvPicPr>
+            <a:picLocks noChangeAspect="1"/>
+          </p:cNvPicPr>
+          <p:nvPr/>
+        </p:nvPicPr>
+        <p:blipFill>
+          <a:blip r:embed="rId2">
+            <a:extLst>
+              <a:ext uri="{28A0092B-C50C-407E-A947-70E740481C1C}">
+                <a14:useLocalDpi xmlns:a14="http://schemas.microsoft.com/office/drawing/2010/main" val="0"/>
+              </a:ext>
+              <a:ext uri="{96DAC541-7B7A-43D3-8B79-37D633B846F1}">
+                <asvg:svgBlip xmlns:asvg="http://schemas.microsoft.com/office/drawing/2016/SVG/main" r:embed="rId3"/>
+              </a:ext>
+            </a:extLst>
+          </a:blip>
+          <a:stretch>
+            <a:fillRect/>
+          </a:stretch>
+        </p:blipFill>
+        <p:spPr>
+          <a:xfrm>
+            <a:off x="1733341" y="4112776"/>
+            <a:ext cx="914400" cy="914400"/>
+          </a:xfrm>
+          <a:prstGeom prst="rect">
+            <a:avLst/>
+          </a:prstGeom>
+        </p:spPr>
+      </p:pic>
+      <p:pic>
+        <p:nvPicPr>
+          <p:cNvPr id="6" name="Graphic 5" descr="Man">
+            <a:extLst>
+              <a:ext uri="{FF2B5EF4-FFF2-40B4-BE49-F238E27FC236}">
+                <a16:creationId xmlns:a16="http://schemas.microsoft.com/office/drawing/2014/main" id="{813164F5-3500-4A19-96DD-D576249F7F06}"/>
+              </a:ext>
+            </a:extLst>
+          </p:cNvPr>
+          <p:cNvPicPr>
+            <a:picLocks noChangeAspect="1"/>
+          </p:cNvPicPr>
+          <p:nvPr/>
+        </p:nvPicPr>
+        <p:blipFill>
+          <a:blip r:embed="rId2">
+            <a:extLst>
+              <a:ext uri="{28A0092B-C50C-407E-A947-70E740481C1C}">
+                <a14:useLocalDpi xmlns:a14="http://schemas.microsoft.com/office/drawing/2010/main" val="0"/>
+              </a:ext>
+              <a:ext uri="{96DAC541-7B7A-43D3-8B79-37D633B846F1}">
+                <asvg:svgBlip xmlns:asvg="http://schemas.microsoft.com/office/drawing/2016/SVG/main" r:embed="rId3"/>
+              </a:ext>
+            </a:extLst>
+          </a:blip>
+          <a:stretch>
+            <a:fillRect/>
+          </a:stretch>
+        </p:blipFill>
+        <p:spPr>
+          <a:xfrm>
+            <a:off x="9091270" y="2833379"/>
+            <a:ext cx="914400" cy="914400"/>
+          </a:xfrm>
+          <a:prstGeom prst="rect">
+            <a:avLst/>
+          </a:prstGeom>
+        </p:spPr>
+      </p:pic>
+      <p:sp>
+        <p:nvSpPr>
+          <p:cNvPr id="7" name="Rectangle 6">
+            <a:extLst>
+              <a:ext uri="{FF2B5EF4-FFF2-40B4-BE49-F238E27FC236}">
+                <a16:creationId xmlns:a16="http://schemas.microsoft.com/office/drawing/2014/main" id="{D253062A-9F55-49BA-82E4-48AB505A8DB6}"/>
+              </a:ext>
+            </a:extLst>
+          </p:cNvPr>
+          <p:cNvSpPr/>
+          <p:nvPr/>
+        </p:nvSpPr>
+        <p:spPr>
+          <a:xfrm>
+            <a:off x="1182713" y="2404200"/>
+            <a:ext cx="2007197" cy="762195"/>
+          </a:xfrm>
+          <a:prstGeom prst="rect">
+            <a:avLst/>
+          </a:prstGeom>
+          <a:solidFill>
+            <a:schemeClr val="accent1">
+              <a:lumMod val="60000"/>
+              <a:lumOff val="40000"/>
+            </a:schemeClr>
+          </a:solidFill>
+        </p:spPr>
+        <p:style>
+          <a:lnRef idx="2">
+            <a:schemeClr val="accent1">
+              <a:shade val="50000"/>
+            </a:schemeClr>
+          </a:lnRef>
+          <a:fillRef idx="1">
+            <a:schemeClr val="accent1"/>
+          </a:fillRef>
+          <a:effectRef idx="0">
+            <a:schemeClr val="accent1"/>
+          </a:effectRef>
+          <a:fontRef idx="minor">
+            <a:schemeClr val="lt1"/>
+          </a:fontRef>
+        </p:style>
+        <p:txBody>
+          <a:bodyPr rtlCol="0" anchor="ctr"/>
+          <a:lstStyle/>
+          <a:p>
+            <a:pPr algn="ctr"/>
+            <a:endParaRPr lang="en-CA"/>
+          </a:p>
+        </p:txBody>
+      </p:sp>
+      <p:cxnSp>
+        <p:nvCxnSpPr>
+          <p:cNvPr id="9" name="Straight Arrow Connector 8">
+            <a:extLst>
+              <a:ext uri="{FF2B5EF4-FFF2-40B4-BE49-F238E27FC236}">
+                <a16:creationId xmlns:a16="http://schemas.microsoft.com/office/drawing/2014/main" id="{5F15FBB8-871F-4112-8FE7-1A6F86E268CA}"/>
+              </a:ext>
+            </a:extLst>
+          </p:cNvPr>
+          <p:cNvCxnSpPr>
+            <a:cxnSpLocks/>
+          </p:cNvCxnSpPr>
+          <p:nvPr/>
+        </p:nvCxnSpPr>
+        <p:spPr>
+          <a:xfrm flipV="1">
+            <a:off x="2190541" y="3227885"/>
+            <a:ext cx="0" cy="829855"/>
+          </a:xfrm>
+          <a:prstGeom prst="straightConnector1">
+            <a:avLst/>
+          </a:prstGeom>
+          <a:ln w="28575">
+            <a:tailEnd type="triangle"/>
+          </a:ln>
+        </p:spPr>
+        <p:style>
+          <a:lnRef idx="1">
+            <a:schemeClr val="accent1"/>
+          </a:lnRef>
+          <a:fillRef idx="0">
+            <a:schemeClr val="accent1"/>
+          </a:fillRef>
+          <a:effectRef idx="0">
+            <a:schemeClr val="accent1"/>
+          </a:effectRef>
+          <a:fontRef idx="minor">
+            <a:schemeClr val="tx1"/>
+          </a:fontRef>
+        </p:style>
+      </p:cxnSp>
+      <p:cxnSp>
+        <p:nvCxnSpPr>
+          <p:cNvPr id="10" name="Straight Arrow Connector 9">
+            <a:extLst>
+              <a:ext uri="{FF2B5EF4-FFF2-40B4-BE49-F238E27FC236}">
+                <a16:creationId xmlns:a16="http://schemas.microsoft.com/office/drawing/2014/main" id="{61F42D30-250A-4A81-94D4-869ADD0B4A85}"/>
+              </a:ext>
+            </a:extLst>
+          </p:cNvPr>
+          <p:cNvCxnSpPr>
+            <a:cxnSpLocks/>
+          </p:cNvCxnSpPr>
+          <p:nvPr/>
+        </p:nvCxnSpPr>
+        <p:spPr>
+          <a:xfrm flipV="1">
+            <a:off x="2879408" y="1720442"/>
+            <a:ext cx="1819808" cy="614084"/>
+          </a:xfrm>
+          <a:prstGeom prst="straightConnector1">
+            <a:avLst/>
+          </a:prstGeom>
+          <a:ln w="28575">
+            <a:tailEnd type="triangle"/>
+          </a:ln>
+        </p:spPr>
+        <p:style>
+          <a:lnRef idx="1">
+            <a:schemeClr val="accent1"/>
+          </a:lnRef>
+          <a:fillRef idx="0">
+            <a:schemeClr val="accent1"/>
+          </a:fillRef>
+          <a:effectRef idx="0">
+            <a:schemeClr val="accent1"/>
+          </a:effectRef>
+          <a:fontRef idx="minor">
+            <a:schemeClr val="tx1"/>
+          </a:fontRef>
+        </p:style>
+      </p:cxnSp>
+      <p:sp>
+        <p:nvSpPr>
+          <p:cNvPr id="12" name="Rectangle 11">
+            <a:extLst>
+              <a:ext uri="{FF2B5EF4-FFF2-40B4-BE49-F238E27FC236}">
+                <a16:creationId xmlns:a16="http://schemas.microsoft.com/office/drawing/2014/main" id="{293A1C9D-4DA0-490E-82FC-2CF3962A5314}"/>
+              </a:ext>
+            </a:extLst>
+          </p:cNvPr>
+          <p:cNvSpPr/>
+          <p:nvPr/>
+        </p:nvSpPr>
+        <p:spPr>
+          <a:xfrm>
+            <a:off x="4719744" y="1401819"/>
+            <a:ext cx="2095053" cy="738665"/>
+          </a:xfrm>
+          <a:prstGeom prst="rect">
+            <a:avLst/>
+          </a:prstGeom>
+          <a:solidFill>
+            <a:schemeClr val="accent1">
+              <a:lumMod val="60000"/>
+              <a:lumOff val="40000"/>
+            </a:schemeClr>
+          </a:solidFill>
+        </p:spPr>
+        <p:style>
+          <a:lnRef idx="2">
+            <a:schemeClr val="accent1">
+              <a:shade val="50000"/>
+            </a:schemeClr>
+          </a:lnRef>
+          <a:fillRef idx="1">
+            <a:schemeClr val="accent1"/>
+          </a:fillRef>
+          <a:effectRef idx="0">
+            <a:schemeClr val="accent1"/>
+          </a:effectRef>
+          <a:fontRef idx="minor">
+            <a:schemeClr val="lt1"/>
+          </a:fontRef>
+        </p:style>
+        <p:txBody>
+          <a:bodyPr rtlCol="0" anchor="ctr"/>
+          <a:lstStyle/>
+          <a:p>
+            <a:pPr algn="ctr"/>
+            <a:endParaRPr lang="en-CA"/>
+          </a:p>
+        </p:txBody>
+      </p:sp>
+      <p:sp>
+        <p:nvSpPr>
+          <p:cNvPr id="13" name="Rectangle 12">
+            <a:extLst>
+              <a:ext uri="{FF2B5EF4-FFF2-40B4-BE49-F238E27FC236}">
+                <a16:creationId xmlns:a16="http://schemas.microsoft.com/office/drawing/2014/main" id="{505288B0-BABE-4E7F-8FB3-D763F4181CDF}"/>
+              </a:ext>
+            </a:extLst>
+          </p:cNvPr>
+          <p:cNvSpPr/>
+          <p:nvPr/>
+        </p:nvSpPr>
+        <p:spPr>
+          <a:xfrm>
+            <a:off x="4069307" y="4057739"/>
+            <a:ext cx="1902429" cy="658698"/>
+          </a:xfrm>
+          <a:prstGeom prst="rect">
+            <a:avLst/>
+          </a:prstGeom>
+          <a:solidFill>
+            <a:schemeClr val="accent1">
+              <a:lumMod val="60000"/>
+              <a:lumOff val="40000"/>
+            </a:schemeClr>
+          </a:solidFill>
+        </p:spPr>
+        <p:style>
+          <a:lnRef idx="2">
+            <a:schemeClr val="accent1">
+              <a:shade val="50000"/>
+            </a:schemeClr>
+          </a:lnRef>
+          <a:fillRef idx="1">
+            <a:schemeClr val="accent1"/>
+          </a:fillRef>
+          <a:effectRef idx="0">
+            <a:schemeClr val="accent1"/>
+          </a:effectRef>
+          <a:fontRef idx="minor">
+            <a:schemeClr val="lt1"/>
+          </a:fontRef>
+        </p:style>
+        <p:txBody>
+          <a:bodyPr rtlCol="0" anchor="ctr"/>
+          <a:lstStyle/>
+          <a:p>
+            <a:pPr algn="ctr"/>
+            <a:endParaRPr lang="en-CA"/>
+          </a:p>
+        </p:txBody>
+      </p:sp>
+      <p:pic>
+        <p:nvPicPr>
+          <p:cNvPr id="15" name="Graphic 14" descr="Single gear">
+            <a:extLst>
+              <a:ext uri="{FF2B5EF4-FFF2-40B4-BE49-F238E27FC236}">
+                <a16:creationId xmlns:a16="http://schemas.microsoft.com/office/drawing/2014/main" id="{25E08813-43A0-4730-9C01-B9A7112DF097}"/>
+              </a:ext>
+            </a:extLst>
+          </p:cNvPr>
+          <p:cNvPicPr>
+            <a:picLocks noChangeAspect="1"/>
+          </p:cNvPicPr>
+          <p:nvPr/>
+        </p:nvPicPr>
+        <p:blipFill>
+          <a:blip r:embed="rId4">
+            <a:extLst>
+              <a:ext uri="{28A0092B-C50C-407E-A947-70E740481C1C}">
+                <a14:useLocalDpi xmlns:a14="http://schemas.microsoft.com/office/drawing/2010/main" val="0"/>
+              </a:ext>
+              <a:ext uri="{96DAC541-7B7A-43D3-8B79-37D633B846F1}">
+                <asvg:svgBlip xmlns:asvg="http://schemas.microsoft.com/office/drawing/2016/SVG/main" r:embed="rId5"/>
+              </a:ext>
+            </a:extLst>
+          </a:blip>
+          <a:stretch>
+            <a:fillRect/>
+          </a:stretch>
+        </p:blipFill>
+        <p:spPr>
+          <a:xfrm>
+            <a:off x="5267538" y="4139135"/>
+            <a:ext cx="548062" cy="548062"/>
+          </a:xfrm>
+          <a:prstGeom prst="rect">
+            <a:avLst/>
+          </a:prstGeom>
+        </p:spPr>
+      </p:pic>
+      <p:cxnSp>
+        <p:nvCxnSpPr>
+          <p:cNvPr id="16" name="Straight Arrow Connector 15">
+            <a:extLst>
+              <a:ext uri="{FF2B5EF4-FFF2-40B4-BE49-F238E27FC236}">
+                <a16:creationId xmlns:a16="http://schemas.microsoft.com/office/drawing/2014/main" id="{07052BDA-00F2-4977-91AC-4F3897F10BDD}"/>
+              </a:ext>
+            </a:extLst>
+          </p:cNvPr>
+          <p:cNvCxnSpPr>
+            <a:cxnSpLocks/>
+          </p:cNvCxnSpPr>
+          <p:nvPr/>
+        </p:nvCxnSpPr>
+        <p:spPr>
+          <a:xfrm>
+            <a:off x="7069362" y="1771151"/>
+            <a:ext cx="2165279" cy="1045777"/>
+          </a:xfrm>
+          <a:prstGeom prst="straightConnector1">
+            <a:avLst/>
+          </a:prstGeom>
+          <a:ln w="28575">
+            <a:tailEnd type="triangle"/>
+          </a:ln>
+        </p:spPr>
+        <p:style>
+          <a:lnRef idx="1">
+            <a:schemeClr val="accent1"/>
+          </a:lnRef>
+          <a:fillRef idx="0">
+            <a:schemeClr val="accent1"/>
+          </a:fillRef>
+          <a:effectRef idx="0">
+            <a:schemeClr val="accent1"/>
+          </a:effectRef>
+          <a:fontRef idx="minor">
+            <a:schemeClr val="tx1"/>
+          </a:fontRef>
+        </p:style>
+      </p:cxnSp>
+      <p:cxnSp>
+        <p:nvCxnSpPr>
+          <p:cNvPr id="18" name="Straight Arrow Connector 17">
+            <a:extLst>
+              <a:ext uri="{FF2B5EF4-FFF2-40B4-BE49-F238E27FC236}">
+                <a16:creationId xmlns:a16="http://schemas.microsoft.com/office/drawing/2014/main" id="{1951EAF5-CA06-4434-AFCB-62526B8998D6}"/>
+              </a:ext>
+            </a:extLst>
+          </p:cNvPr>
+          <p:cNvCxnSpPr>
+            <a:cxnSpLocks/>
+          </p:cNvCxnSpPr>
+          <p:nvPr/>
+        </p:nvCxnSpPr>
+        <p:spPr>
+          <a:xfrm flipH="1" flipV="1">
+            <a:off x="7001094" y="2055857"/>
+            <a:ext cx="2047250" cy="988480"/>
+          </a:xfrm>
+          <a:prstGeom prst="straightConnector1">
+            <a:avLst/>
+          </a:prstGeom>
+          <a:ln w="28575">
+            <a:tailEnd type="triangle"/>
+          </a:ln>
+        </p:spPr>
+        <p:style>
+          <a:lnRef idx="1">
+            <a:schemeClr val="accent1"/>
+          </a:lnRef>
+          <a:fillRef idx="0">
+            <a:schemeClr val="accent1"/>
+          </a:fillRef>
+          <a:effectRef idx="0">
+            <a:schemeClr val="accent1"/>
+          </a:effectRef>
+          <a:fontRef idx="minor">
+            <a:schemeClr val="tx1"/>
+          </a:fontRef>
+        </p:style>
+      </p:cxnSp>
+      <p:sp>
+        <p:nvSpPr>
+          <p:cNvPr id="24" name="TextBox 23">
+            <a:extLst>
+              <a:ext uri="{FF2B5EF4-FFF2-40B4-BE49-F238E27FC236}">
+                <a16:creationId xmlns:a16="http://schemas.microsoft.com/office/drawing/2014/main" id="{7B5BCA10-A787-4BCD-8739-AEAE076552C5}"/>
+              </a:ext>
+            </a:extLst>
+          </p:cNvPr>
+          <p:cNvSpPr txBox="1"/>
+          <p:nvPr/>
+        </p:nvSpPr>
+        <p:spPr>
+          <a:xfrm>
+            <a:off x="1598283" y="2600631"/>
+            <a:ext cx="1312433" cy="369332"/>
+          </a:xfrm>
+          <a:prstGeom prst="rect">
+            <a:avLst/>
+          </a:prstGeom>
+          <a:noFill/>
+        </p:spPr>
+        <p:txBody>
+          <a:bodyPr wrap="square" rtlCol="0">
+            <a:spAutoFit/>
+          </a:bodyPr>
+          <a:lstStyle/>
+          <a:p>
+            <a:r>
+              <a:rPr lang="en-CA" b="1" dirty="0"/>
+              <a:t>My Home</a:t>
+            </a:r>
+          </a:p>
+        </p:txBody>
+      </p:sp>
+      <p:sp>
+        <p:nvSpPr>
+          <p:cNvPr id="25" name="TextBox 24">
+            <a:extLst>
+              <a:ext uri="{FF2B5EF4-FFF2-40B4-BE49-F238E27FC236}">
+                <a16:creationId xmlns:a16="http://schemas.microsoft.com/office/drawing/2014/main" id="{86E7002A-36DC-4B88-8027-0DE24B7B6E12}"/>
+              </a:ext>
+            </a:extLst>
+          </p:cNvPr>
+          <p:cNvSpPr txBox="1"/>
+          <p:nvPr/>
+        </p:nvSpPr>
+        <p:spPr>
+          <a:xfrm>
+            <a:off x="5226733" y="1596795"/>
+            <a:ext cx="1312433" cy="369332"/>
+          </a:xfrm>
+          <a:prstGeom prst="rect">
+            <a:avLst/>
+          </a:prstGeom>
+          <a:noFill/>
+        </p:spPr>
+        <p:txBody>
+          <a:bodyPr wrap="square" rtlCol="0">
+            <a:spAutoFit/>
+          </a:bodyPr>
+          <a:lstStyle/>
+          <a:p>
+            <a:r>
+              <a:rPr lang="en-CA" b="1" dirty="0"/>
+              <a:t>Box.com</a:t>
+            </a:r>
+          </a:p>
+        </p:txBody>
+      </p:sp>
+      <p:sp>
+        <p:nvSpPr>
+          <p:cNvPr id="26" name="TextBox 25">
+            <a:extLst>
+              <a:ext uri="{FF2B5EF4-FFF2-40B4-BE49-F238E27FC236}">
+                <a16:creationId xmlns:a16="http://schemas.microsoft.com/office/drawing/2014/main" id="{0C187B27-8FE1-458C-A6F7-18D86625F7E2}"/>
+              </a:ext>
+            </a:extLst>
+          </p:cNvPr>
+          <p:cNvSpPr txBox="1"/>
+          <p:nvPr/>
+        </p:nvSpPr>
+        <p:spPr>
+          <a:xfrm>
+            <a:off x="4566404" y="4171825"/>
+            <a:ext cx="875394" cy="461665"/>
+          </a:xfrm>
+          <a:prstGeom prst="rect">
+            <a:avLst/>
+          </a:prstGeom>
+          <a:noFill/>
+        </p:spPr>
+        <p:txBody>
+          <a:bodyPr wrap="square" rtlCol="0">
+            <a:spAutoFit/>
+          </a:bodyPr>
+          <a:lstStyle/>
+          <a:p>
+            <a:r>
+              <a:rPr lang="en-CA" sz="2400" b="1" dirty="0"/>
+              <a:t>TIP</a:t>
+            </a:r>
+          </a:p>
+        </p:txBody>
+      </p:sp>
+      <p:cxnSp>
+        <p:nvCxnSpPr>
+          <p:cNvPr id="28" name="Connector: Elbow 27">
+            <a:extLst>
+              <a:ext uri="{FF2B5EF4-FFF2-40B4-BE49-F238E27FC236}">
+                <a16:creationId xmlns:a16="http://schemas.microsoft.com/office/drawing/2014/main" id="{5A80E13A-FC25-4302-B813-C90C271FE754}"/>
+              </a:ext>
+            </a:extLst>
+          </p:cNvPr>
+          <p:cNvCxnSpPr>
+            <a:cxnSpLocks/>
+          </p:cNvCxnSpPr>
+          <p:nvPr/>
+        </p:nvCxnSpPr>
+        <p:spPr>
+          <a:xfrm rot="5400000" flipH="1" flipV="1">
+            <a:off x="4482015" y="2685460"/>
+            <a:ext cx="1746855" cy="823654"/>
+          </a:xfrm>
+          <a:prstGeom prst="bentConnector3">
+            <a:avLst>
+              <a:gd name="adj1" fmla="val 50000"/>
+            </a:avLst>
+          </a:prstGeom>
+          <a:ln w="28575">
+            <a:solidFill>
+              <a:schemeClr val="accent1"/>
+            </a:solidFill>
+            <a:headEnd type="triangle"/>
+            <a:tailEnd type="triangle"/>
+          </a:ln>
+        </p:spPr>
+        <p:style>
+          <a:lnRef idx="1">
+            <a:schemeClr val="accent1"/>
+          </a:lnRef>
+          <a:fillRef idx="0">
+            <a:schemeClr val="accent1"/>
+          </a:fillRef>
+          <a:effectRef idx="0">
+            <a:schemeClr val="accent1"/>
+          </a:effectRef>
+          <a:fontRef idx="minor">
+            <a:schemeClr val="tx1"/>
+          </a:fontRef>
+        </p:style>
+      </p:cxnSp>
+      <p:sp>
+        <p:nvSpPr>
+          <p:cNvPr id="38" name="TextBox 37">
+            <a:extLst>
+              <a:ext uri="{FF2B5EF4-FFF2-40B4-BE49-F238E27FC236}">
+                <a16:creationId xmlns:a16="http://schemas.microsoft.com/office/drawing/2014/main" id="{300CED2B-D02E-4C1F-87EB-08723C53D23C}"/>
+              </a:ext>
+            </a:extLst>
+          </p:cNvPr>
+          <p:cNvSpPr txBox="1"/>
+          <p:nvPr/>
+        </p:nvSpPr>
+        <p:spPr>
+          <a:xfrm>
+            <a:off x="9091270" y="3743444"/>
+            <a:ext cx="1230081" cy="369332"/>
+          </a:xfrm>
+          <a:prstGeom prst="rect">
+            <a:avLst/>
+          </a:prstGeom>
+          <a:noFill/>
+        </p:spPr>
+        <p:txBody>
+          <a:bodyPr wrap="square" rtlCol="0">
+            <a:spAutoFit/>
+          </a:bodyPr>
+          <a:lstStyle/>
+          <a:p>
+            <a:r>
+              <a:rPr lang="en-CA" dirty="0"/>
+              <a:t>Tarion user</a:t>
+            </a:r>
+          </a:p>
+        </p:txBody>
+      </p:sp>
+      <p:sp>
+        <p:nvSpPr>
+          <p:cNvPr id="39" name="TextBox 38">
+            <a:extLst>
+              <a:ext uri="{FF2B5EF4-FFF2-40B4-BE49-F238E27FC236}">
+                <a16:creationId xmlns:a16="http://schemas.microsoft.com/office/drawing/2014/main" id="{EED11590-68BE-4C7E-B36E-71F05CC1C742}"/>
+              </a:ext>
+            </a:extLst>
+          </p:cNvPr>
+          <p:cNvSpPr txBox="1"/>
+          <p:nvPr/>
+        </p:nvSpPr>
+        <p:spPr>
+          <a:xfrm>
+            <a:off x="1461909" y="4897547"/>
+            <a:ext cx="1448807" cy="369332"/>
+          </a:xfrm>
+          <a:prstGeom prst="rect">
+            <a:avLst/>
+          </a:prstGeom>
+          <a:noFill/>
+        </p:spPr>
+        <p:txBody>
+          <a:bodyPr wrap="square" rtlCol="0">
+            <a:spAutoFit/>
+          </a:bodyPr>
+          <a:lstStyle/>
+          <a:p>
+            <a:r>
+              <a:rPr lang="en-CA" dirty="0"/>
+              <a:t>Home owner</a:t>
+            </a:r>
+          </a:p>
+        </p:txBody>
+      </p:sp>
+      <p:sp>
+        <p:nvSpPr>
+          <p:cNvPr id="40" name="TextBox 39">
+            <a:extLst>
+              <a:ext uri="{FF2B5EF4-FFF2-40B4-BE49-F238E27FC236}">
+                <a16:creationId xmlns:a16="http://schemas.microsoft.com/office/drawing/2014/main" id="{686DED4A-B7A4-4C7D-B33C-6D716406D195}"/>
+              </a:ext>
+            </a:extLst>
+          </p:cNvPr>
+          <p:cNvSpPr txBox="1"/>
+          <p:nvPr/>
+        </p:nvSpPr>
+        <p:spPr>
+          <a:xfrm>
+            <a:off x="551048" y="3570305"/>
+            <a:ext cx="2428198" cy="307777"/>
+          </a:xfrm>
+          <a:prstGeom prst="rect">
+            <a:avLst/>
+          </a:prstGeom>
+          <a:noFill/>
+        </p:spPr>
+        <p:txBody>
+          <a:bodyPr wrap="square" rtlCol="0">
+            <a:spAutoFit/>
+          </a:bodyPr>
+          <a:lstStyle/>
+          <a:p>
+            <a:r>
+              <a:rPr lang="en-CA" sz="1400" dirty="0"/>
+              <a:t>1. Upload large file</a:t>
+            </a:r>
+          </a:p>
+        </p:txBody>
+      </p:sp>
+      <p:sp>
+        <p:nvSpPr>
+          <p:cNvPr id="41" name="TextBox 40">
+            <a:extLst>
+              <a:ext uri="{FF2B5EF4-FFF2-40B4-BE49-F238E27FC236}">
+                <a16:creationId xmlns:a16="http://schemas.microsoft.com/office/drawing/2014/main" id="{359823A6-6F61-4B07-8E11-2EA93B8B8792}"/>
+              </a:ext>
+            </a:extLst>
+          </p:cNvPr>
+          <p:cNvSpPr txBox="1"/>
+          <p:nvPr/>
+        </p:nvSpPr>
+        <p:spPr>
+          <a:xfrm>
+            <a:off x="2543970" y="1614008"/>
+            <a:ext cx="2428198" cy="523220"/>
+          </a:xfrm>
+          <a:prstGeom prst="rect">
+            <a:avLst/>
+          </a:prstGeom>
+          <a:noFill/>
+        </p:spPr>
+        <p:txBody>
+          <a:bodyPr wrap="square" rtlCol="0">
+            <a:spAutoFit/>
+          </a:bodyPr>
+          <a:lstStyle/>
+          <a:p>
+            <a:r>
+              <a:rPr lang="en-CA" sz="1400" dirty="0"/>
+              <a:t>2. My Home uploads </a:t>
+            </a:r>
+          </a:p>
+          <a:p>
+            <a:r>
+              <a:rPr lang="en-CA" sz="1400" dirty="0"/>
+              <a:t>file to Box</a:t>
+            </a:r>
+          </a:p>
+        </p:txBody>
+      </p:sp>
+      <p:sp>
+        <p:nvSpPr>
+          <p:cNvPr id="42" name="TextBox 41">
+            <a:extLst>
+              <a:ext uri="{FF2B5EF4-FFF2-40B4-BE49-F238E27FC236}">
+                <a16:creationId xmlns:a16="http://schemas.microsoft.com/office/drawing/2014/main" id="{9C77BB43-5E86-4ADA-B042-554AD5A7FA1B}"/>
+              </a:ext>
+            </a:extLst>
+          </p:cNvPr>
+          <p:cNvSpPr txBox="1"/>
+          <p:nvPr/>
+        </p:nvSpPr>
+        <p:spPr>
+          <a:xfrm>
+            <a:off x="7356783" y="1227463"/>
+            <a:ext cx="2428198" cy="738664"/>
+          </a:xfrm>
+          <a:prstGeom prst="rect">
+            <a:avLst/>
+          </a:prstGeom>
+          <a:noFill/>
+        </p:spPr>
+        <p:txBody>
+          <a:bodyPr wrap="square" rtlCol="0">
+            <a:spAutoFit/>
+          </a:bodyPr>
+          <a:lstStyle/>
+          <a:p>
+            <a:r>
+              <a:rPr lang="en-CA" sz="1400" dirty="0"/>
+              <a:t>3. Box sends notification to </a:t>
+            </a:r>
+          </a:p>
+          <a:p>
+            <a:r>
+              <a:rPr lang="en-CA" sz="1400" dirty="0"/>
+              <a:t>Tarion user that file is waiting for approval</a:t>
+            </a:r>
+          </a:p>
+        </p:txBody>
+      </p:sp>
+      <p:sp>
+        <p:nvSpPr>
+          <p:cNvPr id="43" name="TextBox 42">
+            <a:extLst>
+              <a:ext uri="{FF2B5EF4-FFF2-40B4-BE49-F238E27FC236}">
+                <a16:creationId xmlns:a16="http://schemas.microsoft.com/office/drawing/2014/main" id="{E7EC7240-978C-45D3-827E-63535DBF5D18}"/>
+              </a:ext>
+            </a:extLst>
+          </p:cNvPr>
+          <p:cNvSpPr txBox="1"/>
+          <p:nvPr/>
+        </p:nvSpPr>
+        <p:spPr>
+          <a:xfrm>
+            <a:off x="7731639" y="2966275"/>
+            <a:ext cx="2428198" cy="523220"/>
+          </a:xfrm>
+          <a:prstGeom prst="rect">
+            <a:avLst/>
+          </a:prstGeom>
+          <a:noFill/>
+        </p:spPr>
+        <p:txBody>
+          <a:bodyPr wrap="square" rtlCol="0">
+            <a:spAutoFit/>
+          </a:bodyPr>
+          <a:lstStyle/>
+          <a:p>
+            <a:r>
+              <a:rPr lang="en-CA" sz="1400" dirty="0"/>
+              <a:t>4. Tarion user </a:t>
+            </a:r>
+          </a:p>
+          <a:p>
+            <a:r>
+              <a:rPr lang="en-CA" sz="1400" dirty="0"/>
+              <a:t>approves file</a:t>
+            </a:r>
+          </a:p>
+        </p:txBody>
+      </p:sp>
+      <p:sp>
+        <p:nvSpPr>
+          <p:cNvPr id="44" name="Rectangle 43">
+            <a:extLst>
+              <a:ext uri="{FF2B5EF4-FFF2-40B4-BE49-F238E27FC236}">
+                <a16:creationId xmlns:a16="http://schemas.microsoft.com/office/drawing/2014/main" id="{F1AB7CE0-2F58-417E-89A1-786A574E29A3}"/>
+              </a:ext>
+            </a:extLst>
+          </p:cNvPr>
+          <p:cNvSpPr/>
+          <p:nvPr/>
+        </p:nvSpPr>
+        <p:spPr>
+          <a:xfrm>
+            <a:off x="4069309" y="5554049"/>
+            <a:ext cx="1902428" cy="632194"/>
+          </a:xfrm>
+          <a:prstGeom prst="rect">
+            <a:avLst/>
+          </a:prstGeom>
+          <a:solidFill>
+            <a:schemeClr val="accent1">
+              <a:lumMod val="60000"/>
+              <a:lumOff val="40000"/>
+            </a:schemeClr>
+          </a:solidFill>
+        </p:spPr>
+        <p:style>
+          <a:lnRef idx="2">
+            <a:schemeClr val="accent1">
+              <a:shade val="50000"/>
+            </a:schemeClr>
+          </a:lnRef>
+          <a:fillRef idx="1">
+            <a:schemeClr val="accent1"/>
+          </a:fillRef>
+          <a:effectRef idx="0">
+            <a:schemeClr val="accent1"/>
+          </a:effectRef>
+          <a:fontRef idx="minor">
+            <a:schemeClr val="lt1"/>
+          </a:fontRef>
+        </p:style>
+        <p:txBody>
+          <a:bodyPr rtlCol="0" anchor="ctr"/>
+          <a:lstStyle/>
+          <a:p>
+            <a:pPr algn="ctr"/>
+            <a:endParaRPr lang="en-CA"/>
+          </a:p>
+        </p:txBody>
+      </p:sp>
+      <p:sp>
+        <p:nvSpPr>
+          <p:cNvPr id="46" name="TextBox 45">
+            <a:extLst>
+              <a:ext uri="{FF2B5EF4-FFF2-40B4-BE49-F238E27FC236}">
+                <a16:creationId xmlns:a16="http://schemas.microsoft.com/office/drawing/2014/main" id="{BD892AE3-491D-483A-A2FF-556EFBE9595A}"/>
+              </a:ext>
+            </a:extLst>
+          </p:cNvPr>
+          <p:cNvSpPr txBox="1"/>
+          <p:nvPr/>
+        </p:nvSpPr>
+        <p:spPr>
+          <a:xfrm>
+            <a:off x="4137669" y="5652959"/>
+            <a:ext cx="1958331" cy="369332"/>
+          </a:xfrm>
+          <a:prstGeom prst="rect">
+            <a:avLst/>
+          </a:prstGeom>
+          <a:noFill/>
+        </p:spPr>
+        <p:txBody>
+          <a:bodyPr wrap="square" rtlCol="0">
+            <a:spAutoFit/>
+          </a:bodyPr>
+          <a:lstStyle/>
+          <a:p>
+            <a:r>
+              <a:rPr lang="en-CA" b="1" dirty="0"/>
+              <a:t>Content Manager</a:t>
+            </a:r>
+          </a:p>
+        </p:txBody>
+      </p:sp>
+      <p:cxnSp>
+        <p:nvCxnSpPr>
+          <p:cNvPr id="47" name="Straight Arrow Connector 46">
+            <a:extLst>
+              <a:ext uri="{FF2B5EF4-FFF2-40B4-BE49-F238E27FC236}">
+                <a16:creationId xmlns:a16="http://schemas.microsoft.com/office/drawing/2014/main" id="{17ED486D-9894-4F50-A698-371B881E74AE}"/>
+              </a:ext>
+            </a:extLst>
+          </p:cNvPr>
+          <p:cNvCxnSpPr>
+            <a:cxnSpLocks/>
+          </p:cNvCxnSpPr>
+          <p:nvPr/>
+        </p:nvCxnSpPr>
+        <p:spPr>
+          <a:xfrm>
+            <a:off x="4969357" y="4769229"/>
+            <a:ext cx="0" cy="762651"/>
+          </a:xfrm>
+          <a:prstGeom prst="straightConnector1">
+            <a:avLst/>
+          </a:prstGeom>
+          <a:ln w="28575">
+            <a:tailEnd type="triangle"/>
+          </a:ln>
+        </p:spPr>
+        <p:style>
+          <a:lnRef idx="1">
+            <a:schemeClr val="accent1"/>
+          </a:lnRef>
+          <a:fillRef idx="0">
+            <a:schemeClr val="accent1"/>
+          </a:fillRef>
+          <a:effectRef idx="0">
+            <a:schemeClr val="accent1"/>
+          </a:effectRef>
+          <a:fontRef idx="minor">
+            <a:schemeClr val="tx1"/>
+          </a:fontRef>
+        </p:style>
+      </p:cxnSp>
+      <p:sp>
+        <p:nvSpPr>
+          <p:cNvPr id="55" name="TextBox 54">
+            <a:extLst>
+              <a:ext uri="{FF2B5EF4-FFF2-40B4-BE49-F238E27FC236}">
+                <a16:creationId xmlns:a16="http://schemas.microsoft.com/office/drawing/2014/main" id="{F2CD974B-CD4F-44E3-B5D5-6D869307E6D3}"/>
+              </a:ext>
+            </a:extLst>
+          </p:cNvPr>
+          <p:cNvSpPr txBox="1"/>
+          <p:nvPr/>
+        </p:nvSpPr>
+        <p:spPr>
+          <a:xfrm>
+            <a:off x="5037893" y="3181706"/>
+            <a:ext cx="2428198" cy="738664"/>
+          </a:xfrm>
+          <a:prstGeom prst="rect">
+            <a:avLst/>
+          </a:prstGeom>
+          <a:noFill/>
+        </p:spPr>
+        <p:txBody>
+          <a:bodyPr wrap="square" rtlCol="0">
+            <a:spAutoFit/>
+          </a:bodyPr>
+          <a:lstStyle/>
+          <a:p>
+            <a:r>
+              <a:rPr lang="en-CA" sz="1400" dirty="0"/>
+              <a:t>5. Tip is running a job which every few minutes checks for approved files. </a:t>
+            </a:r>
+          </a:p>
+        </p:txBody>
+      </p:sp>
+      <p:sp>
+        <p:nvSpPr>
+          <p:cNvPr id="56" name="TextBox 55">
+            <a:extLst>
+              <a:ext uri="{FF2B5EF4-FFF2-40B4-BE49-F238E27FC236}">
+                <a16:creationId xmlns:a16="http://schemas.microsoft.com/office/drawing/2014/main" id="{7CE8C72B-E14D-4B97-93BF-9B2C0B8E77E9}"/>
+              </a:ext>
+            </a:extLst>
+          </p:cNvPr>
+          <p:cNvSpPr txBox="1"/>
+          <p:nvPr/>
+        </p:nvSpPr>
+        <p:spPr>
+          <a:xfrm>
+            <a:off x="5199078" y="4903274"/>
+            <a:ext cx="2428198" cy="523220"/>
+          </a:xfrm>
+          <a:prstGeom prst="rect">
+            <a:avLst/>
+          </a:prstGeom>
+          <a:noFill/>
+        </p:spPr>
+        <p:txBody>
+          <a:bodyPr wrap="square" rtlCol="0">
+            <a:spAutoFit/>
+          </a:bodyPr>
+          <a:lstStyle/>
+          <a:p>
+            <a:r>
+              <a:rPr lang="en-CA" sz="1400" dirty="0"/>
+              <a:t>6. Approved files are </a:t>
+            </a:r>
+          </a:p>
+          <a:p>
+            <a:r>
+              <a:rPr lang="en-CA" sz="1400" dirty="0"/>
+              <a:t>uploaded to CM</a:t>
+            </a:r>
+          </a:p>
+        </p:txBody>
+      </p:sp>
+      <p:sp>
+        <p:nvSpPr>
+          <p:cNvPr id="82" name="TextBox 81">
+            <a:extLst>
+              <a:ext uri="{FF2B5EF4-FFF2-40B4-BE49-F238E27FC236}">
+                <a16:creationId xmlns:a16="http://schemas.microsoft.com/office/drawing/2014/main" id="{646B828C-26A0-4A74-A3F9-5616F15EE6D4}"/>
+              </a:ext>
+            </a:extLst>
+          </p:cNvPr>
+          <p:cNvSpPr txBox="1"/>
+          <p:nvPr/>
+        </p:nvSpPr>
+        <p:spPr>
+          <a:xfrm>
+            <a:off x="3535874" y="392613"/>
+            <a:ext cx="4338126" cy="523220"/>
+          </a:xfrm>
+          <a:prstGeom prst="rect">
+            <a:avLst/>
+          </a:prstGeom>
+          <a:noFill/>
+          <a:ln w="28575">
+            <a:solidFill>
+              <a:schemeClr val="accent1">
+                <a:lumMod val="75000"/>
+              </a:schemeClr>
+            </a:solidFill>
+          </a:ln>
+        </p:spPr>
+        <p:txBody>
+          <a:bodyPr wrap="square" rtlCol="0">
+            <a:spAutoFit/>
+          </a:bodyPr>
+          <a:lstStyle/>
+          <a:p>
+            <a:r>
+              <a:rPr lang="en-CA" sz="2400" b="1" dirty="0">
+                <a:solidFill>
+                  <a:schemeClr val="accent1">
+                    <a:lumMod val="75000"/>
+                  </a:schemeClr>
+                </a:solidFill>
+              </a:rPr>
+              <a:t>     </a:t>
+            </a:r>
+            <a:r>
+              <a:rPr lang="en-CA" sz="2800" b="1" dirty="0">
+                <a:solidFill>
+                  <a:schemeClr val="accent1">
+                    <a:lumMod val="75000"/>
+                  </a:schemeClr>
+                </a:solidFill>
+              </a:rPr>
+              <a:t>Integration with Box.com      </a:t>
+            </a:r>
+          </a:p>
+        </p:txBody>
+      </p:sp>
+    </p:spTree>
+    <p:extLst>
+      <p:ext uri="{BB962C8B-B14F-4D97-AF65-F5344CB8AC3E}">
+        <p14:creationId xmlns:p14="http://schemas.microsoft.com/office/powerpoint/2010/main" val="2111230753"/>
+      </p:ext>
+    </p:extLst>
+  </p:cSld>
+  <p:clrMapOvr>
+    <a:masterClrMapping/>
+  </p:clrMapOvr>
+</p:sld>
+</file>
+
+<file path=ppt/slides/slide5.xml><?xml version="1.0" encoding="utf-8"?>
 <p:sld xmlns:a="http://schemas.openxmlformats.org/drawingml/2006/main" xmlns:r="http://schemas.openxmlformats.org/officeDocument/2006/relationships" xmlns:p="http://schemas.openxmlformats.org/presentationml/2006/main">
   <p:cSld>
     <p:spTree>

</xml_diff>

<commit_message>
Update the speaker list, changed order
</commit_message>
<xml_diff>
--- a/IS Team Updates - November 22.pptx
+++ b/IS Team Updates - November 22.pptx
@@ -9,8 +9,8 @@
   </p:notesMasterIdLst>
   <p:sldIdLst>
     <p:sldId id="257" r:id="rId2"/>
-    <p:sldId id="259" r:id="rId3"/>
-    <p:sldId id="258" r:id="rId4"/>
+    <p:sldId id="258" r:id="rId3"/>
+    <p:sldId id="259" r:id="rId4"/>
     <p:sldId id="256" r:id="rId5"/>
     <p:sldId id="260" r:id="rId6"/>
   </p:sldIdLst>
@@ -627,7 +627,7 @@
     </p:spTree>
     <p:extLst>
       <p:ext uri="{BB962C8B-B14F-4D97-AF65-F5344CB8AC3E}">
-        <p14:creationId xmlns:p14="http://schemas.microsoft.com/office/powerpoint/2010/main" val="753535165"/>
+        <p14:creationId xmlns:p14="http://schemas.microsoft.com/office/powerpoint/2010/main" val="3615950683"/>
       </p:ext>
     </p:extLst>
   </p:cSld>
@@ -711,7 +711,7 @@
     </p:spTree>
     <p:extLst>
       <p:ext uri="{BB962C8B-B14F-4D97-AF65-F5344CB8AC3E}">
-        <p14:creationId xmlns:p14="http://schemas.microsoft.com/office/powerpoint/2010/main" val="3615950683"/>
+        <p14:creationId xmlns:p14="http://schemas.microsoft.com/office/powerpoint/2010/main" val="753535165"/>
       </p:ext>
     </p:extLst>
   </p:cSld>
@@ -4445,142 +4445,6 @@
           </a:p>
         </p:txBody>
       </p:sp>
-      <p:pic>
-        <p:nvPicPr>
-          <p:cNvPr id="3" name="Picture 2">
-            <a:extLst>
-              <a:ext uri="{FF2B5EF4-FFF2-40B4-BE49-F238E27FC236}">
-                <a16:creationId xmlns:a16="http://schemas.microsoft.com/office/drawing/2014/main" id="{C1EE7496-9102-4190-A337-4F1514F4C74F}"/>
-              </a:ext>
-            </a:extLst>
-          </p:cNvPr>
-          <p:cNvPicPr>
-            <a:picLocks noChangeAspect="1"/>
-          </p:cNvPicPr>
-          <p:nvPr/>
-        </p:nvPicPr>
-        <p:blipFill>
-          <a:blip r:embed="rId4">
-            <a:extLst>
-              <a:ext uri="{28A0092B-C50C-407E-A947-70E740481C1C}">
-                <a14:useLocalDpi xmlns:a14="http://schemas.microsoft.com/office/drawing/2010/main" val="0"/>
-              </a:ext>
-            </a:extLst>
-          </a:blip>
-          <a:stretch>
-            <a:fillRect/>
-          </a:stretch>
-        </p:blipFill>
-        <p:spPr>
-          <a:xfrm>
-            <a:off x="4184543" y="890965"/>
-            <a:ext cx="4200040" cy="5576817"/>
-          </a:xfrm>
-          <a:prstGeom prst="rect">
-            <a:avLst/>
-          </a:prstGeom>
-        </p:spPr>
-      </p:pic>
-    </p:spTree>
-    <p:extLst>
-      <p:ext uri="{BB962C8B-B14F-4D97-AF65-F5344CB8AC3E}">
-        <p14:creationId xmlns:p14="http://schemas.microsoft.com/office/powerpoint/2010/main" val="4234798870"/>
-      </p:ext>
-    </p:extLst>
-  </p:cSld>
-  <p:clrMapOvr>
-    <a:masterClrMapping/>
-  </p:clrMapOvr>
-</p:sld>
-</file>
-
-<file path=ppt/slides/slide3.xml><?xml version="1.0" encoding="utf-8"?>
-<p:sld xmlns:a="http://schemas.openxmlformats.org/drawingml/2006/main" xmlns:r="http://schemas.openxmlformats.org/officeDocument/2006/relationships" xmlns:p="http://schemas.openxmlformats.org/presentationml/2006/main">
-  <p:cSld>
-    <p:spTree>
-      <p:nvGrpSpPr>
-        <p:cNvPr id="1" name=""/>
-        <p:cNvGrpSpPr/>
-        <p:nvPr/>
-      </p:nvGrpSpPr>
-      <p:grpSpPr>
-        <a:xfrm>
-          <a:off x="0" y="0"/>
-          <a:ext cx="0" cy="0"/>
-          <a:chOff x="0" y="0"/>
-          <a:chExt cx="0" cy="0"/>
-        </a:xfrm>
-      </p:grpSpPr>
-      <p:pic>
-        <p:nvPicPr>
-          <p:cNvPr id="4" name="Picture 3"/>
-          <p:cNvPicPr>
-            <a:picLocks noChangeAspect="1"/>
-          </p:cNvPicPr>
-          <p:nvPr/>
-        </p:nvPicPr>
-        <p:blipFill>
-          <a:blip r:embed="rId3"/>
-          <a:stretch>
-            <a:fillRect/>
-          </a:stretch>
-        </p:blipFill>
-        <p:spPr>
-          <a:xfrm>
-            <a:off x="172435" y="173514"/>
-            <a:ext cx="2133785" cy="472481"/>
-          </a:xfrm>
-          <a:prstGeom prst="rect">
-            <a:avLst/>
-          </a:prstGeom>
-        </p:spPr>
-      </p:pic>
-      <p:sp>
-        <p:nvSpPr>
-          <p:cNvPr id="5" name="Rectangle 4"/>
-          <p:cNvSpPr/>
-          <p:nvPr/>
-        </p:nvSpPr>
-        <p:spPr>
-          <a:xfrm>
-            <a:off x="172435" y="654621"/>
-            <a:ext cx="11852788" cy="45719"/>
-          </a:xfrm>
-          <a:prstGeom prst="rect">
-            <a:avLst/>
-          </a:prstGeom>
-          <a:solidFill>
-            <a:srgbClr val="0070C0"/>
-          </a:solidFill>
-          <a:ln>
-            <a:noFill/>
-          </a:ln>
-        </p:spPr>
-        <p:style>
-          <a:lnRef idx="2">
-            <a:schemeClr val="accent1">
-              <a:shade val="50000"/>
-            </a:schemeClr>
-          </a:lnRef>
-          <a:fillRef idx="1">
-            <a:schemeClr val="accent1"/>
-          </a:fillRef>
-          <a:effectRef idx="0">
-            <a:schemeClr val="accent1"/>
-          </a:effectRef>
-          <a:fontRef idx="minor">
-            <a:schemeClr val="lt1"/>
-          </a:fontRef>
-        </p:style>
-        <p:txBody>
-          <a:bodyPr rtlCol="0" anchor="ctr"/>
-          <a:lstStyle/>
-          <a:p>
-            <a:pPr algn="ctr"/>
-            <a:endParaRPr lang="en-CA"/>
-          </a:p>
-        </p:txBody>
-      </p:sp>
       <p:sp>
         <p:nvSpPr>
           <p:cNvPr id="8" name="TextBox 5">
@@ -4719,10 +4583,10 @@
       </p:sp>
       <p:graphicFrame>
         <p:nvGraphicFramePr>
-          <p:cNvPr id="6" name="Table 5">
-            <a:extLst>
-              <a:ext uri="{FF2B5EF4-FFF2-40B4-BE49-F238E27FC236}">
-                <a16:creationId xmlns:a16="http://schemas.microsoft.com/office/drawing/2014/main" id="{74F7F999-8032-451D-B49E-1E7E897B8DD9}"/>
+          <p:cNvPr id="3" name="Table 2">
+            <a:extLst>
+              <a:ext uri="{FF2B5EF4-FFF2-40B4-BE49-F238E27FC236}">
+                <a16:creationId xmlns:a16="http://schemas.microsoft.com/office/drawing/2014/main" id="{FC6C7906-FB9B-49DA-BDFB-1C7DED7F27F6}"/>
               </a:ext>
             </a:extLst>
           </p:cNvPr>
@@ -4732,14 +4596,14 @@
           <p:nvPr>
             <p:extLst>
               <p:ext uri="{D42A27DB-BD31-4B8C-83A1-F6EECF244321}">
-                <p14:modId xmlns:p14="http://schemas.microsoft.com/office/powerpoint/2010/main" val="2300858658"/>
+                <p14:modId xmlns:p14="http://schemas.microsoft.com/office/powerpoint/2010/main" val="371704078"/>
               </p:ext>
             </p:extLst>
           </p:nvPr>
         </p:nvGraphicFramePr>
         <p:xfrm>
-          <a:off x="867905" y="1779977"/>
-          <a:ext cx="10848814" cy="4682814"/>
+          <a:off x="309965" y="1445054"/>
+          <a:ext cx="11715257" cy="5239433"/>
         </p:xfrm>
         <a:graphic>
           <a:graphicData uri="http://schemas.openxmlformats.org/drawingml/2006/table">
@@ -4748,29 +4612,29 @@
                 <a:tableStyleId>{5C22544A-7EE6-4342-B048-85BDC9FD1C3A}</a:tableStyleId>
               </a:tblPr>
               <a:tblGrid>
-                <a:gridCol w="2526508">
+                <a:gridCol w="2558228">
                   <a:extLst>
                     <a:ext uri="{9D8B030D-6E8A-4147-A177-3AD203B41FA5}">
-                      <a16:colId xmlns:a16="http://schemas.microsoft.com/office/drawing/2014/main" val="1687189315"/>
+                      <a16:colId xmlns:a16="http://schemas.microsoft.com/office/drawing/2014/main" val="2267207961"/>
                     </a:ext>
                   </a:extLst>
                 </a:gridCol>
-                <a:gridCol w="6431860">
+                <a:gridCol w="7076972">
                   <a:extLst>
                     <a:ext uri="{9D8B030D-6E8A-4147-A177-3AD203B41FA5}">
-                      <a16:colId xmlns:a16="http://schemas.microsoft.com/office/drawing/2014/main" val="678130918"/>
+                      <a16:colId xmlns:a16="http://schemas.microsoft.com/office/drawing/2014/main" val="3160641848"/>
                     </a:ext>
                   </a:extLst>
                 </a:gridCol>
-                <a:gridCol w="1890446">
+                <a:gridCol w="2080057">
                   <a:extLst>
                     <a:ext uri="{9D8B030D-6E8A-4147-A177-3AD203B41FA5}">
-                      <a16:colId xmlns:a16="http://schemas.microsoft.com/office/drawing/2014/main" val="1537527621"/>
+                      <a16:colId xmlns:a16="http://schemas.microsoft.com/office/drawing/2014/main" val="2306247275"/>
                     </a:ext>
                   </a:extLst>
                 </a:gridCol>
               </a:tblGrid>
-              <a:tr h="486827">
+              <a:tr h="495622">
                 <a:tc>
                   <a:txBody>
                     <a:bodyPr/>
@@ -4778,12 +4642,12 @@
                     <a:p>
                       <a:pPr algn="l" fontAlgn="b"/>
                       <a:r>
-                        <a:rPr lang="en-CA" sz="2800" b="1" u="none" strike="noStrike" dirty="0">
+                        <a:rPr lang="en-CA" sz="2400" b="1" u="none" strike="noStrike" dirty="0">
                           <a:effectLst/>
                         </a:rPr>
                         <a:t>Speaker</a:t>
                       </a:r>
-                      <a:endParaRPr lang="en-CA" sz="2800" b="1" i="0" u="none" strike="noStrike" dirty="0">
+                      <a:endParaRPr lang="en-CA" sz="2400" b="1" i="0" u="none" strike="noStrike" dirty="0">
                         <a:solidFill>
                           <a:srgbClr val="000000"/>
                         </a:solidFill>
@@ -4801,12 +4665,12 @@
                     <a:p>
                       <a:pPr algn="l" fontAlgn="b"/>
                       <a:r>
-                        <a:rPr lang="en-CA" sz="2800" b="1" u="none" strike="noStrike">
+                        <a:rPr lang="en-CA" sz="2400" b="1" u="none" strike="noStrike" dirty="0">
                           <a:effectLst/>
                         </a:rPr>
                         <a:t>Subject</a:t>
                       </a:r>
-                      <a:endParaRPr lang="en-CA" sz="2800" b="1" i="0" u="none" strike="noStrike">
+                      <a:endParaRPr lang="en-CA" sz="2400" b="1" i="0" u="none" strike="noStrike" dirty="0">
                         <a:solidFill>
                           <a:srgbClr val="000000"/>
                         </a:solidFill>
@@ -4824,12 +4688,12 @@
                     <a:p>
                       <a:pPr algn="l" fontAlgn="b"/>
                       <a:r>
-                        <a:rPr lang="en-CA" sz="2800" b="1" u="none" strike="noStrike" dirty="0">
+                        <a:rPr lang="en-CA" sz="2400" b="1" u="none" strike="noStrike" dirty="0">
                           <a:effectLst/>
                         </a:rPr>
                         <a:t>Time</a:t>
                       </a:r>
-                      <a:endParaRPr lang="en-CA" sz="2800" b="1" i="0" u="none" strike="noStrike" dirty="0">
+                      <a:endParaRPr lang="en-CA" sz="2400" b="1" i="0" u="none" strike="noStrike" dirty="0">
                         <a:solidFill>
                           <a:srgbClr val="000000"/>
                         </a:solidFill>
@@ -4842,11 +4706,11 @@
                 </a:tc>
                 <a:extLst>
                   <a:ext uri="{0D108BD9-81ED-4DB2-BD59-A6C34878D82A}">
-                    <a16:rowId xmlns:a16="http://schemas.microsoft.com/office/drawing/2014/main" val="2760559848"/>
+                    <a16:rowId xmlns:a16="http://schemas.microsoft.com/office/drawing/2014/main" val="828838374"/>
                   </a:ext>
                 </a:extLst>
               </a:tr>
-              <a:tr h="463645">
+              <a:tr h="472021">
                 <a:tc>
                   <a:txBody>
                     <a:bodyPr/>
@@ -4854,12 +4718,12 @@
                     <a:p>
                       <a:pPr algn="l" fontAlgn="b"/>
                       <a:r>
-                        <a:rPr lang="en-CA" sz="2400" u="none" strike="noStrike" dirty="0">
+                        <a:rPr lang="en-CA" sz="2000" u="none" strike="noStrike">
                           <a:effectLst/>
                         </a:rPr>
                         <a:t>Java member</a:t>
                       </a:r>
-                      <a:endParaRPr lang="en-CA" sz="2400" b="0" i="0" u="none" strike="noStrike" dirty="0">
+                      <a:endParaRPr lang="en-CA" sz="2000" b="0" i="0" u="none" strike="noStrike">
                         <a:solidFill>
                           <a:srgbClr val="000000"/>
                         </a:solidFill>
@@ -4877,12 +4741,12 @@
                     <a:p>
                       <a:pPr algn="l" fontAlgn="b"/>
                       <a:r>
-                        <a:rPr lang="en-CA" sz="2400" u="none" strike="noStrike">
+                        <a:rPr lang="en-CA" sz="2000" u="none" strike="noStrike">
                           <a:effectLst/>
                         </a:rPr>
                         <a:t>Welcome</a:t>
                       </a:r>
-                      <a:endParaRPr lang="en-CA" sz="2400" b="0" i="0" u="none" strike="noStrike">
+                      <a:endParaRPr lang="en-CA" sz="2000" b="0" i="0" u="none" strike="noStrike">
                         <a:solidFill>
                           <a:srgbClr val="000000"/>
                         </a:solidFill>
@@ -4900,12 +4764,12 @@
                     <a:p>
                       <a:pPr algn="l" fontAlgn="b"/>
                       <a:r>
-                        <a:rPr lang="en-CA" sz="2400" u="none" strike="noStrike">
+                        <a:rPr lang="en-CA" sz="2000" u="none" strike="noStrike" dirty="0">
                           <a:effectLst/>
                         </a:rPr>
                         <a:t>5 minutes</a:t>
                       </a:r>
-                      <a:endParaRPr lang="en-CA" sz="2400" b="0" i="0" u="none" strike="noStrike">
+                      <a:endParaRPr lang="en-CA" sz="2000" b="0" i="0" u="none" strike="noStrike" dirty="0">
                         <a:solidFill>
                           <a:srgbClr val="000000"/>
                         </a:solidFill>
@@ -4918,11 +4782,11 @@
                 </a:tc>
                 <a:extLst>
                   <a:ext uri="{0D108BD9-81ED-4DB2-BD59-A6C34878D82A}">
-                    <a16:rowId xmlns:a16="http://schemas.microsoft.com/office/drawing/2014/main" val="2756989235"/>
+                    <a16:rowId xmlns:a16="http://schemas.microsoft.com/office/drawing/2014/main" val="2702535241"/>
                   </a:ext>
                 </a:extLst>
               </a:tr>
-              <a:tr h="463645">
+              <a:tr h="472021">
                 <a:tc>
                   <a:txBody>
                     <a:bodyPr/>
@@ -4930,12 +4794,12 @@
                     <a:p>
                       <a:pPr algn="l" fontAlgn="b"/>
                       <a:r>
-                        <a:rPr lang="en-CA" sz="2400" u="none" strike="noStrike" dirty="0">
+                        <a:rPr lang="en-CA" sz="2000" u="none" strike="noStrike">
                           <a:effectLst/>
                         </a:rPr>
                         <a:t>John Hynes</a:t>
                       </a:r>
-                      <a:endParaRPr lang="en-CA" sz="2400" b="0" i="0" u="none" strike="noStrike" dirty="0">
+                      <a:endParaRPr lang="en-CA" sz="2000" b="0" i="0" u="none" strike="noStrike">
                         <a:solidFill>
                           <a:srgbClr val="000000"/>
                         </a:solidFill>
@@ -4953,12 +4817,12 @@
                     <a:p>
                       <a:pPr algn="l" fontAlgn="b"/>
                       <a:r>
-                        <a:rPr lang="en-CA" sz="2400" u="none" strike="noStrike">
+                        <a:rPr lang="en-CA" sz="2000" u="none" strike="noStrike">
                           <a:effectLst/>
                         </a:rPr>
                         <a:t>Welcome, team</a:t>
                       </a:r>
-                      <a:endParaRPr lang="en-CA" sz="2400" b="0" i="0" u="none" strike="noStrike">
+                      <a:endParaRPr lang="en-CA" sz="2000" b="0" i="0" u="none" strike="noStrike">
                         <a:solidFill>
                           <a:srgbClr val="000000"/>
                         </a:solidFill>
@@ -4976,12 +4840,12 @@
                     <a:p>
                       <a:pPr algn="l" fontAlgn="b"/>
                       <a:r>
-                        <a:rPr lang="en-CA" sz="2400" u="none" strike="noStrike">
+                        <a:rPr lang="en-CA" sz="2000" u="none" strike="noStrike" dirty="0">
                           <a:effectLst/>
                         </a:rPr>
                         <a:t>5 minutes</a:t>
                       </a:r>
-                      <a:endParaRPr lang="en-CA" sz="2400" b="0" i="0" u="none" strike="noStrike">
+                      <a:endParaRPr lang="en-CA" sz="2000" b="0" i="0" u="none" strike="noStrike" dirty="0">
                         <a:solidFill>
                           <a:srgbClr val="000000"/>
                         </a:solidFill>
@@ -4994,11 +4858,11 @@
                 </a:tc>
                 <a:extLst>
                   <a:ext uri="{0D108BD9-81ED-4DB2-BD59-A6C34878D82A}">
-                    <a16:rowId xmlns:a16="http://schemas.microsoft.com/office/drawing/2014/main" val="2061227054"/>
+                    <a16:rowId xmlns:a16="http://schemas.microsoft.com/office/drawing/2014/main" val="2891172841"/>
                   </a:ext>
                 </a:extLst>
               </a:tr>
-              <a:tr h="463645">
+              <a:tr h="472021">
                 <a:tc>
                   <a:txBody>
                     <a:bodyPr/>
@@ -5006,12 +4870,12 @@
                     <a:p>
                       <a:pPr algn="l" fontAlgn="b"/>
                       <a:r>
-                        <a:rPr lang="en-CA" sz="2400" u="none" strike="noStrike" dirty="0">
+                        <a:rPr lang="en-CA" sz="2000" u="none" strike="noStrike">
                           <a:effectLst/>
                         </a:rPr>
-                        <a:t>Alan Hummel</a:t>
+                        <a:t>Connie Liu</a:t>
                       </a:r>
-                      <a:endParaRPr lang="en-CA" sz="2400" b="0" i="0" u="none" strike="noStrike" dirty="0">
+                      <a:endParaRPr lang="en-CA" sz="2000" b="0" i="0" u="none" strike="noStrike">
                         <a:solidFill>
                           <a:srgbClr val="000000"/>
                         </a:solidFill>
@@ -5029,12 +4893,12 @@
                     <a:p>
                       <a:pPr algn="l" fontAlgn="b"/>
                       <a:r>
-                        <a:rPr lang="en-CA" sz="2400" u="none" strike="noStrike">
+                        <a:rPr lang="en-CA" sz="2000" u="none" strike="noStrike">
                           <a:effectLst/>
                         </a:rPr>
-                        <a:t>Using Git</a:t>
+                        <a:t>Presenting new team member</a:t>
                       </a:r>
-                      <a:endParaRPr lang="en-CA" sz="2400" b="0" i="0" u="none" strike="noStrike">
+                      <a:endParaRPr lang="en-CA" sz="2000" b="0" i="0" u="none" strike="noStrike">
                         <a:solidFill>
                           <a:srgbClr val="000000"/>
                         </a:solidFill>
@@ -5052,12 +4916,12 @@
                     <a:p>
                       <a:pPr algn="l" fontAlgn="b"/>
                       <a:r>
-                        <a:rPr lang="en-CA" sz="2400" u="none" strike="noStrike">
+                        <a:rPr lang="en-CA" sz="2000" u="none" strike="noStrike" dirty="0">
                           <a:effectLst/>
                         </a:rPr>
-                        <a:t>10 minutes</a:t>
+                        <a:t>1 minute</a:t>
                       </a:r>
-                      <a:endParaRPr lang="en-CA" sz="2400" b="0" i="0" u="none" strike="noStrike">
+                      <a:endParaRPr lang="en-CA" sz="2000" b="0" i="0" u="none" strike="noStrike" dirty="0">
                         <a:solidFill>
                           <a:srgbClr val="000000"/>
                         </a:solidFill>
@@ -5070,11 +4934,11 @@
                 </a:tc>
                 <a:extLst>
                   <a:ext uri="{0D108BD9-81ED-4DB2-BD59-A6C34878D82A}">
-                    <a16:rowId xmlns:a16="http://schemas.microsoft.com/office/drawing/2014/main" val="1455610762"/>
+                    <a16:rowId xmlns:a16="http://schemas.microsoft.com/office/drawing/2014/main" val="2144014997"/>
                   </a:ext>
                 </a:extLst>
               </a:tr>
-              <a:tr h="463645">
+              <a:tr h="472021">
                 <a:tc>
                   <a:txBody>
                     <a:bodyPr/>
@@ -5082,12 +4946,12 @@
                     <a:p>
                       <a:pPr algn="l" fontAlgn="b"/>
                       <a:r>
-                        <a:rPr lang="en-CA" sz="2400" u="none" strike="noStrike" dirty="0">
+                        <a:rPr lang="en-CA" sz="2000" u="none" strike="noStrike">
                           <a:effectLst/>
                         </a:rPr>
-                        <a:t>Olga Agady</a:t>
+                        <a:t>Alan Hummel</a:t>
                       </a:r>
-                      <a:endParaRPr lang="en-CA" sz="2400" b="0" i="0" u="none" strike="noStrike" dirty="0">
+                      <a:endParaRPr lang="en-CA" sz="2000" b="0" i="0" u="none" strike="noStrike">
                         <a:solidFill>
                           <a:srgbClr val="000000"/>
                         </a:solidFill>
@@ -5105,12 +4969,12 @@
                     <a:p>
                       <a:pPr algn="l" fontAlgn="b"/>
                       <a:r>
-                        <a:rPr lang="en-CA" sz="2400" u="none" strike="noStrike" dirty="0">
+                        <a:rPr lang="en-CA" sz="2000" u="none" strike="noStrike">
                           <a:effectLst/>
                         </a:rPr>
-                        <a:t>Integration with Box.com</a:t>
+                        <a:t>Using Git</a:t>
                       </a:r>
-                      <a:endParaRPr lang="en-CA" sz="2400" b="0" i="0" u="none" strike="noStrike" dirty="0">
+                      <a:endParaRPr lang="en-CA" sz="2000" b="0" i="0" u="none" strike="noStrike">
                         <a:solidFill>
                           <a:srgbClr val="000000"/>
                         </a:solidFill>
@@ -5128,12 +4992,12 @@
                     <a:p>
                       <a:pPr algn="l" fontAlgn="b"/>
                       <a:r>
-                        <a:rPr lang="en-CA" sz="2400" u="none" strike="noStrike">
+                        <a:rPr lang="en-CA" sz="2000" u="none" strike="noStrike" dirty="0">
                           <a:effectLst/>
                         </a:rPr>
-                        <a:t>5 minutes</a:t>
+                        <a:t>10 minutes</a:t>
                       </a:r>
-                      <a:endParaRPr lang="en-CA" sz="2400" b="0" i="0" u="none" strike="noStrike">
+                      <a:endParaRPr lang="en-CA" sz="2000" b="0" i="0" u="none" strike="noStrike" dirty="0">
                         <a:solidFill>
                           <a:srgbClr val="000000"/>
                         </a:solidFill>
@@ -5146,11 +5010,11 @@
                 </a:tc>
                 <a:extLst>
                   <a:ext uri="{0D108BD9-81ED-4DB2-BD59-A6C34878D82A}">
-                    <a16:rowId xmlns:a16="http://schemas.microsoft.com/office/drawing/2014/main" val="4252439213"/>
+                    <a16:rowId xmlns:a16="http://schemas.microsoft.com/office/drawing/2014/main" val="1452821693"/>
                   </a:ext>
                 </a:extLst>
               </a:tr>
-              <a:tr h="463645">
+              <a:tr h="472021">
                 <a:tc>
                   <a:txBody>
                     <a:bodyPr/>
@@ -5158,12 +5022,12 @@
                     <a:p>
                       <a:pPr algn="l" fontAlgn="b"/>
                       <a:r>
-                        <a:rPr lang="en-CA" sz="2400" u="none" strike="noStrike">
+                        <a:rPr lang="en-CA" sz="2000" u="none" strike="noStrike">
                           <a:effectLst/>
                         </a:rPr>
-                        <a:t>Anita Wong</a:t>
+                        <a:t>Olga Agady</a:t>
                       </a:r>
-                      <a:endParaRPr lang="en-CA" sz="2400" b="0" i="0" u="none" strike="noStrike">
+                      <a:endParaRPr lang="en-CA" sz="2000" b="0" i="0" u="none" strike="noStrike">
                         <a:solidFill>
                           <a:srgbClr val="000000"/>
                         </a:solidFill>
@@ -5181,12 +5045,12 @@
                     <a:p>
                       <a:pPr algn="l" fontAlgn="b"/>
                       <a:r>
-                        <a:rPr lang="en-CA" sz="2400" u="none" strike="noStrike" dirty="0">
+                        <a:rPr lang="en-CA" sz="2000" u="none" strike="noStrike">
                           <a:effectLst/>
                         </a:rPr>
-                        <a:t>FMS Upgrade Update</a:t>
+                        <a:t>Integration with Box.com</a:t>
                       </a:r>
-                      <a:endParaRPr lang="en-CA" sz="2400" b="0" i="0" u="none" strike="noStrike" dirty="0">
+                      <a:endParaRPr lang="en-CA" sz="2000" b="0" i="0" u="none" strike="noStrike">
                         <a:solidFill>
                           <a:srgbClr val="000000"/>
                         </a:solidFill>
@@ -5204,12 +5068,12 @@
                     <a:p>
                       <a:pPr algn="l" fontAlgn="b"/>
                       <a:r>
-                        <a:rPr lang="en-CA" sz="2400" u="none" strike="noStrike">
+                        <a:rPr lang="en-CA" sz="2000" u="none" strike="noStrike" dirty="0">
                           <a:effectLst/>
                         </a:rPr>
                         <a:t>5 minutes</a:t>
                       </a:r>
-                      <a:endParaRPr lang="en-CA" sz="2400" b="0" i="0" u="none" strike="noStrike">
+                      <a:endParaRPr lang="en-CA" sz="2000" b="0" i="0" u="none" strike="noStrike" dirty="0">
                         <a:solidFill>
                           <a:srgbClr val="000000"/>
                         </a:solidFill>
@@ -5222,11 +5086,11 @@
                 </a:tc>
                 <a:extLst>
                   <a:ext uri="{0D108BD9-81ED-4DB2-BD59-A6C34878D82A}">
-                    <a16:rowId xmlns:a16="http://schemas.microsoft.com/office/drawing/2014/main" val="2455710005"/>
+                    <a16:rowId xmlns:a16="http://schemas.microsoft.com/office/drawing/2014/main" val="400757973"/>
                   </a:ext>
                 </a:extLst>
               </a:tr>
-              <a:tr h="463645">
+              <a:tr h="472021">
                 <a:tc>
                   <a:txBody>
                     <a:bodyPr/>
@@ -5234,12 +5098,12 @@
                     <a:p>
                       <a:pPr algn="l" fontAlgn="b"/>
                       <a:r>
-                        <a:rPr lang="en-CA" sz="2400" u="none" strike="noStrike">
+                        <a:rPr lang="en-CA" sz="2000" u="none" strike="noStrike">
                           <a:effectLst/>
                         </a:rPr>
-                        <a:t>Senthil/Melissa</a:t>
+                        <a:t>Anita Wong</a:t>
                       </a:r>
-                      <a:endParaRPr lang="en-CA" sz="2400" b="0" i="0" u="none" strike="noStrike">
+                      <a:endParaRPr lang="en-CA" sz="2000" b="0" i="0" u="none" strike="noStrike">
                         <a:solidFill>
                           <a:srgbClr val="000000"/>
                         </a:solidFill>
@@ -5257,12 +5121,12 @@
                     <a:p>
                       <a:pPr algn="l" fontAlgn="b"/>
                       <a:r>
-                        <a:rPr lang="en-CA" sz="2400" u="none" strike="noStrike" dirty="0">
+                        <a:rPr lang="en-CA" sz="2000" u="none" strike="noStrike">
                           <a:effectLst/>
                         </a:rPr>
-                        <a:t>Digitalization Team Update</a:t>
+                        <a:t>FMS Upgrade Update</a:t>
                       </a:r>
-                      <a:endParaRPr lang="en-CA" sz="2400" b="0" i="0" u="none" strike="noStrike" dirty="0">
+                      <a:endParaRPr lang="en-CA" sz="2000" b="0" i="0" u="none" strike="noStrike">
                         <a:solidFill>
                           <a:srgbClr val="000000"/>
                         </a:solidFill>
@@ -5280,12 +5144,12 @@
                     <a:p>
                       <a:pPr algn="l" fontAlgn="b"/>
                       <a:r>
-                        <a:rPr lang="en-CA" sz="2400" u="none" strike="noStrike">
+                        <a:rPr lang="en-CA" sz="2000" u="none" strike="noStrike" dirty="0">
                           <a:effectLst/>
                         </a:rPr>
-                        <a:t>10 minutes</a:t>
+                        <a:t>5 minutes</a:t>
                       </a:r>
-                      <a:endParaRPr lang="en-CA" sz="2400" b="0" i="0" u="none" strike="noStrike">
+                      <a:endParaRPr lang="en-CA" sz="2000" b="0" i="0" u="none" strike="noStrike" dirty="0">
                         <a:solidFill>
                           <a:srgbClr val="000000"/>
                         </a:solidFill>
@@ -5298,11 +5162,11 @@
                 </a:tc>
                 <a:extLst>
                   <a:ext uri="{0D108BD9-81ED-4DB2-BD59-A6C34878D82A}">
-                    <a16:rowId xmlns:a16="http://schemas.microsoft.com/office/drawing/2014/main" val="4216602696"/>
+                    <a16:rowId xmlns:a16="http://schemas.microsoft.com/office/drawing/2014/main" val="1492674951"/>
                   </a:ext>
                 </a:extLst>
               </a:tr>
-              <a:tr h="463645">
+              <a:tr h="472021">
                 <a:tc>
                   <a:txBody>
                     <a:bodyPr/>
@@ -5310,12 +5174,12 @@
                     <a:p>
                       <a:pPr algn="l" fontAlgn="b"/>
                       <a:r>
-                        <a:rPr lang="en-CA" sz="2400" u="none" strike="noStrike">
+                        <a:rPr lang="en-CA" sz="2000" u="none" strike="noStrike">
                           <a:effectLst/>
                         </a:rPr>
-                        <a:t>Andrew</a:t>
+                        <a:t>Senthil/Melissa</a:t>
                       </a:r>
-                      <a:endParaRPr lang="en-CA" sz="2400" b="0" i="0" u="none" strike="noStrike">
+                      <a:endParaRPr lang="en-CA" sz="2000" b="0" i="0" u="none" strike="noStrike">
                         <a:solidFill>
                           <a:srgbClr val="000000"/>
                         </a:solidFill>
@@ -5333,12 +5197,12 @@
                     <a:p>
                       <a:pPr algn="l" fontAlgn="b"/>
                       <a:r>
-                        <a:rPr lang="en-CA" sz="2400" u="none" strike="noStrike" dirty="0">
+                        <a:rPr lang="en-CA" sz="2000" u="none" strike="noStrike">
                           <a:effectLst/>
                         </a:rPr>
-                        <a:t>RA</a:t>
+                        <a:t>Digitalization Team Update</a:t>
                       </a:r>
-                      <a:endParaRPr lang="en-CA" sz="2400" b="0" i="0" u="none" strike="noStrike" dirty="0">
+                      <a:endParaRPr lang="en-CA" sz="2000" b="0" i="0" u="none" strike="noStrike">
                         <a:solidFill>
                           <a:srgbClr val="000000"/>
                         </a:solidFill>
@@ -5356,12 +5220,12 @@
                     <a:p>
                       <a:pPr algn="l" fontAlgn="b"/>
                       <a:r>
-                        <a:rPr lang="en-CA" sz="2400" u="none" strike="noStrike">
+                        <a:rPr lang="en-CA" sz="2000" u="none" strike="noStrike" dirty="0">
                           <a:effectLst/>
                         </a:rPr>
-                        <a:t>5 minutes</a:t>
+                        <a:t>10 minutes</a:t>
                       </a:r>
-                      <a:endParaRPr lang="en-CA" sz="2400" b="0" i="0" u="none" strike="noStrike">
+                      <a:endParaRPr lang="en-CA" sz="2000" b="0" i="0" u="none" strike="noStrike" dirty="0">
                         <a:solidFill>
                           <a:srgbClr val="000000"/>
                         </a:solidFill>
@@ -5374,11 +5238,11 @@
                 </a:tc>
                 <a:extLst>
                   <a:ext uri="{0D108BD9-81ED-4DB2-BD59-A6C34878D82A}">
-                    <a16:rowId xmlns:a16="http://schemas.microsoft.com/office/drawing/2014/main" val="1968877804"/>
+                    <a16:rowId xmlns:a16="http://schemas.microsoft.com/office/drawing/2014/main" val="788210309"/>
                   </a:ext>
                 </a:extLst>
               </a:tr>
-              <a:tr h="463645">
+              <a:tr h="472021">
                 <a:tc>
                   <a:txBody>
                     <a:bodyPr/>
@@ -5386,12 +5250,12 @@
                     <a:p>
                       <a:pPr algn="l" fontAlgn="b"/>
                       <a:r>
-                        <a:rPr lang="en-CA" sz="2400" u="none" strike="noStrike">
+                        <a:rPr lang="en-CA" sz="2000" u="none" strike="noStrike">
                           <a:effectLst/>
                         </a:rPr>
-                        <a:t>Laura</a:t>
+                        <a:t>Andrew</a:t>
                       </a:r>
-                      <a:endParaRPr lang="en-CA" sz="2400" b="0" i="0" u="none" strike="noStrike">
+                      <a:endParaRPr lang="en-CA" sz="2000" b="0" i="0" u="none" strike="noStrike">
                         <a:solidFill>
                           <a:srgbClr val="000000"/>
                         </a:solidFill>
@@ -5409,12 +5273,12 @@
                     <a:p>
                       <a:pPr algn="l" fontAlgn="b"/>
                       <a:r>
-                        <a:rPr lang="en-CA" sz="2400" u="none" strike="noStrike" dirty="0">
+                        <a:rPr lang="en-CA" sz="2000" u="none" strike="noStrike">
                           <a:effectLst/>
                         </a:rPr>
-                        <a:t>VBS</a:t>
+                        <a:t>RA</a:t>
                       </a:r>
-                      <a:endParaRPr lang="en-CA" sz="2400" b="0" i="0" u="none" strike="noStrike" dirty="0">
+                      <a:endParaRPr lang="en-CA" sz="2000" b="0" i="0" u="none" strike="noStrike">
                         <a:solidFill>
                           <a:srgbClr val="000000"/>
                         </a:solidFill>
@@ -5432,12 +5296,12 @@
                     <a:p>
                       <a:pPr algn="l" fontAlgn="b"/>
                       <a:r>
-                        <a:rPr lang="en-CA" sz="2400" u="none" strike="noStrike" dirty="0">
+                        <a:rPr lang="en-CA" sz="2000" u="none" strike="noStrike" dirty="0">
                           <a:effectLst/>
                         </a:rPr>
                         <a:t>5 minutes</a:t>
                       </a:r>
-                      <a:endParaRPr lang="en-CA" sz="2400" b="0" i="0" u="none" strike="noStrike" dirty="0">
+                      <a:endParaRPr lang="en-CA" sz="2000" b="0" i="0" u="none" strike="noStrike" dirty="0">
                         <a:solidFill>
                           <a:srgbClr val="000000"/>
                         </a:solidFill>
@@ -5450,11 +5314,11 @@
                 </a:tc>
                 <a:extLst>
                   <a:ext uri="{0D108BD9-81ED-4DB2-BD59-A6C34878D82A}">
-                    <a16:rowId xmlns:a16="http://schemas.microsoft.com/office/drawing/2014/main" val="238770617"/>
+                    <a16:rowId xmlns:a16="http://schemas.microsoft.com/office/drawing/2014/main" val="4213012268"/>
                   </a:ext>
                 </a:extLst>
               </a:tr>
-              <a:tr h="486827">
+              <a:tr h="472021">
                 <a:tc>
                   <a:txBody>
                     <a:bodyPr/>
@@ -5462,12 +5326,12 @@
                     <a:p>
                       <a:pPr algn="l" fontAlgn="b"/>
                       <a:r>
-                        <a:rPr lang="en-CA" sz="2400" u="none" strike="noStrike">
+                        <a:rPr lang="en-CA" sz="2000" u="none" strike="noStrike">
                           <a:effectLst/>
                         </a:rPr>
-                        <a:t>Shazi</a:t>
+                        <a:t>Laura</a:t>
                       </a:r>
-                      <a:endParaRPr lang="en-CA" sz="2400" b="0" i="0" u="none" strike="noStrike">
+                      <a:endParaRPr lang="en-CA" sz="2000" b="0" i="0" u="none" strike="noStrike">
                         <a:solidFill>
                           <a:srgbClr val="000000"/>
                         </a:solidFill>
@@ -5485,12 +5349,12 @@
                     <a:p>
                       <a:pPr algn="l" fontAlgn="b"/>
                       <a:r>
-                        <a:rPr lang="en-CA" sz="2400" u="none" strike="noStrike">
+                        <a:rPr lang="en-CA" sz="2000" u="none" strike="noStrike">
                           <a:effectLst/>
                         </a:rPr>
-                        <a:t>UCS Migration Tech Team</a:t>
+                        <a:t>VBS</a:t>
                       </a:r>
-                      <a:endParaRPr lang="en-CA" sz="2400" b="0" i="0" u="none" strike="noStrike">
+                      <a:endParaRPr lang="en-CA" sz="2000" b="0" i="0" u="none" strike="noStrike">
                         <a:solidFill>
                           <a:srgbClr val="000000"/>
                         </a:solidFill>
@@ -5508,12 +5372,12 @@
                     <a:p>
                       <a:pPr algn="l" fontAlgn="b"/>
                       <a:r>
-                        <a:rPr lang="en-CA" sz="2400" u="none" strike="noStrike" dirty="0">
+                        <a:rPr lang="en-CA" sz="2000" u="none" strike="noStrike" dirty="0">
                           <a:effectLst/>
                         </a:rPr>
                         <a:t>5 minutes</a:t>
                       </a:r>
-                      <a:endParaRPr lang="en-CA" sz="2400" b="0" i="0" u="none" strike="noStrike" dirty="0">
+                      <a:endParaRPr lang="en-CA" sz="2000" b="0" i="0" u="none" strike="noStrike" dirty="0">
                         <a:solidFill>
                           <a:srgbClr val="000000"/>
                         </a:solidFill>
@@ -5526,7 +5390,83 @@
                 </a:tc>
                 <a:extLst>
                   <a:ext uri="{0D108BD9-81ED-4DB2-BD59-A6C34878D82A}">
-                    <a16:rowId xmlns:a16="http://schemas.microsoft.com/office/drawing/2014/main" val="3100988991"/>
+                    <a16:rowId xmlns:a16="http://schemas.microsoft.com/office/drawing/2014/main" val="211355023"/>
+                  </a:ext>
+                </a:extLst>
+              </a:tr>
+              <a:tr h="495622">
+                <a:tc>
+                  <a:txBody>
+                    <a:bodyPr/>
+                    <a:lstStyle/>
+                    <a:p>
+                      <a:pPr algn="l" fontAlgn="b"/>
+                      <a:r>
+                        <a:rPr lang="en-CA" sz="2000" u="none" strike="noStrike">
+                          <a:effectLst/>
+                        </a:rPr>
+                        <a:t>Shazi</a:t>
+                      </a:r>
+                      <a:endParaRPr lang="en-CA" sz="2000" b="0" i="0" u="none" strike="noStrike">
+                        <a:solidFill>
+                          <a:srgbClr val="000000"/>
+                        </a:solidFill>
+                        <a:effectLst/>
+                        <a:latin typeface="Calibri" panose="020F0502020204030204" pitchFamily="34" charset="0"/>
+                      </a:endParaRPr>
+                    </a:p>
+                  </a:txBody>
+                  <a:tcPr marL="9525" marR="9525" marT="9525" marB="0" anchor="b"/>
+                </a:tc>
+                <a:tc>
+                  <a:txBody>
+                    <a:bodyPr/>
+                    <a:lstStyle/>
+                    <a:p>
+                      <a:pPr algn="l" fontAlgn="b"/>
+                      <a:r>
+                        <a:rPr lang="en-CA" sz="2000" u="none" strike="noStrike">
+                          <a:effectLst/>
+                        </a:rPr>
+                        <a:t>UCS Migration Tech Team</a:t>
+                      </a:r>
+                      <a:endParaRPr lang="en-CA" sz="2000" b="0" i="0" u="none" strike="noStrike">
+                        <a:solidFill>
+                          <a:srgbClr val="000000"/>
+                        </a:solidFill>
+                        <a:effectLst/>
+                        <a:latin typeface="Calibri" panose="020F0502020204030204" pitchFamily="34" charset="0"/>
+                      </a:endParaRPr>
+                    </a:p>
+                  </a:txBody>
+                  <a:tcPr marL="9525" marR="9525" marT="9525" marB="0" anchor="b"/>
+                </a:tc>
+                <a:tc>
+                  <a:txBody>
+                    <a:bodyPr/>
+                    <a:lstStyle/>
+                    <a:p>
+                      <a:pPr algn="l" fontAlgn="b"/>
+                      <a:r>
+                        <a:rPr lang="en-CA" sz="2000" u="none" strike="noStrike" dirty="0">
+                          <a:effectLst/>
+                        </a:rPr>
+                        <a:t>5 minutes</a:t>
+                      </a:r>
+                      <a:endParaRPr lang="en-CA" sz="2000" b="0" i="0" u="none" strike="noStrike" dirty="0">
+                        <a:solidFill>
+                          <a:srgbClr val="000000"/>
+                        </a:solidFill>
+                        <a:effectLst/>
+                        <a:latin typeface="Calibri" panose="020F0502020204030204" pitchFamily="34" charset="0"/>
+                      </a:endParaRPr>
+                    </a:p>
+                  </a:txBody>
+                  <a:tcPr marL="9525" marR="9525" marT="9525" marB="0" anchor="b"/>
+                </a:tc>
+                <a:extLst>
+                  <a:ext uri="{0D108BD9-81ED-4DB2-BD59-A6C34878D82A}">
+                    <a16:rowId xmlns:a16="http://schemas.microsoft.com/office/drawing/2014/main" val="261875958"/>
                   </a:ext>
                 </a:extLst>
               </a:tr>
@@ -5538,6 +5478,142 @@
     <p:extLst>
       <p:ext uri="{BB962C8B-B14F-4D97-AF65-F5344CB8AC3E}">
         <p14:creationId xmlns:p14="http://schemas.microsoft.com/office/powerpoint/2010/main" val="382270361"/>
+      </p:ext>
+    </p:extLst>
+  </p:cSld>
+  <p:clrMapOvr>
+    <a:masterClrMapping/>
+  </p:clrMapOvr>
+</p:sld>
+</file>
+
+<file path=ppt/slides/slide3.xml><?xml version="1.0" encoding="utf-8"?>
+<p:sld xmlns:a="http://schemas.openxmlformats.org/drawingml/2006/main" xmlns:r="http://schemas.openxmlformats.org/officeDocument/2006/relationships" xmlns:p="http://schemas.openxmlformats.org/presentationml/2006/main">
+  <p:cSld>
+    <p:spTree>
+      <p:nvGrpSpPr>
+        <p:cNvPr id="1" name=""/>
+        <p:cNvGrpSpPr/>
+        <p:nvPr/>
+      </p:nvGrpSpPr>
+      <p:grpSpPr>
+        <a:xfrm>
+          <a:off x="0" y="0"/>
+          <a:ext cx="0" cy="0"/>
+          <a:chOff x="0" y="0"/>
+          <a:chExt cx="0" cy="0"/>
+        </a:xfrm>
+      </p:grpSpPr>
+      <p:pic>
+        <p:nvPicPr>
+          <p:cNvPr id="4" name="Picture 3"/>
+          <p:cNvPicPr>
+            <a:picLocks noChangeAspect="1"/>
+          </p:cNvPicPr>
+          <p:nvPr/>
+        </p:nvPicPr>
+        <p:blipFill>
+          <a:blip r:embed="rId3"/>
+          <a:stretch>
+            <a:fillRect/>
+          </a:stretch>
+        </p:blipFill>
+        <p:spPr>
+          <a:xfrm>
+            <a:off x="172435" y="173514"/>
+            <a:ext cx="2133785" cy="472481"/>
+          </a:xfrm>
+          <a:prstGeom prst="rect">
+            <a:avLst/>
+          </a:prstGeom>
+        </p:spPr>
+      </p:pic>
+      <p:sp>
+        <p:nvSpPr>
+          <p:cNvPr id="5" name="Rectangle 4"/>
+          <p:cNvSpPr/>
+          <p:nvPr/>
+        </p:nvSpPr>
+        <p:spPr>
+          <a:xfrm>
+            <a:off x="172435" y="654621"/>
+            <a:ext cx="11852788" cy="45719"/>
+          </a:xfrm>
+          <a:prstGeom prst="rect">
+            <a:avLst/>
+          </a:prstGeom>
+          <a:solidFill>
+            <a:srgbClr val="0070C0"/>
+          </a:solidFill>
+          <a:ln>
+            <a:noFill/>
+          </a:ln>
+        </p:spPr>
+        <p:style>
+          <a:lnRef idx="2">
+            <a:schemeClr val="accent1">
+              <a:shade val="50000"/>
+            </a:schemeClr>
+          </a:lnRef>
+          <a:fillRef idx="1">
+            <a:schemeClr val="accent1"/>
+          </a:fillRef>
+          <a:effectRef idx="0">
+            <a:schemeClr val="accent1"/>
+          </a:effectRef>
+          <a:fontRef idx="minor">
+            <a:schemeClr val="lt1"/>
+          </a:fontRef>
+        </p:style>
+        <p:txBody>
+          <a:bodyPr rtlCol="0" anchor="ctr"/>
+          <a:lstStyle/>
+          <a:p>
+            <a:pPr algn="ctr"/>
+            <a:endParaRPr lang="en-CA"/>
+          </a:p>
+        </p:txBody>
+      </p:sp>
+      <p:pic>
+        <p:nvPicPr>
+          <p:cNvPr id="3" name="Picture 2">
+            <a:extLst>
+              <a:ext uri="{FF2B5EF4-FFF2-40B4-BE49-F238E27FC236}">
+                <a16:creationId xmlns:a16="http://schemas.microsoft.com/office/drawing/2014/main" id="{C1EE7496-9102-4190-A337-4F1514F4C74F}"/>
+              </a:ext>
+            </a:extLst>
+          </p:cNvPr>
+          <p:cNvPicPr>
+            <a:picLocks noChangeAspect="1"/>
+          </p:cNvPicPr>
+          <p:nvPr/>
+        </p:nvPicPr>
+        <p:blipFill>
+          <a:blip r:embed="rId4">
+            <a:extLst>
+              <a:ext uri="{28A0092B-C50C-407E-A947-70E740481C1C}">
+                <a14:useLocalDpi xmlns:a14="http://schemas.microsoft.com/office/drawing/2010/main" val="0"/>
+              </a:ext>
+            </a:extLst>
+          </a:blip>
+          <a:stretch>
+            <a:fillRect/>
+          </a:stretch>
+        </p:blipFill>
+        <p:spPr>
+          <a:xfrm>
+            <a:off x="4184543" y="890965"/>
+            <a:ext cx="4200040" cy="5576817"/>
+          </a:xfrm>
+          <a:prstGeom prst="rect">
+            <a:avLst/>
+          </a:prstGeom>
+        </p:spPr>
+      </p:pic>
+    </p:spTree>
+    <p:extLst>
+      <p:ext uri="{BB962C8B-B14F-4D97-AF65-F5344CB8AC3E}">
+        <p14:creationId xmlns:p14="http://schemas.microsoft.com/office/powerpoint/2010/main" val="4234798870"/>
       </p:ext>
     </p:extLst>
   </p:cSld>

</xml_diff>

<commit_message>
Updated agenda - Sanjay presentation.
</commit_message>
<xml_diff>
--- a/IS Team Updates - November 22.pptx
+++ b/IS Team Updates - November 22.pptx
@@ -11343,10 +11343,10 @@
       </p:sp>
       <p:graphicFrame>
         <p:nvGraphicFramePr>
-          <p:cNvPr id="2" name="Table 1">
-            <a:extLst>
-              <a:ext uri="{FF2B5EF4-FFF2-40B4-BE49-F238E27FC236}">
-                <a16:creationId xmlns:a16="http://schemas.microsoft.com/office/drawing/2014/main" id="{42B27CC4-9D1B-4B11-A60F-5F4EC6C45516}"/>
+          <p:cNvPr id="6" name="Table 5">
+            <a:extLst>
+              <a:ext uri="{FF2B5EF4-FFF2-40B4-BE49-F238E27FC236}">
+                <a16:creationId xmlns:a16="http://schemas.microsoft.com/office/drawing/2014/main" id="{9693EDA5-F099-43AB-B93E-72C3BAB48E16}"/>
               </a:ext>
             </a:extLst>
           </p:cNvPr>
@@ -11356,14 +11356,14 @@
           <p:nvPr>
             <p:extLst>
               <p:ext uri="{D42A27DB-BD31-4B8C-83A1-F6EECF244321}">
-                <p14:modId xmlns:p14="http://schemas.microsoft.com/office/powerpoint/2010/main" val="2076926999"/>
+                <p14:modId xmlns:p14="http://schemas.microsoft.com/office/powerpoint/2010/main" val="4256420135"/>
               </p:ext>
             </p:extLst>
           </p:nvPr>
         </p:nvGraphicFramePr>
         <p:xfrm>
-          <a:off x="172434" y="1445054"/>
-          <a:ext cx="11852787" cy="5241016"/>
+          <a:off x="172435" y="1445054"/>
+          <a:ext cx="11852788" cy="5314317"/>
         </p:xfrm>
         <a:graphic>
           <a:graphicData uri="http://schemas.openxmlformats.org/drawingml/2006/table">
@@ -11375,26 +11375,26 @@
                 <a:gridCol w="2588261">
                   <a:extLst>
                     <a:ext uri="{9D8B030D-6E8A-4147-A177-3AD203B41FA5}">
-                      <a16:colId xmlns:a16="http://schemas.microsoft.com/office/drawing/2014/main" val="1964498945"/>
+                      <a16:colId xmlns:a16="http://schemas.microsoft.com/office/drawing/2014/main" val="1576377441"/>
                     </a:ext>
                   </a:extLst>
                 </a:gridCol>
-                <a:gridCol w="7160050">
+                <a:gridCol w="7160051">
                   <a:extLst>
                     <a:ext uri="{9D8B030D-6E8A-4147-A177-3AD203B41FA5}">
-                      <a16:colId xmlns:a16="http://schemas.microsoft.com/office/drawing/2014/main" val="3661957111"/>
+                      <a16:colId xmlns:a16="http://schemas.microsoft.com/office/drawing/2014/main" val="1081823371"/>
                     </a:ext>
                   </a:extLst>
                 </a:gridCol>
                 <a:gridCol w="2104476">
                   <a:extLst>
                     <a:ext uri="{9D8B030D-6E8A-4147-A177-3AD203B41FA5}">
-                      <a16:colId xmlns:a16="http://schemas.microsoft.com/office/drawing/2014/main" val="2698733019"/>
+                      <a16:colId xmlns:a16="http://schemas.microsoft.com/office/drawing/2014/main" val="220116113"/>
                     </a:ext>
                   </a:extLst>
                 </a:gridCol>
               </a:tblGrid>
-              <a:tr h="495622">
+              <a:tr h="454662">
                 <a:tc>
                   <a:txBody>
                     <a:bodyPr/>
@@ -11402,12 +11402,12 @@
                     <a:p>
                       <a:pPr algn="l" fontAlgn="b"/>
                       <a:r>
-                        <a:rPr lang="en-CA" sz="3200" b="1" u="none" strike="noStrike" dirty="0">
+                        <a:rPr lang="en-CA" sz="3200" b="1" u="none" strike="noStrike">
                           <a:effectLst/>
                         </a:rPr>
                         <a:t>Speaker</a:t>
                       </a:r>
-                      <a:endParaRPr lang="en-CA" sz="3200" b="1" i="0" u="none" strike="noStrike" dirty="0">
+                      <a:endParaRPr lang="en-CA" sz="3200" b="1" i="0" u="none" strike="noStrike">
                         <a:solidFill>
                           <a:srgbClr val="000000"/>
                         </a:solidFill>
@@ -11466,11 +11466,11 @@
                 </a:tc>
                 <a:extLst>
                   <a:ext uri="{0D108BD9-81ED-4DB2-BD59-A6C34878D82A}">
-                    <a16:rowId xmlns:a16="http://schemas.microsoft.com/office/drawing/2014/main" val="3757428655"/>
+                    <a16:rowId xmlns:a16="http://schemas.microsoft.com/office/drawing/2014/main" val="1715856308"/>
                   </a:ext>
                 </a:extLst>
               </a:tr>
-              <a:tr h="472021">
+              <a:tr h="433011">
                 <a:tc>
                   <a:txBody>
                     <a:bodyPr/>
@@ -11542,11 +11542,11 @@
                 </a:tc>
                 <a:extLst>
                   <a:ext uri="{0D108BD9-81ED-4DB2-BD59-A6C34878D82A}">
-                    <a16:rowId xmlns:a16="http://schemas.microsoft.com/office/drawing/2014/main" val="156583843"/>
+                    <a16:rowId xmlns:a16="http://schemas.microsoft.com/office/drawing/2014/main" val="909335479"/>
                   </a:ext>
                 </a:extLst>
               </a:tr>
-              <a:tr h="472021">
+              <a:tr h="433011">
                 <a:tc>
                   <a:txBody>
                     <a:bodyPr/>
@@ -11618,11 +11618,11 @@
                 </a:tc>
                 <a:extLst>
                   <a:ext uri="{0D108BD9-81ED-4DB2-BD59-A6C34878D82A}">
-                    <a16:rowId xmlns:a16="http://schemas.microsoft.com/office/drawing/2014/main" val="462608159"/>
+                    <a16:rowId xmlns:a16="http://schemas.microsoft.com/office/drawing/2014/main" val="1296476536"/>
                   </a:ext>
                 </a:extLst>
               </a:tr>
-              <a:tr h="472021">
+              <a:tr h="433011">
                 <a:tc>
                   <a:txBody>
                     <a:bodyPr/>
@@ -11694,11 +11694,11 @@
                 </a:tc>
                 <a:extLst>
                   <a:ext uri="{0D108BD9-81ED-4DB2-BD59-A6C34878D82A}">
-                    <a16:rowId xmlns:a16="http://schemas.microsoft.com/office/drawing/2014/main" val="2634361015"/>
+                    <a16:rowId xmlns:a16="http://schemas.microsoft.com/office/drawing/2014/main" val="2289789206"/>
                   </a:ext>
                 </a:extLst>
               </a:tr>
-              <a:tr h="472021">
+              <a:tr h="433011">
                 <a:tc>
                   <a:txBody>
                     <a:bodyPr/>
@@ -11770,11 +11770,11 @@
                 </a:tc>
                 <a:extLst>
                   <a:ext uri="{0D108BD9-81ED-4DB2-BD59-A6C34878D82A}">
-                    <a16:rowId xmlns:a16="http://schemas.microsoft.com/office/drawing/2014/main" val="249236893"/>
+                    <a16:rowId xmlns:a16="http://schemas.microsoft.com/office/drawing/2014/main" val="2280644566"/>
                   </a:ext>
                 </a:extLst>
               </a:tr>
-              <a:tr h="472021">
+              <a:tr h="433011">
                 <a:tc>
                   <a:txBody>
                     <a:bodyPr/>
@@ -11846,11 +11846,11 @@
                 </a:tc>
                 <a:extLst>
                   <a:ext uri="{0D108BD9-81ED-4DB2-BD59-A6C34878D82A}">
-                    <a16:rowId xmlns:a16="http://schemas.microsoft.com/office/drawing/2014/main" val="64394208"/>
+                    <a16:rowId xmlns:a16="http://schemas.microsoft.com/office/drawing/2014/main" val="3760461788"/>
                   </a:ext>
                 </a:extLst>
               </a:tr>
-              <a:tr h="472021">
+              <a:tr h="433011">
                 <a:tc>
                   <a:txBody>
                     <a:bodyPr/>
@@ -11922,11 +11922,11 @@
                 </a:tc>
                 <a:extLst>
                   <a:ext uri="{0D108BD9-81ED-4DB2-BD59-A6C34878D82A}">
-                    <a16:rowId xmlns:a16="http://schemas.microsoft.com/office/drawing/2014/main" val="2842465129"/>
+                    <a16:rowId xmlns:a16="http://schemas.microsoft.com/office/drawing/2014/main" val="2247761089"/>
                   </a:ext>
                 </a:extLst>
               </a:tr>
-              <a:tr h="472021">
+              <a:tr h="433011">
                 <a:tc>
                   <a:txBody>
                     <a:bodyPr/>
@@ -11998,11 +11998,11 @@
                 </a:tc>
                 <a:extLst>
                   <a:ext uri="{0D108BD9-81ED-4DB2-BD59-A6C34878D82A}">
-                    <a16:rowId xmlns:a16="http://schemas.microsoft.com/office/drawing/2014/main" val="1345028718"/>
+                    <a16:rowId xmlns:a16="http://schemas.microsoft.com/office/drawing/2014/main" val="4045697416"/>
                   </a:ext>
                 </a:extLst>
               </a:tr>
-              <a:tr h="472021">
+              <a:tr h="433011">
                 <a:tc>
                   <a:txBody>
                     <a:bodyPr/>
@@ -12074,11 +12074,11 @@
                 </a:tc>
                 <a:extLst>
                   <a:ext uri="{0D108BD9-81ED-4DB2-BD59-A6C34878D82A}">
-                    <a16:rowId xmlns:a16="http://schemas.microsoft.com/office/drawing/2014/main" val="2672306002"/>
+                    <a16:rowId xmlns:a16="http://schemas.microsoft.com/office/drawing/2014/main" val="1768039374"/>
                   </a:ext>
                 </a:extLst>
               </a:tr>
-              <a:tr h="472021">
+              <a:tr h="433011">
                 <a:tc>
                   <a:txBody>
                     <a:bodyPr/>
@@ -12150,11 +12150,87 @@
                 </a:tc>
                 <a:extLst>
                   <a:ext uri="{0D108BD9-81ED-4DB2-BD59-A6C34878D82A}">
-                    <a16:rowId xmlns:a16="http://schemas.microsoft.com/office/drawing/2014/main" val="263738726"/>
+                    <a16:rowId xmlns:a16="http://schemas.microsoft.com/office/drawing/2014/main" val="2831765500"/>
                   </a:ext>
                 </a:extLst>
               </a:tr>
-              <a:tr h="495622">
+              <a:tr h="433011">
+                <a:tc>
+                  <a:txBody>
+                    <a:bodyPr/>
+                    <a:lstStyle/>
+                    <a:p>
+                      <a:pPr algn="l" fontAlgn="b"/>
+                      <a:r>
+                        <a:rPr lang="en-CA" sz="2800" u="none" strike="noStrike">
+                          <a:effectLst/>
+                        </a:rPr>
+                        <a:t>Sanjay</a:t>
+                      </a:r>
+                      <a:endParaRPr lang="en-CA" sz="2800" b="0" i="0" u="none" strike="noStrike">
+                        <a:solidFill>
+                          <a:srgbClr val="000000"/>
+                        </a:solidFill>
+                        <a:effectLst/>
+                        <a:latin typeface="Calibri" panose="020F0502020204030204" pitchFamily="34" charset="0"/>
+                      </a:endParaRPr>
+                    </a:p>
+                  </a:txBody>
+                  <a:tcPr marL="9525" marR="9525" marT="9525" marB="0" anchor="b"/>
+                </a:tc>
+                <a:tc>
+                  <a:txBody>
+                    <a:bodyPr/>
+                    <a:lstStyle/>
+                    <a:p>
+                      <a:pPr algn="l" fontAlgn="b"/>
+                      <a:r>
+                        <a:rPr lang="en-CA" sz="2800" u="none" strike="noStrike">
+                          <a:effectLst/>
+                        </a:rPr>
+                        <a:t>TBD</a:t>
+                      </a:r>
+                      <a:endParaRPr lang="en-CA" sz="2800" b="0" i="0" u="none" strike="noStrike">
+                        <a:solidFill>
+                          <a:srgbClr val="000000"/>
+                        </a:solidFill>
+                        <a:effectLst/>
+                        <a:latin typeface="Calibri" panose="020F0502020204030204" pitchFamily="34" charset="0"/>
+                      </a:endParaRPr>
+                    </a:p>
+                  </a:txBody>
+                  <a:tcPr marL="9525" marR="9525" marT="9525" marB="0" anchor="b"/>
+                </a:tc>
+                <a:tc>
+                  <a:txBody>
+                    <a:bodyPr/>
+                    <a:lstStyle/>
+                    <a:p>
+                      <a:pPr algn="l" fontAlgn="b"/>
+                      <a:r>
+                        <a:rPr lang="en-CA" sz="2800" u="none" strike="noStrike" dirty="0">
+                          <a:effectLst/>
+                        </a:rPr>
+                        <a:t>10 minutes</a:t>
+                      </a:r>
+                      <a:endParaRPr lang="en-CA" sz="2800" b="0" i="0" u="none" strike="noStrike" dirty="0">
+                        <a:solidFill>
+                          <a:srgbClr val="000000"/>
+                        </a:solidFill>
+                        <a:effectLst/>
+                        <a:latin typeface="Calibri" panose="020F0502020204030204" pitchFamily="34" charset="0"/>
+                      </a:endParaRPr>
+                    </a:p>
+                  </a:txBody>
+                  <a:tcPr marL="9525" marR="9525" marT="9525" marB="0" anchor="b"/>
+                </a:tc>
+                <a:extLst>
+                  <a:ext uri="{0D108BD9-81ED-4DB2-BD59-A6C34878D82A}">
+                    <a16:rowId xmlns:a16="http://schemas.microsoft.com/office/drawing/2014/main" val="2542471200"/>
+                  </a:ext>
+                </a:extLst>
+              </a:tr>
+              <a:tr h="454662">
                 <a:tc>
                   <a:txBody>
                     <a:bodyPr/>
@@ -12226,7 +12302,7 @@
                 </a:tc>
                 <a:extLst>
                   <a:ext uri="{0D108BD9-81ED-4DB2-BD59-A6C34878D82A}">
-                    <a16:rowId xmlns:a16="http://schemas.microsoft.com/office/drawing/2014/main" val="359657952"/>
+                    <a16:rowId xmlns:a16="http://schemas.microsoft.com/office/drawing/2014/main" val="2285177520"/>
                   </a:ext>
                 </a:extLst>
               </a:tr>

</xml_diff>

<commit_message>
Changes made by Olga to her presentation.
</commit_message>
<xml_diff>
--- a/IS Team Updates - November 22.pptx
+++ b/IS Team Updates - November 22.pptx
@@ -241,7 +241,7 @@
           <a:p>
             <a:fld id="{4598C197-9706-4ECE-AEF4-B03F4297B35D}" type="datetimeFigureOut">
               <a:rPr lang="en-CA" smtClean="0"/>
-              <a:t>2018-11-20</a:t>
+              <a:t>2018-11-21</a:t>
             </a:fld>
             <a:endParaRPr lang="en-CA"/>
           </a:p>
@@ -2087,7 +2087,7 @@
           <a:p>
             <a:fld id="{37103718-E62E-477D-833E-2DE6F13C3277}" type="datetimeFigureOut">
               <a:rPr lang="en-CA" smtClean="0"/>
-              <a:t>2018-11-20</a:t>
+              <a:t>2018-11-21</a:t>
             </a:fld>
             <a:endParaRPr lang="en-CA"/>
           </a:p>
@@ -2287,7 +2287,7 @@
           <a:p>
             <a:fld id="{37103718-E62E-477D-833E-2DE6F13C3277}" type="datetimeFigureOut">
               <a:rPr lang="en-CA" smtClean="0"/>
-              <a:t>2018-11-20</a:t>
+              <a:t>2018-11-21</a:t>
             </a:fld>
             <a:endParaRPr lang="en-CA"/>
           </a:p>
@@ -2497,7 +2497,7 @@
           <a:p>
             <a:fld id="{37103718-E62E-477D-833E-2DE6F13C3277}" type="datetimeFigureOut">
               <a:rPr lang="en-CA" smtClean="0"/>
-              <a:t>2018-11-20</a:t>
+              <a:t>2018-11-21</a:t>
             </a:fld>
             <a:endParaRPr lang="en-CA"/>
           </a:p>
@@ -2697,7 +2697,7 @@
           <a:p>
             <a:fld id="{37103718-E62E-477D-833E-2DE6F13C3277}" type="datetimeFigureOut">
               <a:rPr lang="en-CA" smtClean="0"/>
-              <a:t>2018-11-20</a:t>
+              <a:t>2018-11-21</a:t>
             </a:fld>
             <a:endParaRPr lang="en-CA"/>
           </a:p>
@@ -2973,7 +2973,7 @@
           <a:p>
             <a:fld id="{37103718-E62E-477D-833E-2DE6F13C3277}" type="datetimeFigureOut">
               <a:rPr lang="en-CA" smtClean="0"/>
-              <a:t>2018-11-20</a:t>
+              <a:t>2018-11-21</a:t>
             </a:fld>
             <a:endParaRPr lang="en-CA"/>
           </a:p>
@@ -3241,7 +3241,7 @@
           <a:p>
             <a:fld id="{37103718-E62E-477D-833E-2DE6F13C3277}" type="datetimeFigureOut">
               <a:rPr lang="en-CA" smtClean="0"/>
-              <a:t>2018-11-20</a:t>
+              <a:t>2018-11-21</a:t>
             </a:fld>
             <a:endParaRPr lang="en-CA"/>
           </a:p>
@@ -3656,7 +3656,7 @@
           <a:p>
             <a:fld id="{37103718-E62E-477D-833E-2DE6F13C3277}" type="datetimeFigureOut">
               <a:rPr lang="en-CA" smtClean="0"/>
-              <a:t>2018-11-20</a:t>
+              <a:t>2018-11-21</a:t>
             </a:fld>
             <a:endParaRPr lang="en-CA"/>
           </a:p>
@@ -3798,7 +3798,7 @@
           <a:p>
             <a:fld id="{37103718-E62E-477D-833E-2DE6F13C3277}" type="datetimeFigureOut">
               <a:rPr lang="en-CA" smtClean="0"/>
-              <a:t>2018-11-20</a:t>
+              <a:t>2018-11-21</a:t>
             </a:fld>
             <a:endParaRPr lang="en-CA"/>
           </a:p>
@@ -3911,7 +3911,7 @@
           <a:p>
             <a:fld id="{37103718-E62E-477D-833E-2DE6F13C3277}" type="datetimeFigureOut">
               <a:rPr lang="en-CA" smtClean="0"/>
-              <a:t>2018-11-20</a:t>
+              <a:t>2018-11-21</a:t>
             </a:fld>
             <a:endParaRPr lang="en-CA"/>
           </a:p>
@@ -4224,7 +4224,7 @@
           <a:p>
             <a:fld id="{37103718-E62E-477D-833E-2DE6F13C3277}" type="datetimeFigureOut">
               <a:rPr lang="en-CA" smtClean="0"/>
-              <a:t>2018-11-20</a:t>
+              <a:t>2018-11-21</a:t>
             </a:fld>
             <a:endParaRPr lang="en-CA"/>
           </a:p>
@@ -4513,7 +4513,7 @@
           <a:p>
             <a:fld id="{37103718-E62E-477D-833E-2DE6F13C3277}" type="datetimeFigureOut">
               <a:rPr lang="en-CA" smtClean="0"/>
-              <a:t>2018-11-20</a:t>
+              <a:t>2018-11-21</a:t>
             </a:fld>
             <a:endParaRPr lang="en-CA"/>
           </a:p>
@@ -4756,7 +4756,7 @@
           <a:p>
             <a:fld id="{37103718-E62E-477D-833E-2DE6F13C3277}" type="datetimeFigureOut">
               <a:rPr lang="en-CA" smtClean="0"/>
-              <a:t>2018-11-20</a:t>
+              <a:t>2018-11-21</a:t>
             </a:fld>
             <a:endParaRPr lang="en-CA"/>
           </a:p>
@@ -9811,8 +9811,8 @@
         </p:nvSpPr>
         <p:spPr>
           <a:xfrm>
-            <a:off x="3854339" y="2820837"/>
-            <a:ext cx="4488985" cy="2062103"/>
+            <a:off x="3680167" y="677480"/>
+            <a:ext cx="4488985" cy="1446550"/>
           </a:xfrm>
           <a:prstGeom prst="rect">
             <a:avLst/>
@@ -9854,22 +9854,6 @@
           </a:p>
           <a:p>
             <a:pPr algn="ctr"/>
-            <a:endParaRPr lang="en-CA" sz="2000" dirty="0">
-              <a:solidFill>
-                <a:srgbClr val="FFC000"/>
-              </a:solidFill>
-            </a:endParaRPr>
-          </a:p>
-          <a:p>
-            <a:pPr algn="ctr"/>
-            <a:endParaRPr lang="en-CA" sz="2000" dirty="0">
-              <a:solidFill>
-                <a:srgbClr val="FFC000"/>
-              </a:solidFill>
-            </a:endParaRPr>
-          </a:p>
-          <a:p>
-            <a:pPr algn="ctr"/>
             <a:r>
               <a:rPr lang="en-CA" dirty="0">
                 <a:solidFill>
@@ -9893,6 +9877,112 @@
               </a:rPr>
               <a:t>olga.agady@tarion.com</a:t>
             </a:r>
+          </a:p>
+        </p:txBody>
+      </p:sp>
+      <p:sp>
+        <p:nvSpPr>
+          <p:cNvPr id="2" name="TextBox 1">
+            <a:extLst>
+              <a:ext uri="{FF2B5EF4-FFF2-40B4-BE49-F238E27FC236}">
+                <a16:creationId xmlns:a16="http://schemas.microsoft.com/office/drawing/2014/main" id="{EE3554F7-E557-42C3-9162-362EF1FC9AC8}"/>
+              </a:ext>
+            </a:extLst>
+          </p:cNvPr>
+          <p:cNvSpPr txBox="1"/>
+          <p:nvPr/>
+        </p:nvSpPr>
+        <p:spPr>
+          <a:xfrm>
+            <a:off x="1018903" y="3463609"/>
+            <a:ext cx="7063163" cy="1754326"/>
+          </a:xfrm>
+          <a:prstGeom prst="rect">
+            <a:avLst/>
+          </a:prstGeom>
+          <a:noFill/>
+        </p:spPr>
+        <p:txBody>
+          <a:bodyPr wrap="square" rtlCol="0">
+            <a:spAutoFit/>
+          </a:bodyPr>
+          <a:lstStyle/>
+          <a:p>
+            <a:pPr marL="285750" indent="-285750">
+              <a:buFont typeface="Arial" panose="020B0604020202020204" pitchFamily="34" charset="0"/>
+              <a:buChar char="•"/>
+            </a:pPr>
+            <a:r>
+              <a:rPr lang="en-CA" dirty="0">
+                <a:solidFill>
+                  <a:schemeClr val="accent1">
+                    <a:lumMod val="50000"/>
+                  </a:schemeClr>
+                </a:solidFill>
+              </a:rPr>
+              <a:t>My Home doesn’t allow to upload documents over 25MB</a:t>
+            </a:r>
+          </a:p>
+          <a:p>
+            <a:pPr marL="285750" indent="-285750">
+              <a:buFont typeface="Arial" panose="020B0604020202020204" pitchFamily="34" charset="0"/>
+              <a:buChar char="•"/>
+            </a:pPr>
+            <a:endParaRPr lang="en-CA" dirty="0">
+              <a:solidFill>
+                <a:schemeClr val="accent1">
+                  <a:lumMod val="50000"/>
+                </a:schemeClr>
+              </a:solidFill>
+            </a:endParaRPr>
+          </a:p>
+          <a:p>
+            <a:pPr marL="285750" indent="-285750">
+              <a:buFont typeface="Arial" panose="020B0604020202020204" pitchFamily="34" charset="0"/>
+              <a:buChar char="•"/>
+            </a:pPr>
+            <a:r>
+              <a:rPr lang="en-CA" dirty="0">
+                <a:solidFill>
+                  <a:schemeClr val="accent1">
+                    <a:lumMod val="50000"/>
+                  </a:schemeClr>
+                </a:solidFill>
+              </a:rPr>
+              <a:t>Large documents need to be approved before being uploaded to CN</a:t>
+            </a:r>
+          </a:p>
+          <a:p>
+            <a:pPr marL="285750" indent="-285750">
+              <a:buFont typeface="Arial" panose="020B0604020202020204" pitchFamily="34" charset="0"/>
+              <a:buChar char="•"/>
+            </a:pPr>
+            <a:endParaRPr lang="en-CA" dirty="0">
+              <a:solidFill>
+                <a:schemeClr val="accent1">
+                  <a:lumMod val="50000"/>
+                </a:schemeClr>
+              </a:solidFill>
+            </a:endParaRPr>
+          </a:p>
+          <a:p>
+            <a:pPr marL="285750" indent="-285750">
+              <a:buFont typeface="Arial" panose="020B0604020202020204" pitchFamily="34" charset="0"/>
+              <a:buChar char="•"/>
+            </a:pPr>
+            <a:r>
+              <a:rPr lang="en-CA" dirty="0">
+                <a:solidFill>
+                  <a:schemeClr val="accent1">
+                    <a:lumMod val="50000"/>
+                  </a:schemeClr>
+                </a:solidFill>
+              </a:rPr>
+              <a:t>Approvals and uploading to CN need to be automated</a:t>
+            </a:r>
+          </a:p>
+          <a:p>
+            <a:endParaRPr lang="en-CA" dirty="0"/>
           </a:p>
         </p:txBody>
       </p:sp>
@@ -10587,10 +10677,10 @@
       </p:sp>
       <p:sp>
         <p:nvSpPr>
-          <p:cNvPr id="40" name="TextBox 39">
-            <a:extLst>
-              <a:ext uri="{FF2B5EF4-FFF2-40B4-BE49-F238E27FC236}">
-                <a16:creationId xmlns:a16="http://schemas.microsoft.com/office/drawing/2014/main" id="{686DED4A-B7A4-4C7D-B33C-6D716406D195}"/>
+          <p:cNvPr id="41" name="TextBox 40">
+            <a:extLst>
+              <a:ext uri="{FF2B5EF4-FFF2-40B4-BE49-F238E27FC236}">
+                <a16:creationId xmlns:a16="http://schemas.microsoft.com/office/drawing/2014/main" id="{359823A6-6F61-4B07-8E11-2EA93B8B8792}"/>
               </a:ext>
             </a:extLst>
           </p:cNvPr>
@@ -10599,8 +10689,8 @@
         </p:nvSpPr>
         <p:spPr>
           <a:xfrm>
-            <a:off x="551048" y="3570305"/>
-            <a:ext cx="2428198" cy="307777"/>
+            <a:off x="2543970" y="1614008"/>
+            <a:ext cx="2428198" cy="523220"/>
           </a:xfrm>
           <a:prstGeom prst="rect">
             <a:avLst/>
@@ -10615,17 +10705,23 @@
           <a:p>
             <a:r>
               <a:rPr lang="en-CA" sz="1400" dirty="0"/>
-              <a:t>1. Upload large file</a:t>
-            </a:r>
-          </a:p>
-        </p:txBody>
-      </p:sp>
-      <p:sp>
-        <p:nvSpPr>
-          <p:cNvPr id="41" name="TextBox 40">
-            <a:extLst>
-              <a:ext uri="{FF2B5EF4-FFF2-40B4-BE49-F238E27FC236}">
-                <a16:creationId xmlns:a16="http://schemas.microsoft.com/office/drawing/2014/main" id="{359823A6-6F61-4B07-8E11-2EA93B8B8792}"/>
+              <a:t>2. My Home uploads </a:t>
+            </a:r>
+          </a:p>
+          <a:p>
+            <a:r>
+              <a:rPr lang="en-CA" sz="1400" dirty="0"/>
+              <a:t>the file to Box</a:t>
+            </a:r>
+          </a:p>
+        </p:txBody>
+      </p:sp>
+      <p:sp>
+        <p:nvSpPr>
+          <p:cNvPr id="42" name="TextBox 41">
+            <a:extLst>
+              <a:ext uri="{FF2B5EF4-FFF2-40B4-BE49-F238E27FC236}">
+                <a16:creationId xmlns:a16="http://schemas.microsoft.com/office/drawing/2014/main" id="{9C77BB43-5E86-4ADA-B042-554AD5A7FA1B}"/>
               </a:ext>
             </a:extLst>
           </p:cNvPr>
@@ -10634,8 +10730,8 @@
         </p:nvSpPr>
         <p:spPr>
           <a:xfrm>
-            <a:off x="2543970" y="1614008"/>
-            <a:ext cx="2428198" cy="523220"/>
+            <a:off x="7356783" y="1227463"/>
+            <a:ext cx="2428198" cy="738664"/>
           </a:xfrm>
           <a:prstGeom prst="rect">
             <a:avLst/>
@@ -10650,23 +10746,23 @@
           <a:p>
             <a:r>
               <a:rPr lang="en-CA" sz="1400" dirty="0"/>
-              <a:t>2. My Home uploads </a:t>
+              <a:t>3. Box sends notification to </a:t>
             </a:r>
           </a:p>
           <a:p>
             <a:r>
               <a:rPr lang="en-CA" sz="1400" dirty="0"/>
-              <a:t>file to Box</a:t>
-            </a:r>
-          </a:p>
-        </p:txBody>
-      </p:sp>
-      <p:sp>
-        <p:nvSpPr>
-          <p:cNvPr id="42" name="TextBox 41">
-            <a:extLst>
-              <a:ext uri="{FF2B5EF4-FFF2-40B4-BE49-F238E27FC236}">
-                <a16:creationId xmlns:a16="http://schemas.microsoft.com/office/drawing/2014/main" id="{9C77BB43-5E86-4ADA-B042-554AD5A7FA1B}"/>
+              <a:t>a Tarion user that the file is waiting for approval</a:t>
+            </a:r>
+          </a:p>
+        </p:txBody>
+      </p:sp>
+      <p:sp>
+        <p:nvSpPr>
+          <p:cNvPr id="43" name="TextBox 42">
+            <a:extLst>
+              <a:ext uri="{FF2B5EF4-FFF2-40B4-BE49-F238E27FC236}">
+                <a16:creationId xmlns:a16="http://schemas.microsoft.com/office/drawing/2014/main" id="{E7EC7240-978C-45D3-827E-63535DBF5D18}"/>
               </a:ext>
             </a:extLst>
           </p:cNvPr>
@@ -10675,8 +10771,8 @@
         </p:nvSpPr>
         <p:spPr>
           <a:xfrm>
-            <a:off x="7356783" y="1227463"/>
-            <a:ext cx="2428198" cy="738664"/>
+            <a:off x="7731639" y="2966275"/>
+            <a:ext cx="2428198" cy="523220"/>
           </a:xfrm>
           <a:prstGeom prst="rect">
             <a:avLst/>
@@ -10691,54 +10787,13 @@
           <a:p>
             <a:r>
               <a:rPr lang="en-CA" sz="1400" dirty="0"/>
-              <a:t>3. Box sends notification to </a:t>
+              <a:t>4. Tarion user </a:t>
             </a:r>
           </a:p>
           <a:p>
             <a:r>
               <a:rPr lang="en-CA" sz="1400" dirty="0"/>
-              <a:t>Tarion user that file is waiting for approval</a:t>
-            </a:r>
-          </a:p>
-        </p:txBody>
-      </p:sp>
-      <p:sp>
-        <p:nvSpPr>
-          <p:cNvPr id="43" name="TextBox 42">
-            <a:extLst>
-              <a:ext uri="{FF2B5EF4-FFF2-40B4-BE49-F238E27FC236}">
-                <a16:creationId xmlns:a16="http://schemas.microsoft.com/office/drawing/2014/main" id="{E7EC7240-978C-45D3-827E-63535DBF5D18}"/>
-              </a:ext>
-            </a:extLst>
-          </p:cNvPr>
-          <p:cNvSpPr txBox="1"/>
-          <p:nvPr/>
-        </p:nvSpPr>
-        <p:spPr>
-          <a:xfrm>
-            <a:off x="7731639" y="2966275"/>
-            <a:ext cx="2428198" cy="523220"/>
-          </a:xfrm>
-          <a:prstGeom prst="rect">
-            <a:avLst/>
-          </a:prstGeom>
-          <a:noFill/>
-        </p:spPr>
-        <p:txBody>
-          <a:bodyPr wrap="square" rtlCol="0">
-            <a:spAutoFit/>
-          </a:bodyPr>
-          <a:lstStyle/>
-          <a:p>
-            <a:r>
-              <a:rPr lang="en-CA" sz="1400" dirty="0"/>
-              <a:t>4. Tarion user </a:t>
-            </a:r>
-          </a:p>
-          <a:p>
-            <a:r>
-              <a:rPr lang="en-CA" sz="1400" dirty="0"/>
-              <a:t>approves file</a:t>
+              <a:t>approves the file</a:t>
             </a:r>
           </a:p>
         </p:txBody>
@@ -10885,8 +10940,8 @@
         </p:nvSpPr>
         <p:spPr>
           <a:xfrm>
-            <a:off x="5037893" y="3181706"/>
-            <a:ext cx="2428198" cy="738664"/>
+            <a:off x="5310076" y="3201559"/>
+            <a:ext cx="2428198" cy="523220"/>
           </a:xfrm>
           <a:prstGeom prst="rect">
             <a:avLst/>
@@ -10901,7 +10956,7 @@
           <a:p>
             <a:r>
               <a:rPr lang="en-CA" sz="1400" dirty="0"/>
-              <a:t>5. Tip is running a job which every few minutes checks for approved files. </a:t>
+              <a:t>5. Tip is running a job which checks for approved files. </a:t>
             </a:r>
           </a:p>
         </p:txBody>
@@ -11001,6 +11056,41 @@
                 </a:solidFill>
               </a:rPr>
               <a:t>Integration with Box.com      </a:t>
+            </a:r>
+          </a:p>
+        </p:txBody>
+      </p:sp>
+      <p:sp>
+        <p:nvSpPr>
+          <p:cNvPr id="29" name="TextBox 28">
+            <a:extLst>
+              <a:ext uri="{FF2B5EF4-FFF2-40B4-BE49-F238E27FC236}">
+                <a16:creationId xmlns:a16="http://schemas.microsoft.com/office/drawing/2014/main" id="{5A7E6F8C-CBFB-4A63-8C8E-C1392A158761}"/>
+              </a:ext>
+            </a:extLst>
+          </p:cNvPr>
+          <p:cNvSpPr txBox="1"/>
+          <p:nvPr/>
+        </p:nvSpPr>
+        <p:spPr>
+          <a:xfrm>
+            <a:off x="519242" y="3247420"/>
+            <a:ext cx="1605624" cy="738664"/>
+          </a:xfrm>
+          <a:prstGeom prst="rect">
+            <a:avLst/>
+          </a:prstGeom>
+          <a:noFill/>
+        </p:spPr>
+        <p:txBody>
+          <a:bodyPr wrap="square" rtlCol="0">
+            <a:spAutoFit/>
+          </a:bodyPr>
+          <a:lstStyle/>
+          <a:p>
+            <a:r>
+              <a:rPr lang="en-CA" sz="1400" dirty="0"/>
+              <a:t>1. Home owner uploads a large file to My Home</a:t>
             </a:r>
           </a:p>
         </p:txBody>

</xml_diff>

<commit_message>
Update to the Agenda, including Sammy Douglas.
</commit_message>
<xml_diff>
--- a/IS Team Updates - November 22.pptx
+++ b/IS Team Updates - November 22.pptx
@@ -11433,10 +11433,10 @@
       </p:sp>
       <p:graphicFrame>
         <p:nvGraphicFramePr>
-          <p:cNvPr id="6" name="Table 5">
-            <a:extLst>
-              <a:ext uri="{FF2B5EF4-FFF2-40B4-BE49-F238E27FC236}">
-                <a16:creationId xmlns:a16="http://schemas.microsoft.com/office/drawing/2014/main" id="{9693EDA5-F099-43AB-B93E-72C3BAB48E16}"/>
+          <p:cNvPr id="3" name="Table 2">
+            <a:extLst>
+              <a:ext uri="{FF2B5EF4-FFF2-40B4-BE49-F238E27FC236}">
+                <a16:creationId xmlns:a16="http://schemas.microsoft.com/office/drawing/2014/main" id="{DC388E3D-33AE-47AB-A433-DD21F5605880}"/>
               </a:ext>
             </a:extLst>
           </p:cNvPr>
@@ -11446,14 +11446,14 @@
           <p:nvPr>
             <p:extLst>
               <p:ext uri="{D42A27DB-BD31-4B8C-83A1-F6EECF244321}">
-                <p14:modId xmlns:p14="http://schemas.microsoft.com/office/powerpoint/2010/main" val="4256420135"/>
+                <p14:modId xmlns:p14="http://schemas.microsoft.com/office/powerpoint/2010/main" val="783581433"/>
               </p:ext>
             </p:extLst>
           </p:nvPr>
         </p:nvGraphicFramePr>
         <p:xfrm>
-          <a:off x="172435" y="1445054"/>
-          <a:ext cx="11852788" cy="5314317"/>
+          <a:off x="172435" y="1403780"/>
+          <a:ext cx="11847129" cy="5293685"/>
         </p:xfrm>
         <a:graphic>
           <a:graphicData uri="http://schemas.openxmlformats.org/drawingml/2006/table">
@@ -11462,29 +11462,29 @@
                 <a:tableStyleId>{5C22544A-7EE6-4342-B048-85BDC9FD1C3A}</a:tableStyleId>
               </a:tblPr>
               <a:tblGrid>
-                <a:gridCol w="2588261">
+                <a:gridCol w="2587025">
                   <a:extLst>
                     <a:ext uri="{9D8B030D-6E8A-4147-A177-3AD203B41FA5}">
-                      <a16:colId xmlns:a16="http://schemas.microsoft.com/office/drawing/2014/main" val="1576377441"/>
+                      <a16:colId xmlns:a16="http://schemas.microsoft.com/office/drawing/2014/main" val="3988172087"/>
                     </a:ext>
                   </a:extLst>
                 </a:gridCol>
-                <a:gridCol w="7160051">
+                <a:gridCol w="7156633">
                   <a:extLst>
                     <a:ext uri="{9D8B030D-6E8A-4147-A177-3AD203B41FA5}">
-                      <a16:colId xmlns:a16="http://schemas.microsoft.com/office/drawing/2014/main" val="1081823371"/>
+                      <a16:colId xmlns:a16="http://schemas.microsoft.com/office/drawing/2014/main" val="124294340"/>
                     </a:ext>
                   </a:extLst>
                 </a:gridCol>
-                <a:gridCol w="2104476">
+                <a:gridCol w="2103471">
                   <a:extLst>
                     <a:ext uri="{9D8B030D-6E8A-4147-A177-3AD203B41FA5}">
-                      <a16:colId xmlns:a16="http://schemas.microsoft.com/office/drawing/2014/main" val="220116113"/>
+                      <a16:colId xmlns:a16="http://schemas.microsoft.com/office/drawing/2014/main" val="1335370676"/>
                     </a:ext>
                   </a:extLst>
                 </a:gridCol>
               </a:tblGrid>
-              <a:tr h="454662">
+              <a:tr h="423263">
                 <a:tc>
                   <a:txBody>
                     <a:bodyPr/>
@@ -11492,12 +11492,12 @@
                     <a:p>
                       <a:pPr algn="l" fontAlgn="b"/>
                       <a:r>
-                        <a:rPr lang="en-CA" sz="3200" b="1" u="none" strike="noStrike">
+                        <a:rPr lang="en-CA" sz="2800" b="1" u="none" strike="noStrike">
                           <a:effectLst/>
                         </a:rPr>
                         <a:t>Speaker</a:t>
                       </a:r>
-                      <a:endParaRPr lang="en-CA" sz="3200" b="1" i="0" u="none" strike="noStrike">
+                      <a:endParaRPr lang="en-CA" sz="2800" b="1" i="0" u="none" strike="noStrike">
                         <a:solidFill>
                           <a:srgbClr val="000000"/>
                         </a:solidFill>
@@ -11515,12 +11515,12 @@
                     <a:p>
                       <a:pPr algn="l" fontAlgn="b"/>
                       <a:r>
-                        <a:rPr lang="en-CA" sz="3200" b="1" u="none" strike="noStrike">
+                        <a:rPr lang="en-CA" sz="2800" b="1" u="none" strike="noStrike">
                           <a:effectLst/>
                         </a:rPr>
                         <a:t>Subject</a:t>
                       </a:r>
-                      <a:endParaRPr lang="en-CA" sz="3200" b="1" i="0" u="none" strike="noStrike">
+                      <a:endParaRPr lang="en-CA" sz="2800" b="1" i="0" u="none" strike="noStrike">
                         <a:solidFill>
                           <a:srgbClr val="000000"/>
                         </a:solidFill>
@@ -11538,12 +11538,12 @@
                     <a:p>
                       <a:pPr algn="l" fontAlgn="b"/>
                       <a:r>
-                        <a:rPr lang="en-CA" sz="3200" b="1" u="none" strike="noStrike" dirty="0">
+                        <a:rPr lang="en-CA" sz="2800" b="1" u="none" strike="noStrike" dirty="0">
                           <a:effectLst/>
                         </a:rPr>
                         <a:t>Time</a:t>
                       </a:r>
-                      <a:endParaRPr lang="en-CA" sz="3200" b="1" i="0" u="none" strike="noStrike" dirty="0">
+                      <a:endParaRPr lang="en-CA" sz="2800" b="1" i="0" u="none" strike="noStrike" dirty="0">
                         <a:solidFill>
                           <a:srgbClr val="000000"/>
                         </a:solidFill>
@@ -11556,11 +11556,11 @@
                 </a:tc>
                 <a:extLst>
                   <a:ext uri="{0D108BD9-81ED-4DB2-BD59-A6C34878D82A}">
-                    <a16:rowId xmlns:a16="http://schemas.microsoft.com/office/drawing/2014/main" val="1715856308"/>
+                    <a16:rowId xmlns:a16="http://schemas.microsoft.com/office/drawing/2014/main" val="583618280"/>
                   </a:ext>
                 </a:extLst>
               </a:tr>
-              <a:tr h="433011">
+              <a:tr h="403107">
                 <a:tc>
                   <a:txBody>
                     <a:bodyPr/>
@@ -11568,12 +11568,12 @@
                     <a:p>
                       <a:pPr algn="l" fontAlgn="b"/>
                       <a:r>
-                        <a:rPr lang="en-CA" sz="2800" u="none" strike="noStrike">
+                        <a:rPr lang="en-CA" sz="2400" u="none" strike="noStrike">
                           <a:effectLst/>
                         </a:rPr>
                         <a:t>Java member</a:t>
                       </a:r>
-                      <a:endParaRPr lang="en-CA" sz="2800" b="0" i="0" u="none" strike="noStrike">
+                      <a:endParaRPr lang="en-CA" sz="2400" b="0" i="0" u="none" strike="noStrike">
                         <a:solidFill>
                           <a:srgbClr val="000000"/>
                         </a:solidFill>
@@ -11591,12 +11591,12 @@
                     <a:p>
                       <a:pPr algn="l" fontAlgn="b"/>
                       <a:r>
-                        <a:rPr lang="en-CA" sz="2800" u="none" strike="noStrike">
+                        <a:rPr lang="en-CA" sz="2400" u="none" strike="noStrike">
                           <a:effectLst/>
                         </a:rPr>
                         <a:t>Welcome</a:t>
                       </a:r>
-                      <a:endParaRPr lang="en-CA" sz="2800" b="0" i="0" u="none" strike="noStrike">
+                      <a:endParaRPr lang="en-CA" sz="2400" b="0" i="0" u="none" strike="noStrike">
                         <a:solidFill>
                           <a:srgbClr val="000000"/>
                         </a:solidFill>
@@ -11614,12 +11614,12 @@
                     <a:p>
                       <a:pPr algn="l" fontAlgn="b"/>
                       <a:r>
-                        <a:rPr lang="en-CA" sz="2800" u="none" strike="noStrike" dirty="0">
+                        <a:rPr lang="en-CA" sz="2400" u="none" strike="noStrike" dirty="0">
                           <a:effectLst/>
                         </a:rPr>
                         <a:t>5 minutes</a:t>
                       </a:r>
-                      <a:endParaRPr lang="en-CA" sz="2800" b="0" i="0" u="none" strike="noStrike" dirty="0">
+                      <a:endParaRPr lang="en-CA" sz="2400" b="0" i="0" u="none" strike="noStrike" dirty="0">
                         <a:solidFill>
                           <a:srgbClr val="000000"/>
                         </a:solidFill>
@@ -11632,11 +11632,11 @@
                 </a:tc>
                 <a:extLst>
                   <a:ext uri="{0D108BD9-81ED-4DB2-BD59-A6C34878D82A}">
-                    <a16:rowId xmlns:a16="http://schemas.microsoft.com/office/drawing/2014/main" val="909335479"/>
+                    <a16:rowId xmlns:a16="http://schemas.microsoft.com/office/drawing/2014/main" val="3152524329"/>
                   </a:ext>
                 </a:extLst>
               </a:tr>
-              <a:tr h="433011">
+              <a:tr h="403107">
                 <a:tc>
                   <a:txBody>
                     <a:bodyPr/>
@@ -11644,12 +11644,12 @@
                     <a:p>
                       <a:pPr algn="l" fontAlgn="b"/>
                       <a:r>
-                        <a:rPr lang="en-CA" sz="2800" u="none" strike="noStrike">
+                        <a:rPr lang="en-CA" sz="2400" u="none" strike="noStrike">
                           <a:effectLst/>
                         </a:rPr>
                         <a:t>John Hynes</a:t>
                       </a:r>
-                      <a:endParaRPr lang="en-CA" sz="2800" b="0" i="0" u="none" strike="noStrike">
+                      <a:endParaRPr lang="en-CA" sz="2400" b="0" i="0" u="none" strike="noStrike">
                         <a:solidFill>
                           <a:srgbClr val="000000"/>
                         </a:solidFill>
@@ -11667,12 +11667,12 @@
                     <a:p>
                       <a:pPr algn="l" fontAlgn="b"/>
                       <a:r>
-                        <a:rPr lang="en-CA" sz="2800" u="none" strike="noStrike">
+                        <a:rPr lang="en-CA" sz="2400" u="none" strike="noStrike">
                           <a:effectLst/>
                         </a:rPr>
                         <a:t>Welcome, team</a:t>
                       </a:r>
-                      <a:endParaRPr lang="en-CA" sz="2800" b="0" i="0" u="none" strike="noStrike">
+                      <a:endParaRPr lang="en-CA" sz="2400" b="0" i="0" u="none" strike="noStrike">
                         <a:solidFill>
                           <a:srgbClr val="000000"/>
                         </a:solidFill>
@@ -11690,12 +11690,12 @@
                     <a:p>
                       <a:pPr algn="l" fontAlgn="b"/>
                       <a:r>
-                        <a:rPr lang="en-CA" sz="2800" u="none" strike="noStrike" dirty="0">
+                        <a:rPr lang="en-CA" sz="2400" u="none" strike="noStrike" dirty="0">
                           <a:effectLst/>
                         </a:rPr>
                         <a:t>10 minutes</a:t>
                       </a:r>
-                      <a:endParaRPr lang="en-CA" sz="2800" b="0" i="0" u="none" strike="noStrike" dirty="0">
+                      <a:endParaRPr lang="en-CA" sz="2400" b="0" i="0" u="none" strike="noStrike" dirty="0">
                         <a:solidFill>
                           <a:srgbClr val="000000"/>
                         </a:solidFill>
@@ -11708,11 +11708,11 @@
                 </a:tc>
                 <a:extLst>
                   <a:ext uri="{0D108BD9-81ED-4DB2-BD59-A6C34878D82A}">
-                    <a16:rowId xmlns:a16="http://schemas.microsoft.com/office/drawing/2014/main" val="1296476536"/>
+                    <a16:rowId xmlns:a16="http://schemas.microsoft.com/office/drawing/2014/main" val="1376550890"/>
                   </a:ext>
                 </a:extLst>
               </a:tr>
-              <a:tr h="433011">
+              <a:tr h="403107">
                 <a:tc>
                   <a:txBody>
                     <a:bodyPr/>
@@ -11720,12 +11720,12 @@
                     <a:p>
                       <a:pPr algn="l" fontAlgn="b"/>
                       <a:r>
-                        <a:rPr lang="en-CA" sz="2800" u="none" strike="noStrike">
+                        <a:rPr lang="en-CA" sz="2400" u="none" strike="noStrike">
                           <a:effectLst/>
                         </a:rPr>
                         <a:t>Connie Liu</a:t>
                       </a:r>
-                      <a:endParaRPr lang="en-CA" sz="2800" b="0" i="0" u="none" strike="noStrike">
+                      <a:endParaRPr lang="en-CA" sz="2400" b="0" i="0" u="none" strike="noStrike">
                         <a:solidFill>
                           <a:srgbClr val="000000"/>
                         </a:solidFill>
@@ -11743,12 +11743,12 @@
                     <a:p>
                       <a:pPr algn="l" fontAlgn="b"/>
                       <a:r>
-                        <a:rPr lang="en-CA" sz="2800" u="none" strike="noStrike">
+                        <a:rPr lang="en-CA" sz="2400" u="none" strike="noStrike">
                           <a:effectLst/>
                         </a:rPr>
                         <a:t>Presenting new team member</a:t>
                       </a:r>
-                      <a:endParaRPr lang="en-CA" sz="2800" b="0" i="0" u="none" strike="noStrike">
+                      <a:endParaRPr lang="en-CA" sz="2400" b="0" i="0" u="none" strike="noStrike">
                         <a:solidFill>
                           <a:srgbClr val="000000"/>
                         </a:solidFill>
@@ -11766,12 +11766,12 @@
                     <a:p>
                       <a:pPr algn="l" fontAlgn="b"/>
                       <a:r>
-                        <a:rPr lang="en-CA" sz="2800" u="none" strike="noStrike" dirty="0">
+                        <a:rPr lang="en-CA" sz="2400" u="none" strike="noStrike" dirty="0">
                           <a:effectLst/>
                         </a:rPr>
                         <a:t>1 minute</a:t>
                       </a:r>
-                      <a:endParaRPr lang="en-CA" sz="2800" b="0" i="0" u="none" strike="noStrike" dirty="0">
+                      <a:endParaRPr lang="en-CA" sz="2400" b="0" i="0" u="none" strike="noStrike" dirty="0">
                         <a:solidFill>
                           <a:srgbClr val="000000"/>
                         </a:solidFill>
@@ -11784,11 +11784,11 @@
                 </a:tc>
                 <a:extLst>
                   <a:ext uri="{0D108BD9-81ED-4DB2-BD59-A6C34878D82A}">
-                    <a16:rowId xmlns:a16="http://schemas.microsoft.com/office/drawing/2014/main" val="2289789206"/>
+                    <a16:rowId xmlns:a16="http://schemas.microsoft.com/office/drawing/2014/main" val="3666075625"/>
                   </a:ext>
                 </a:extLst>
               </a:tr>
-              <a:tr h="433011">
+              <a:tr h="403107">
                 <a:tc>
                   <a:txBody>
                     <a:bodyPr/>
@@ -11796,12 +11796,12 @@
                     <a:p>
                       <a:pPr algn="l" fontAlgn="b"/>
                       <a:r>
-                        <a:rPr lang="en-CA" sz="2800" u="none" strike="noStrike">
+                        <a:rPr lang="en-CA" sz="2400" u="none" strike="noStrike">
                           <a:effectLst/>
                         </a:rPr>
                         <a:t>Alan Hummel</a:t>
                       </a:r>
-                      <a:endParaRPr lang="en-CA" sz="2800" b="0" i="0" u="none" strike="noStrike">
+                      <a:endParaRPr lang="en-CA" sz="2400" b="0" i="0" u="none" strike="noStrike">
                         <a:solidFill>
                           <a:srgbClr val="000000"/>
                         </a:solidFill>
@@ -11819,12 +11819,12 @@
                     <a:p>
                       <a:pPr algn="l" fontAlgn="b"/>
                       <a:r>
-                        <a:rPr lang="en-CA" sz="2800" u="none" strike="noStrike">
+                        <a:rPr lang="en-CA" sz="2400" u="none" strike="noStrike">
                           <a:effectLst/>
                         </a:rPr>
                         <a:t>Using Git</a:t>
                       </a:r>
-                      <a:endParaRPr lang="en-CA" sz="2800" b="0" i="0" u="none" strike="noStrike">
+                      <a:endParaRPr lang="en-CA" sz="2400" b="0" i="0" u="none" strike="noStrike">
                         <a:solidFill>
                           <a:srgbClr val="000000"/>
                         </a:solidFill>
@@ -11842,12 +11842,12 @@
                     <a:p>
                       <a:pPr algn="l" fontAlgn="b"/>
                       <a:r>
-                        <a:rPr lang="en-CA" sz="2800" u="none" strike="noStrike" dirty="0">
+                        <a:rPr lang="en-CA" sz="2400" u="none" strike="noStrike" dirty="0">
                           <a:effectLst/>
                         </a:rPr>
                         <a:t>10 minutes</a:t>
                       </a:r>
-                      <a:endParaRPr lang="en-CA" sz="2800" b="0" i="0" u="none" strike="noStrike" dirty="0">
+                      <a:endParaRPr lang="en-CA" sz="2400" b="0" i="0" u="none" strike="noStrike" dirty="0">
                         <a:solidFill>
                           <a:srgbClr val="000000"/>
                         </a:solidFill>
@@ -11860,11 +11860,11 @@
                 </a:tc>
                 <a:extLst>
                   <a:ext uri="{0D108BD9-81ED-4DB2-BD59-A6C34878D82A}">
-                    <a16:rowId xmlns:a16="http://schemas.microsoft.com/office/drawing/2014/main" val="2280644566"/>
+                    <a16:rowId xmlns:a16="http://schemas.microsoft.com/office/drawing/2014/main" val="2211667258"/>
                   </a:ext>
                 </a:extLst>
               </a:tr>
-              <a:tr h="433011">
+              <a:tr h="403107">
                 <a:tc>
                   <a:txBody>
                     <a:bodyPr/>
@@ -11872,12 +11872,12 @@
                     <a:p>
                       <a:pPr algn="l" fontAlgn="b"/>
                       <a:r>
-                        <a:rPr lang="en-CA" sz="2800" u="none" strike="noStrike">
+                        <a:rPr lang="en-CA" sz="2400" u="none" strike="noStrike">
                           <a:effectLst/>
                         </a:rPr>
                         <a:t>Olga Agady</a:t>
                       </a:r>
-                      <a:endParaRPr lang="en-CA" sz="2800" b="0" i="0" u="none" strike="noStrike">
+                      <a:endParaRPr lang="en-CA" sz="2400" b="0" i="0" u="none" strike="noStrike">
                         <a:solidFill>
                           <a:srgbClr val="000000"/>
                         </a:solidFill>
@@ -11895,12 +11895,12 @@
                     <a:p>
                       <a:pPr algn="l" fontAlgn="b"/>
                       <a:r>
-                        <a:rPr lang="en-CA" sz="2800" u="none" strike="noStrike">
+                        <a:rPr lang="en-CA" sz="2400" u="none" strike="noStrike">
                           <a:effectLst/>
                         </a:rPr>
                         <a:t>Integration with Box.com</a:t>
                       </a:r>
-                      <a:endParaRPr lang="en-CA" sz="2800" b="0" i="0" u="none" strike="noStrike">
+                      <a:endParaRPr lang="en-CA" sz="2400" b="0" i="0" u="none" strike="noStrike">
                         <a:solidFill>
                           <a:srgbClr val="000000"/>
                         </a:solidFill>
@@ -11918,12 +11918,12 @@
                     <a:p>
                       <a:pPr algn="l" fontAlgn="b"/>
                       <a:r>
-                        <a:rPr lang="en-CA" sz="2800" u="none" strike="noStrike" dirty="0">
+                        <a:rPr lang="en-CA" sz="2400" u="none" strike="noStrike" dirty="0">
                           <a:effectLst/>
                         </a:rPr>
                         <a:t>5 minutes</a:t>
                       </a:r>
-                      <a:endParaRPr lang="en-CA" sz="2800" b="0" i="0" u="none" strike="noStrike" dirty="0">
+                      <a:endParaRPr lang="en-CA" sz="2400" b="0" i="0" u="none" strike="noStrike" dirty="0">
                         <a:solidFill>
                           <a:srgbClr val="000000"/>
                         </a:solidFill>
@@ -11936,11 +11936,11 @@
                 </a:tc>
                 <a:extLst>
                   <a:ext uri="{0D108BD9-81ED-4DB2-BD59-A6C34878D82A}">
-                    <a16:rowId xmlns:a16="http://schemas.microsoft.com/office/drawing/2014/main" val="3760461788"/>
+                    <a16:rowId xmlns:a16="http://schemas.microsoft.com/office/drawing/2014/main" val="4289447091"/>
                   </a:ext>
                 </a:extLst>
               </a:tr>
-              <a:tr h="433011">
+              <a:tr h="403107">
                 <a:tc>
                   <a:txBody>
                     <a:bodyPr/>
@@ -11948,12 +11948,12 @@
                     <a:p>
                       <a:pPr algn="l" fontAlgn="b"/>
                       <a:r>
-                        <a:rPr lang="en-CA" sz="2800" u="none" strike="noStrike">
+                        <a:rPr lang="en-CA" sz="2400" u="none" strike="noStrike">
                           <a:effectLst/>
                         </a:rPr>
                         <a:t>Anita Wong</a:t>
                       </a:r>
-                      <a:endParaRPr lang="en-CA" sz="2800" b="0" i="0" u="none" strike="noStrike">
+                      <a:endParaRPr lang="en-CA" sz="2400" b="0" i="0" u="none" strike="noStrike">
                         <a:solidFill>
                           <a:srgbClr val="000000"/>
                         </a:solidFill>
@@ -11971,12 +11971,12 @@
                     <a:p>
                       <a:pPr algn="l" fontAlgn="b"/>
                       <a:r>
-                        <a:rPr lang="en-CA" sz="2800" u="none" strike="noStrike">
+                        <a:rPr lang="en-CA" sz="2400" u="none" strike="noStrike">
                           <a:effectLst/>
                         </a:rPr>
                         <a:t>FMS Upgrade Update</a:t>
                       </a:r>
-                      <a:endParaRPr lang="en-CA" sz="2800" b="0" i="0" u="none" strike="noStrike">
+                      <a:endParaRPr lang="en-CA" sz="2400" b="0" i="0" u="none" strike="noStrike">
                         <a:solidFill>
                           <a:srgbClr val="000000"/>
                         </a:solidFill>
@@ -11994,12 +11994,12 @@
                     <a:p>
                       <a:pPr algn="l" fontAlgn="b"/>
                       <a:r>
-                        <a:rPr lang="en-CA" sz="2800" u="none" strike="noStrike" dirty="0">
+                        <a:rPr lang="en-CA" sz="2400" u="none" strike="noStrike" dirty="0">
                           <a:effectLst/>
                         </a:rPr>
                         <a:t>5 minutes</a:t>
                       </a:r>
-                      <a:endParaRPr lang="en-CA" sz="2800" b="0" i="0" u="none" strike="noStrike" dirty="0">
+                      <a:endParaRPr lang="en-CA" sz="2400" b="0" i="0" u="none" strike="noStrike" dirty="0">
                         <a:solidFill>
                           <a:srgbClr val="000000"/>
                         </a:solidFill>
@@ -12012,11 +12012,11 @@
                 </a:tc>
                 <a:extLst>
                   <a:ext uri="{0D108BD9-81ED-4DB2-BD59-A6C34878D82A}">
-                    <a16:rowId xmlns:a16="http://schemas.microsoft.com/office/drawing/2014/main" val="2247761089"/>
+                    <a16:rowId xmlns:a16="http://schemas.microsoft.com/office/drawing/2014/main" val="3060202064"/>
                   </a:ext>
                 </a:extLst>
               </a:tr>
-              <a:tr h="433011">
+              <a:tr h="403107">
                 <a:tc>
                   <a:txBody>
                     <a:bodyPr/>
@@ -12024,12 +12024,12 @@
                     <a:p>
                       <a:pPr algn="l" fontAlgn="b"/>
                       <a:r>
-                        <a:rPr lang="en-CA" sz="2800" u="none" strike="noStrike">
+                        <a:rPr lang="en-CA" sz="2400" u="none" strike="noStrike">
                           <a:effectLst/>
                         </a:rPr>
-                        <a:t>Senthil/Melissa</a:t>
+                        <a:t>Sammy Douglas</a:t>
                       </a:r>
-                      <a:endParaRPr lang="en-CA" sz="2800" b="0" i="0" u="none" strike="noStrike">
+                      <a:endParaRPr lang="en-CA" sz="2400" b="0" i="0" u="none" strike="noStrike">
                         <a:solidFill>
                           <a:srgbClr val="000000"/>
                         </a:solidFill>
@@ -12047,12 +12047,12 @@
                     <a:p>
                       <a:pPr algn="l" fontAlgn="b"/>
                       <a:r>
-                        <a:rPr lang="en-CA" sz="2800" u="none" strike="noStrike">
+                        <a:rPr lang="en-CA" sz="2400" u="none" strike="noStrike">
                           <a:effectLst/>
                         </a:rPr>
-                        <a:t>Digitalization Team Update</a:t>
+                        <a:t>Destruction Update</a:t>
                       </a:r>
-                      <a:endParaRPr lang="en-CA" sz="2800" b="0" i="0" u="none" strike="noStrike">
+                      <a:endParaRPr lang="en-CA" sz="2400" b="0" i="0" u="none" strike="noStrike">
                         <a:solidFill>
                           <a:srgbClr val="000000"/>
                         </a:solidFill>
@@ -12070,12 +12070,12 @@
                     <a:p>
                       <a:pPr algn="l" fontAlgn="b"/>
                       <a:r>
-                        <a:rPr lang="en-CA" sz="2800" u="none" strike="noStrike" dirty="0">
+                        <a:rPr lang="en-CA" sz="2400" u="none" strike="noStrike" dirty="0">
                           <a:effectLst/>
                         </a:rPr>
-                        <a:t>10 minutes</a:t>
+                        <a:t>5 minutes</a:t>
                       </a:r>
-                      <a:endParaRPr lang="en-CA" sz="2800" b="0" i="0" u="none" strike="noStrike" dirty="0">
+                      <a:endParaRPr lang="en-CA" sz="2400" b="0" i="0" u="none" strike="noStrike" dirty="0">
                         <a:solidFill>
                           <a:srgbClr val="000000"/>
                         </a:solidFill>
@@ -12088,11 +12088,11 @@
                 </a:tc>
                 <a:extLst>
                   <a:ext uri="{0D108BD9-81ED-4DB2-BD59-A6C34878D82A}">
-                    <a16:rowId xmlns:a16="http://schemas.microsoft.com/office/drawing/2014/main" val="4045697416"/>
+                    <a16:rowId xmlns:a16="http://schemas.microsoft.com/office/drawing/2014/main" val="1234078770"/>
                   </a:ext>
                 </a:extLst>
               </a:tr>
-              <a:tr h="433011">
+              <a:tr h="403107">
                 <a:tc>
                   <a:txBody>
                     <a:bodyPr/>
@@ -12100,12 +12100,12 @@
                     <a:p>
                       <a:pPr algn="l" fontAlgn="b"/>
                       <a:r>
-                        <a:rPr lang="en-CA" sz="2800" u="none" strike="noStrike">
+                        <a:rPr lang="en-CA" sz="2400" u="none" strike="noStrike">
                           <a:effectLst/>
                         </a:rPr>
-                        <a:t>Patrick</a:t>
+                        <a:t>Senthil/Melissa</a:t>
                       </a:r>
-                      <a:endParaRPr lang="en-CA" sz="2800" b="0" i="0" u="none" strike="noStrike">
+                      <a:endParaRPr lang="en-CA" sz="2400" b="0" i="0" u="none" strike="noStrike">
                         <a:solidFill>
                           <a:srgbClr val="000000"/>
                         </a:solidFill>
@@ -12123,12 +12123,12 @@
                     <a:p>
                       <a:pPr algn="l" fontAlgn="b"/>
                       <a:r>
-                        <a:rPr lang="en-CA" sz="2800" u="none" strike="noStrike">
+                        <a:rPr lang="en-CA" sz="2400" u="none" strike="noStrike">
                           <a:effectLst/>
                         </a:rPr>
-                        <a:t>UCS</a:t>
+                        <a:t>Digitalization Team Update</a:t>
                       </a:r>
-                      <a:endParaRPr lang="en-CA" sz="2800" b="0" i="0" u="none" strike="noStrike">
+                      <a:endParaRPr lang="en-CA" sz="2400" b="0" i="0" u="none" strike="noStrike">
                         <a:solidFill>
                           <a:srgbClr val="000000"/>
                         </a:solidFill>
@@ -12146,12 +12146,12 @@
                     <a:p>
                       <a:pPr algn="l" fontAlgn="b"/>
                       <a:r>
-                        <a:rPr lang="en-CA" sz="2800" u="none" strike="noStrike" dirty="0">
+                        <a:rPr lang="en-CA" sz="2400" u="none" strike="noStrike" dirty="0">
                           <a:effectLst/>
                         </a:rPr>
-                        <a:t>5 minutes</a:t>
+                        <a:t>10 minutes</a:t>
                       </a:r>
-                      <a:endParaRPr lang="en-CA" sz="2800" b="0" i="0" u="none" strike="noStrike" dirty="0">
+                      <a:endParaRPr lang="en-CA" sz="2400" b="0" i="0" u="none" strike="noStrike" dirty="0">
                         <a:solidFill>
                           <a:srgbClr val="000000"/>
                         </a:solidFill>
@@ -12164,11 +12164,11 @@
                 </a:tc>
                 <a:extLst>
                   <a:ext uri="{0D108BD9-81ED-4DB2-BD59-A6C34878D82A}">
-                    <a16:rowId xmlns:a16="http://schemas.microsoft.com/office/drawing/2014/main" val="1768039374"/>
+                    <a16:rowId xmlns:a16="http://schemas.microsoft.com/office/drawing/2014/main" val="3532755892"/>
                   </a:ext>
                 </a:extLst>
               </a:tr>
-              <a:tr h="433011">
+              <a:tr h="403107">
                 <a:tc>
                   <a:txBody>
                     <a:bodyPr/>
@@ -12176,12 +12176,12 @@
                     <a:p>
                       <a:pPr algn="l" fontAlgn="b"/>
                       <a:r>
-                        <a:rPr lang="en-CA" sz="2800" u="none" strike="noStrike">
+                        <a:rPr lang="en-CA" sz="2400" u="none" strike="noStrike">
                           <a:effectLst/>
                         </a:rPr>
-                        <a:t>Donovan</a:t>
+                        <a:t>Patrick</a:t>
                       </a:r>
-                      <a:endParaRPr lang="en-CA" sz="2800" b="0" i="0" u="none" strike="noStrike">
+                      <a:endParaRPr lang="en-CA" sz="2400" b="0" i="0" u="none" strike="noStrike">
                         <a:solidFill>
                           <a:srgbClr val="000000"/>
                         </a:solidFill>
@@ -12199,12 +12199,12 @@
                     <a:p>
                       <a:pPr algn="l" fontAlgn="b"/>
                       <a:r>
-                        <a:rPr lang="en-CA" sz="2800" u="none" strike="noStrike">
+                        <a:rPr lang="en-CA" sz="2400" u="none" strike="noStrike">
                           <a:effectLst/>
                         </a:rPr>
-                        <a:t>MFA</a:t>
+                        <a:t>UCS</a:t>
                       </a:r>
-                      <a:endParaRPr lang="en-CA" sz="2800" b="0" i="0" u="none" strike="noStrike">
+                      <a:endParaRPr lang="en-CA" sz="2400" b="0" i="0" u="none" strike="noStrike">
                         <a:solidFill>
                           <a:srgbClr val="000000"/>
                         </a:solidFill>
@@ -12222,12 +12222,12 @@
                     <a:p>
                       <a:pPr algn="l" fontAlgn="b"/>
                       <a:r>
-                        <a:rPr lang="en-CA" sz="2800" u="none" strike="noStrike" dirty="0">
+                        <a:rPr lang="en-CA" sz="2400" u="none" strike="noStrike" dirty="0">
                           <a:effectLst/>
                         </a:rPr>
                         <a:t>5 minutes</a:t>
                       </a:r>
-                      <a:endParaRPr lang="en-CA" sz="2800" b="0" i="0" u="none" strike="noStrike" dirty="0">
+                      <a:endParaRPr lang="en-CA" sz="2400" b="0" i="0" u="none" strike="noStrike" dirty="0">
                         <a:solidFill>
                           <a:srgbClr val="000000"/>
                         </a:solidFill>
@@ -12240,11 +12240,11 @@
                 </a:tc>
                 <a:extLst>
                   <a:ext uri="{0D108BD9-81ED-4DB2-BD59-A6C34878D82A}">
-                    <a16:rowId xmlns:a16="http://schemas.microsoft.com/office/drawing/2014/main" val="2831765500"/>
+                    <a16:rowId xmlns:a16="http://schemas.microsoft.com/office/drawing/2014/main" val="373231893"/>
                   </a:ext>
                 </a:extLst>
               </a:tr>
-              <a:tr h="433011">
+              <a:tr h="403107">
                 <a:tc>
                   <a:txBody>
                     <a:bodyPr/>
@@ -12252,12 +12252,12 @@
                     <a:p>
                       <a:pPr algn="l" fontAlgn="b"/>
                       <a:r>
-                        <a:rPr lang="en-CA" sz="2800" u="none" strike="noStrike">
+                        <a:rPr lang="en-CA" sz="2400" u="none" strike="noStrike">
                           <a:effectLst/>
                         </a:rPr>
-                        <a:t>Sanjay</a:t>
+                        <a:t>Donovan</a:t>
                       </a:r>
-                      <a:endParaRPr lang="en-CA" sz="2800" b="0" i="0" u="none" strike="noStrike">
+                      <a:endParaRPr lang="en-CA" sz="2400" b="0" i="0" u="none" strike="noStrike">
                         <a:solidFill>
                           <a:srgbClr val="000000"/>
                         </a:solidFill>
@@ -12275,12 +12275,12 @@
                     <a:p>
                       <a:pPr algn="l" fontAlgn="b"/>
                       <a:r>
-                        <a:rPr lang="en-CA" sz="2800" u="none" strike="noStrike">
+                        <a:rPr lang="en-CA" sz="2400" u="none" strike="noStrike">
                           <a:effectLst/>
                         </a:rPr>
-                        <a:t>TBD</a:t>
+                        <a:t>MFA</a:t>
                       </a:r>
-                      <a:endParaRPr lang="en-CA" sz="2800" b="0" i="0" u="none" strike="noStrike">
+                      <a:endParaRPr lang="en-CA" sz="2400" b="0" i="0" u="none" strike="noStrike">
                         <a:solidFill>
                           <a:srgbClr val="000000"/>
                         </a:solidFill>
@@ -12298,12 +12298,12 @@
                     <a:p>
                       <a:pPr algn="l" fontAlgn="b"/>
                       <a:r>
-                        <a:rPr lang="en-CA" sz="2800" u="none" strike="noStrike" dirty="0">
+                        <a:rPr lang="en-CA" sz="2400" u="none" strike="noStrike" dirty="0">
                           <a:effectLst/>
                         </a:rPr>
-                        <a:t>10 minutes</a:t>
+                        <a:t>5 minutes</a:t>
                       </a:r>
-                      <a:endParaRPr lang="en-CA" sz="2800" b="0" i="0" u="none" strike="noStrike" dirty="0">
+                      <a:endParaRPr lang="en-CA" sz="2400" b="0" i="0" u="none" strike="noStrike" dirty="0">
                         <a:solidFill>
                           <a:srgbClr val="000000"/>
                         </a:solidFill>
@@ -12316,11 +12316,11 @@
                 </a:tc>
                 <a:extLst>
                   <a:ext uri="{0D108BD9-81ED-4DB2-BD59-A6C34878D82A}">
-                    <a16:rowId xmlns:a16="http://schemas.microsoft.com/office/drawing/2014/main" val="2542471200"/>
+                    <a16:rowId xmlns:a16="http://schemas.microsoft.com/office/drawing/2014/main" val="1067833003"/>
                   </a:ext>
                 </a:extLst>
               </a:tr>
-              <a:tr h="454662">
+              <a:tr h="403107">
                 <a:tc>
                   <a:txBody>
                     <a:bodyPr/>
@@ -12328,12 +12328,12 @@
                     <a:p>
                       <a:pPr algn="l" fontAlgn="b"/>
                       <a:r>
-                        <a:rPr lang="en-CA" sz="2800" u="none" strike="noStrike">
+                        <a:rPr lang="en-CA" sz="2400" u="none" strike="noStrike">
                           <a:effectLst/>
                         </a:rPr>
-                        <a:t>Andrew</a:t>
+                        <a:t>Sanjay</a:t>
                       </a:r>
-                      <a:endParaRPr lang="en-CA" sz="2800" b="0" i="0" u="none" strike="noStrike">
+                      <a:endParaRPr lang="en-CA" sz="2400" b="0" i="0" u="none" strike="noStrike">
                         <a:solidFill>
                           <a:srgbClr val="000000"/>
                         </a:solidFill>
@@ -12351,12 +12351,12 @@
                     <a:p>
                       <a:pPr algn="l" fontAlgn="b"/>
                       <a:r>
-                        <a:rPr lang="en-CA" sz="2800" u="none" strike="noStrike">
+                        <a:rPr lang="en-CA" sz="2400" u="none" strike="noStrike">
                           <a:effectLst/>
                         </a:rPr>
-                        <a:t>RA</a:t>
+                        <a:t>TBD</a:t>
                       </a:r>
-                      <a:endParaRPr lang="en-CA" sz="2800" b="0" i="0" u="none" strike="noStrike">
+                      <a:endParaRPr lang="en-CA" sz="2400" b="0" i="0" u="none" strike="noStrike">
                         <a:solidFill>
                           <a:srgbClr val="000000"/>
                         </a:solidFill>
@@ -12374,12 +12374,12 @@
                     <a:p>
                       <a:pPr algn="l" fontAlgn="b"/>
                       <a:r>
-                        <a:rPr lang="en-CA" sz="2800" u="none" strike="noStrike" dirty="0">
+                        <a:rPr lang="en-CA" sz="2400" u="none" strike="noStrike" dirty="0">
                           <a:effectLst/>
                         </a:rPr>
-                        <a:t>5 minutes</a:t>
+                        <a:t>10 minutes</a:t>
                       </a:r>
-                      <a:endParaRPr lang="en-CA" sz="2800" b="0" i="0" u="none" strike="noStrike" dirty="0">
+                      <a:endParaRPr lang="en-CA" sz="2400" b="0" i="0" u="none" strike="noStrike" dirty="0">
                         <a:solidFill>
                           <a:srgbClr val="000000"/>
                         </a:solidFill>
@@ -12392,7 +12392,83 @@
                 </a:tc>
                 <a:extLst>
                   <a:ext uri="{0D108BD9-81ED-4DB2-BD59-A6C34878D82A}">
-                    <a16:rowId xmlns:a16="http://schemas.microsoft.com/office/drawing/2014/main" val="2285177520"/>
+                    <a16:rowId xmlns:a16="http://schemas.microsoft.com/office/drawing/2014/main" val="934908366"/>
+                  </a:ext>
+                </a:extLst>
+              </a:tr>
+              <a:tr h="423263">
+                <a:tc>
+                  <a:txBody>
+                    <a:bodyPr/>
+                    <a:lstStyle/>
+                    <a:p>
+                      <a:pPr algn="l" fontAlgn="b"/>
+                      <a:r>
+                        <a:rPr lang="en-CA" sz="2400" u="none" strike="noStrike">
+                          <a:effectLst/>
+                        </a:rPr>
+                        <a:t>Andrew</a:t>
+                      </a:r>
+                      <a:endParaRPr lang="en-CA" sz="2400" b="0" i="0" u="none" strike="noStrike">
+                        <a:solidFill>
+                          <a:srgbClr val="000000"/>
+                        </a:solidFill>
+                        <a:effectLst/>
+                        <a:latin typeface="Calibri" panose="020F0502020204030204" pitchFamily="34" charset="0"/>
+                      </a:endParaRPr>
+                    </a:p>
+                  </a:txBody>
+                  <a:tcPr marL="9525" marR="9525" marT="9525" marB="0" anchor="b"/>
+                </a:tc>
+                <a:tc>
+                  <a:txBody>
+                    <a:bodyPr/>
+                    <a:lstStyle/>
+                    <a:p>
+                      <a:pPr algn="l" fontAlgn="b"/>
+                      <a:r>
+                        <a:rPr lang="en-CA" sz="2400" u="none" strike="noStrike">
+                          <a:effectLst/>
+                        </a:rPr>
+                        <a:t>RA</a:t>
+                      </a:r>
+                      <a:endParaRPr lang="en-CA" sz="2400" b="0" i="0" u="none" strike="noStrike">
+                        <a:solidFill>
+                          <a:srgbClr val="000000"/>
+                        </a:solidFill>
+                        <a:effectLst/>
+                        <a:latin typeface="Calibri" panose="020F0502020204030204" pitchFamily="34" charset="0"/>
+                      </a:endParaRPr>
+                    </a:p>
+                  </a:txBody>
+                  <a:tcPr marL="9525" marR="9525" marT="9525" marB="0" anchor="b"/>
+                </a:tc>
+                <a:tc>
+                  <a:txBody>
+                    <a:bodyPr/>
+                    <a:lstStyle/>
+                    <a:p>
+                      <a:pPr algn="l" fontAlgn="b"/>
+                      <a:r>
+                        <a:rPr lang="en-CA" sz="2400" u="none" strike="noStrike" dirty="0">
+                          <a:effectLst/>
+                        </a:rPr>
+                        <a:t>5 minutes</a:t>
+                      </a:r>
+                      <a:endParaRPr lang="en-CA" sz="2400" b="0" i="0" u="none" strike="noStrike" dirty="0">
+                        <a:solidFill>
+                          <a:srgbClr val="000000"/>
+                        </a:solidFill>
+                        <a:effectLst/>
+                        <a:latin typeface="Calibri" panose="020F0502020204030204" pitchFamily="34" charset="0"/>
+                      </a:endParaRPr>
+                    </a:p>
+                  </a:txBody>
+                  <a:tcPr marL="9525" marR="9525" marT="9525" marB="0" anchor="b"/>
+                </a:tc>
+                <a:extLst>
+                  <a:ext uri="{0D108BD9-81ED-4DB2-BD59-A6C34878D82A}">
+                    <a16:rowId xmlns:a16="http://schemas.microsoft.com/office/drawing/2014/main" val="548014738"/>
                   </a:ext>
                 </a:extLst>
               </a:tr>

</xml_diff>